<commit_message>
update access plot codes; update all figures
add single-group plotting of access; update all produced figures
</commit_message>
<xml_diff>
--- a/figures/freightEmissions/figuresSA.pptx
+++ b/figures/freightEmissions/figuresSA.pptx
@@ -6,6 +6,7 @@
   </p:sldMasterIdLst>
   <p:sldIdLst>
     <p:sldId id="256" r:id="rId2"/>
+    <p:sldId id="257" r:id="rId3"/>
   </p:sldIdLst>
   <p:sldSz cx="12192000" cy="6858000"/>
   <p:notesSz cx="6858000" cy="9144000"/>
@@ -4258,8 +4259,8 @@
         </p:nvSpPr>
         <p:spPr bwMode="auto">
           <a:xfrm>
-            <a:off x="0" y="0"/>
-            <a:ext cx="12192000" cy="457200"/>
+            <a:off x="0" y="23774"/>
+            <a:ext cx="2761975" cy="409652"/>
           </a:xfrm>
           <a:prstGeom prst="rect">
             <a:avLst/>
@@ -4324,7 +4325,7 @@
               <a:tabLst/>
             </a:pPr>
             <a:r>
-              <a:rPr kumimoji="0" lang="zh-CN" altLang="zh-CN" sz="1100" b="0" i="0" u="none" strike="noStrike" cap="none" normalizeH="0" baseline="0">
+              <a:rPr kumimoji="0" lang="zh-CN" altLang="zh-CN" sz="1100" b="0" i="0" u="none" strike="noStrike" cap="none" normalizeH="0" baseline="0" dirty="0">
                 <a:ln>
                   <a:noFill/>
                 </a:ln>
@@ -4335,10 +4336,66 @@
                 <a:latin typeface="Arial Unicode MS"/>
                 <a:ea typeface="Monaco"/>
               </a:rPr>
-              <a:t>["#557174","#9dad7f","#c7cfb7","#f7f7e8"]</a:t>
-            </a:r>
-            <a:r>
-              <a:rPr kumimoji="0" lang="zh-CN" altLang="zh-CN" sz="600" b="0" i="0" u="none" strike="noStrike" cap="none" normalizeH="0" baseline="0">
+              <a:t>["</a:t>
+            </a:r>
+            <a:r>
+              <a:rPr kumimoji="0" lang="en-US" altLang="zh-CN" sz="1100" b="0" i="0" u="none" strike="noStrike" cap="none" normalizeH="0" baseline="0" dirty="0">
+                <a:ln>
+                  <a:noFill/>
+                </a:ln>
+                <a:solidFill>
+                  <a:srgbClr val="2D334A"/>
+                </a:solidFill>
+                <a:effectLst/>
+                <a:latin typeface="Arial Unicode MS"/>
+                <a:ea typeface="Monaco"/>
+              </a:rPr>
+              <a:t>#819F85</a:t>
+            </a:r>
+            <a:r>
+              <a:rPr kumimoji="0" lang="zh-CN" altLang="zh-CN" sz="1100" b="0" i="0" u="none" strike="noStrike" cap="none" normalizeH="0" baseline="0" dirty="0">
+                <a:ln>
+                  <a:noFill/>
+                </a:ln>
+                <a:solidFill>
+                  <a:srgbClr val="2D334A"/>
+                </a:solidFill>
+                <a:effectLst/>
+                <a:latin typeface="Arial Unicode MS"/>
+                <a:ea typeface="Monaco"/>
+              </a:rPr>
+              <a:t>","#9dad7f","#c7cfb7","</a:t>
+            </a:r>
+            <a:r>
+              <a:rPr kumimoji="0" lang="en-US" altLang="zh-CN" sz="1100" b="0" i="0" u="none" strike="noStrike" cap="none" normalizeH="0" baseline="0" dirty="0">
+                <a:ln>
+                  <a:noFill/>
+                </a:ln>
+                <a:solidFill>
+                  <a:srgbClr val="2D334A"/>
+                </a:solidFill>
+                <a:effectLst/>
+                <a:latin typeface="Arial Unicode MS"/>
+                <a:ea typeface="Monaco"/>
+              </a:rPr>
+              <a:t>#E6E5B8</a:t>
+            </a:r>
+            <a:r>
+              <a:rPr kumimoji="0" lang="zh-CN" altLang="zh-CN" sz="1100" b="0" i="0" u="none" strike="noStrike" cap="none" normalizeH="0" baseline="0" dirty="0">
+                <a:ln>
+                  <a:noFill/>
+                </a:ln>
+                <a:solidFill>
+                  <a:srgbClr val="2D334A"/>
+                </a:solidFill>
+                <a:effectLst/>
+                <a:latin typeface="Arial Unicode MS"/>
+                <a:ea typeface="Monaco"/>
+              </a:rPr>
+              <a:t>"]</a:t>
+            </a:r>
+            <a:r>
+              <a:rPr kumimoji="0" lang="zh-CN" altLang="zh-CN" sz="600" b="0" i="0" u="none" strike="noStrike" cap="none" normalizeH="0" baseline="0" dirty="0">
                 <a:ln>
                   <a:noFill/>
                 </a:ln>
@@ -4349,7 +4406,7 @@
               </a:rPr>
               <a:t> </a:t>
             </a:r>
-            <a:endParaRPr kumimoji="0" lang="zh-CN" altLang="zh-CN" sz="1800" b="0" i="0" u="none" strike="noStrike" cap="none" normalizeH="0" baseline="0">
+            <a:endParaRPr kumimoji="0" lang="zh-CN" altLang="zh-CN" sz="1800" b="0" i="0" u="none" strike="noStrike" cap="none" normalizeH="0" baseline="0" dirty="0">
               <a:ln>
                 <a:noFill/>
               </a:ln>
@@ -4390,7 +4447,7 @@
         </p:blipFill>
         <p:spPr>
           <a:xfrm>
-            <a:off x="2670352" y="40612"/>
+            <a:off x="2946645" y="40612"/>
             <a:ext cx="995519" cy="230860"/>
           </a:xfrm>
           <a:prstGeom prst="rect">
@@ -4483,10 +4540,1832 @@
           </a:p>
         </p:txBody>
       </p:sp>
+      <p:sp>
+        <p:nvSpPr>
+          <p:cNvPr id="62" name="Rectangle 61">
+            <a:extLst>
+              <a:ext uri="{FF2B5EF4-FFF2-40B4-BE49-F238E27FC236}">
+                <a16:creationId xmlns:a16="http://schemas.microsoft.com/office/drawing/2014/main" id="{8B9D8B15-7B79-C9D4-046A-D26C4AAA3980}"/>
+              </a:ext>
+            </a:extLst>
+          </p:cNvPr>
+          <p:cNvSpPr/>
+          <p:nvPr/>
+        </p:nvSpPr>
+        <p:spPr>
+          <a:xfrm>
+            <a:off x="3684248" y="271472"/>
+            <a:ext cx="368391" cy="314528"/>
+          </a:xfrm>
+          <a:prstGeom prst="rect">
+            <a:avLst/>
+          </a:prstGeom>
+          <a:solidFill>
+            <a:srgbClr val="E6E5B8"/>
+          </a:solidFill>
+          <a:ln>
+            <a:noFill/>
+          </a:ln>
+        </p:spPr>
+        <p:style>
+          <a:lnRef idx="2">
+            <a:schemeClr val="accent1">
+              <a:shade val="15000"/>
+            </a:schemeClr>
+          </a:lnRef>
+          <a:fillRef idx="1">
+            <a:schemeClr val="accent1"/>
+          </a:fillRef>
+          <a:effectRef idx="0">
+            <a:schemeClr val="accent1"/>
+          </a:effectRef>
+          <a:fontRef idx="minor">
+            <a:schemeClr val="lt1"/>
+          </a:fontRef>
+        </p:style>
+        <p:txBody>
+          <a:bodyPr rtlCol="0" anchor="ctr"/>
+          <a:lstStyle/>
+          <a:p>
+            <a:pPr algn="ctr"/>
+            <a:endParaRPr lang="zh-CN" altLang="en-US"/>
+          </a:p>
+        </p:txBody>
+      </p:sp>
+      <p:sp>
+        <p:nvSpPr>
+          <p:cNvPr id="63" name="Rectangle 62">
+            <a:extLst>
+              <a:ext uri="{FF2B5EF4-FFF2-40B4-BE49-F238E27FC236}">
+                <a16:creationId xmlns:a16="http://schemas.microsoft.com/office/drawing/2014/main" id="{2D401152-9B3E-447A-7BFB-27D184492318}"/>
+              </a:ext>
+            </a:extLst>
+          </p:cNvPr>
+          <p:cNvSpPr/>
+          <p:nvPr/>
+        </p:nvSpPr>
+        <p:spPr>
+          <a:xfrm>
+            <a:off x="2836170" y="262406"/>
+            <a:ext cx="368391" cy="314528"/>
+          </a:xfrm>
+          <a:prstGeom prst="rect">
+            <a:avLst/>
+          </a:prstGeom>
+          <a:solidFill>
+            <a:srgbClr val="819F85"/>
+          </a:solidFill>
+          <a:ln>
+            <a:noFill/>
+          </a:ln>
+        </p:spPr>
+        <p:style>
+          <a:lnRef idx="2">
+            <a:schemeClr val="accent1">
+              <a:shade val="15000"/>
+            </a:schemeClr>
+          </a:lnRef>
+          <a:fillRef idx="1">
+            <a:schemeClr val="accent1"/>
+          </a:fillRef>
+          <a:effectRef idx="0">
+            <a:schemeClr val="accent1"/>
+          </a:effectRef>
+          <a:fontRef idx="minor">
+            <a:schemeClr val="lt1"/>
+          </a:fontRef>
+        </p:style>
+        <p:txBody>
+          <a:bodyPr rtlCol="0" anchor="ctr"/>
+          <a:lstStyle/>
+          <a:p>
+            <a:pPr algn="ctr"/>
+            <a:endParaRPr lang="zh-CN" altLang="en-US"/>
+          </a:p>
+        </p:txBody>
+      </p:sp>
     </p:spTree>
     <p:extLst>
       <p:ext uri="{BB962C8B-B14F-4D97-AF65-F5344CB8AC3E}">
         <p14:creationId xmlns:p14="http://schemas.microsoft.com/office/powerpoint/2010/main" val="741609843"/>
+      </p:ext>
+    </p:extLst>
+  </p:cSld>
+  <p:clrMapOvr>
+    <a:masterClrMapping/>
+  </p:clrMapOvr>
+</p:sld>
+</file>
+
+<file path=ppt/slides/slide2.xml><?xml version="1.0" encoding="utf-8"?>
+<p:sld xmlns:a="http://schemas.openxmlformats.org/drawingml/2006/main" xmlns:r="http://schemas.openxmlformats.org/officeDocument/2006/relationships" xmlns:p="http://schemas.openxmlformats.org/presentationml/2006/main">
+  <p:cSld>
+    <p:spTree>
+      <p:nvGrpSpPr>
+        <p:cNvPr id="1" name=""/>
+        <p:cNvGrpSpPr/>
+        <p:nvPr/>
+      </p:nvGrpSpPr>
+      <p:grpSpPr>
+        <a:xfrm>
+          <a:off x="0" y="0"/>
+          <a:ext cx="0" cy="0"/>
+          <a:chOff x="0" y="0"/>
+          <a:chExt cx="0" cy="0"/>
+        </a:xfrm>
+      </p:grpSpPr>
+      <p:grpSp>
+        <p:nvGrpSpPr>
+          <p:cNvPr id="76" name="Group 75">
+            <a:extLst>
+              <a:ext uri="{FF2B5EF4-FFF2-40B4-BE49-F238E27FC236}">
+                <a16:creationId xmlns:a16="http://schemas.microsoft.com/office/drawing/2014/main" id="{BBEE4E21-D465-7DC5-546A-0B3470212923}"/>
+              </a:ext>
+            </a:extLst>
+          </p:cNvPr>
+          <p:cNvGrpSpPr/>
+          <p:nvPr/>
+        </p:nvGrpSpPr>
+        <p:grpSpPr>
+          <a:xfrm>
+            <a:off x="1359642" y="614376"/>
+            <a:ext cx="10109011" cy="833382"/>
+            <a:chOff x="874734" y="420412"/>
+            <a:chExt cx="10109011" cy="833382"/>
+          </a:xfrm>
+        </p:grpSpPr>
+        <p:pic>
+          <p:nvPicPr>
+            <p:cNvPr id="13" name="Picture 12" descr="A black and grey cityscape&#10;&#10;AI-generated content may be incorrect.">
+              <a:extLst>
+                <a:ext uri="{FF2B5EF4-FFF2-40B4-BE49-F238E27FC236}">
+                  <a16:creationId xmlns:a16="http://schemas.microsoft.com/office/drawing/2014/main" id="{30D9DEF3-406C-D1C1-1A16-38E3571AB4A3}"/>
+                </a:ext>
+              </a:extLst>
+            </p:cNvPr>
+            <p:cNvPicPr>
+              <a:picLocks noChangeAspect="1"/>
+            </p:cNvPicPr>
+            <p:nvPr/>
+          </p:nvPicPr>
+          <p:blipFill>
+            <a:blip r:embed="rId2">
+              <a:extLst>
+                <a:ext uri="{28A0092B-C50C-407E-A947-70E740481C1C}">
+                  <a14:useLocalDpi xmlns:a14="http://schemas.microsoft.com/office/drawing/2010/main" val="0"/>
+                </a:ext>
+              </a:extLst>
+            </a:blip>
+            <a:stretch>
+              <a:fillRect/>
+            </a:stretch>
+          </p:blipFill>
+          <p:spPr>
+            <a:xfrm>
+              <a:off x="874734" y="425637"/>
+              <a:ext cx="2008999" cy="822932"/>
+            </a:xfrm>
+            <a:prstGeom prst="rect">
+              <a:avLst/>
+            </a:prstGeom>
+          </p:spPr>
+        </p:pic>
+        <p:pic>
+          <p:nvPicPr>
+            <p:cNvPr id="15" name="Picture 14" descr="A black background with a black and grey cityscape&#10;&#10;AI-generated content may be incorrect.">
+              <a:extLst>
+                <a:ext uri="{FF2B5EF4-FFF2-40B4-BE49-F238E27FC236}">
+                  <a16:creationId xmlns:a16="http://schemas.microsoft.com/office/drawing/2014/main" id="{FD7C5DDD-5F8D-3735-E4B1-A047BE66A815}"/>
+                </a:ext>
+              </a:extLst>
+            </p:cNvPr>
+            <p:cNvPicPr>
+              <a:picLocks noChangeAspect="1"/>
+            </p:cNvPicPr>
+            <p:nvPr/>
+          </p:nvPicPr>
+          <p:blipFill>
+            <a:blip r:embed="rId3">
+              <a:extLst>
+                <a:ext uri="{28A0092B-C50C-407E-A947-70E740481C1C}">
+                  <a14:useLocalDpi xmlns:a14="http://schemas.microsoft.com/office/drawing/2010/main" val="0"/>
+                </a:ext>
+              </a:extLst>
+            </a:blip>
+            <a:stretch>
+              <a:fillRect/>
+            </a:stretch>
+          </p:blipFill>
+          <p:spPr>
+            <a:xfrm>
+              <a:off x="2932393" y="425637"/>
+              <a:ext cx="2008999" cy="822932"/>
+            </a:xfrm>
+            <a:prstGeom prst="rect">
+              <a:avLst/>
+            </a:prstGeom>
+          </p:spPr>
+        </p:pic>
+        <p:pic>
+          <p:nvPicPr>
+            <p:cNvPr id="17" name="Picture 16" descr="A graphic of a city&#10;&#10;AI-generated content may be incorrect.">
+              <a:extLst>
+                <a:ext uri="{FF2B5EF4-FFF2-40B4-BE49-F238E27FC236}">
+                  <a16:creationId xmlns:a16="http://schemas.microsoft.com/office/drawing/2014/main" id="{2FAA4A9A-4205-8F05-8A3E-E3F4D9F9077F}"/>
+                </a:ext>
+              </a:extLst>
+            </p:cNvPr>
+            <p:cNvPicPr>
+              <a:picLocks noChangeAspect="1"/>
+            </p:cNvPicPr>
+            <p:nvPr/>
+          </p:nvPicPr>
+          <p:blipFill>
+            <a:blip r:embed="rId4">
+              <a:extLst>
+                <a:ext uri="{28A0092B-C50C-407E-A947-70E740481C1C}">
+                  <a14:useLocalDpi xmlns:a14="http://schemas.microsoft.com/office/drawing/2010/main" val="0"/>
+                </a:ext>
+              </a:extLst>
+            </a:blip>
+            <a:stretch>
+              <a:fillRect/>
+            </a:stretch>
+          </p:blipFill>
+          <p:spPr>
+            <a:xfrm>
+              <a:off x="4945566" y="420412"/>
+              <a:ext cx="2008999" cy="833382"/>
+            </a:xfrm>
+            <a:prstGeom prst="rect">
+              <a:avLst/>
+            </a:prstGeom>
+          </p:spPr>
+        </p:pic>
+        <p:pic>
+          <p:nvPicPr>
+            <p:cNvPr id="19" name="Picture 18" descr="A black and grey cityscape&#10;&#10;AI-generated content may be incorrect.">
+              <a:extLst>
+                <a:ext uri="{FF2B5EF4-FFF2-40B4-BE49-F238E27FC236}">
+                  <a16:creationId xmlns:a16="http://schemas.microsoft.com/office/drawing/2014/main" id="{5FDB316B-E583-4D34-FE83-2D2C1C84035A}"/>
+                </a:ext>
+              </a:extLst>
+            </p:cNvPr>
+            <p:cNvPicPr>
+              <a:picLocks noChangeAspect="1"/>
+            </p:cNvPicPr>
+            <p:nvPr/>
+          </p:nvPicPr>
+          <p:blipFill>
+            <a:blip r:embed="rId5">
+              <a:extLst>
+                <a:ext uri="{28A0092B-C50C-407E-A947-70E740481C1C}">
+                  <a14:useLocalDpi xmlns:a14="http://schemas.microsoft.com/office/drawing/2010/main" val="0"/>
+                </a:ext>
+              </a:extLst>
+            </a:blip>
+            <a:stretch>
+              <a:fillRect/>
+            </a:stretch>
+          </p:blipFill>
+          <p:spPr>
+            <a:xfrm>
+              <a:off x="7017780" y="425637"/>
+              <a:ext cx="2008999" cy="822932"/>
+            </a:xfrm>
+            <a:prstGeom prst="rect">
+              <a:avLst/>
+            </a:prstGeom>
+          </p:spPr>
+        </p:pic>
+        <p:pic>
+          <p:nvPicPr>
+            <p:cNvPr id="21" name="Picture 20" descr="A black and grey background with squares&#10;&#10;AI-generated content may be incorrect.">
+              <a:extLst>
+                <a:ext uri="{FF2B5EF4-FFF2-40B4-BE49-F238E27FC236}">
+                  <a16:creationId xmlns:a16="http://schemas.microsoft.com/office/drawing/2014/main" id="{FABBC2FB-C7E8-0500-22B1-03ACA5A64146}"/>
+                </a:ext>
+              </a:extLst>
+            </p:cNvPr>
+            <p:cNvPicPr>
+              <a:picLocks noChangeAspect="1"/>
+            </p:cNvPicPr>
+            <p:nvPr/>
+          </p:nvPicPr>
+          <p:blipFill>
+            <a:blip r:embed="rId6">
+              <a:extLst>
+                <a:ext uri="{28A0092B-C50C-407E-A947-70E740481C1C}">
+                  <a14:useLocalDpi xmlns:a14="http://schemas.microsoft.com/office/drawing/2010/main" val="0"/>
+                </a:ext>
+              </a:extLst>
+            </a:blip>
+            <a:stretch>
+              <a:fillRect/>
+            </a:stretch>
+          </p:blipFill>
+          <p:spPr>
+            <a:xfrm>
+              <a:off x="9079246" y="425637"/>
+              <a:ext cx="1904499" cy="822932"/>
+            </a:xfrm>
+            <a:prstGeom prst="rect">
+              <a:avLst/>
+            </a:prstGeom>
+          </p:spPr>
+        </p:pic>
+      </p:grpSp>
+      <p:grpSp>
+        <p:nvGrpSpPr>
+          <p:cNvPr id="77" name="Group 76">
+            <a:extLst>
+              <a:ext uri="{FF2B5EF4-FFF2-40B4-BE49-F238E27FC236}">
+                <a16:creationId xmlns:a16="http://schemas.microsoft.com/office/drawing/2014/main" id="{2B129C65-4532-5FAB-7B5D-ABE7211FC0BB}"/>
+              </a:ext>
+            </a:extLst>
+          </p:cNvPr>
+          <p:cNvGrpSpPr/>
+          <p:nvPr/>
+        </p:nvGrpSpPr>
+        <p:grpSpPr>
+          <a:xfrm>
+            <a:off x="1415148" y="1619303"/>
+            <a:ext cx="10042907" cy="822932"/>
+            <a:chOff x="926984" y="1719253"/>
+            <a:chExt cx="10042907" cy="822932"/>
+          </a:xfrm>
+        </p:grpSpPr>
+        <p:pic>
+          <p:nvPicPr>
+            <p:cNvPr id="37" name="Picture 36" descr="A city skyline with many towers&#10;&#10;AI-generated content may be incorrect.">
+              <a:extLst>
+                <a:ext uri="{FF2B5EF4-FFF2-40B4-BE49-F238E27FC236}">
+                  <a16:creationId xmlns:a16="http://schemas.microsoft.com/office/drawing/2014/main" id="{D50E6E4A-75A5-F343-C348-F77C7658859B}"/>
+                </a:ext>
+              </a:extLst>
+            </p:cNvPr>
+            <p:cNvPicPr>
+              <a:picLocks noChangeAspect="1"/>
+            </p:cNvPicPr>
+            <p:nvPr/>
+          </p:nvPicPr>
+          <p:blipFill>
+            <a:blip r:embed="rId7">
+              <a:extLst>
+                <a:ext uri="{28A0092B-C50C-407E-A947-70E740481C1C}">
+                  <a14:useLocalDpi xmlns:a14="http://schemas.microsoft.com/office/drawing/2010/main" val="0"/>
+                </a:ext>
+              </a:extLst>
+            </a:blip>
+            <a:stretch>
+              <a:fillRect/>
+            </a:stretch>
+          </p:blipFill>
+          <p:spPr>
+            <a:xfrm>
+              <a:off x="926984" y="1719253"/>
+              <a:ext cx="1904499" cy="822932"/>
+            </a:xfrm>
+            <a:prstGeom prst="rect">
+              <a:avLst/>
+            </a:prstGeom>
+          </p:spPr>
+        </p:pic>
+        <p:pic>
+          <p:nvPicPr>
+            <p:cNvPr id="39" name="Picture 38" descr="A black background with white lines&#10;&#10;AI-generated content may be incorrect.">
+              <a:extLst>
+                <a:ext uri="{FF2B5EF4-FFF2-40B4-BE49-F238E27FC236}">
+                  <a16:creationId xmlns:a16="http://schemas.microsoft.com/office/drawing/2014/main" id="{1A2E2453-B759-113D-9471-80981970025A}"/>
+                </a:ext>
+              </a:extLst>
+            </p:cNvPr>
+            <p:cNvPicPr>
+              <a:picLocks noChangeAspect="1"/>
+            </p:cNvPicPr>
+            <p:nvPr/>
+          </p:nvPicPr>
+          <p:blipFill>
+            <a:blip r:embed="rId8">
+              <a:extLst>
+                <a:ext uri="{28A0092B-C50C-407E-A947-70E740481C1C}">
+                  <a14:useLocalDpi xmlns:a14="http://schemas.microsoft.com/office/drawing/2010/main" val="0"/>
+                </a:ext>
+              </a:extLst>
+            </a:blip>
+            <a:stretch>
+              <a:fillRect/>
+            </a:stretch>
+          </p:blipFill>
+          <p:spPr>
+            <a:xfrm>
+              <a:off x="2984643" y="1719253"/>
+              <a:ext cx="1904499" cy="822932"/>
+            </a:xfrm>
+            <a:prstGeom prst="rect">
+              <a:avLst/>
+            </a:prstGeom>
+          </p:spPr>
+        </p:pic>
+        <p:pic>
+          <p:nvPicPr>
+            <p:cNvPr id="41" name="Picture 40" descr="A black and white city skyline&#10;&#10;AI-generated content may be incorrect.">
+              <a:extLst>
+                <a:ext uri="{FF2B5EF4-FFF2-40B4-BE49-F238E27FC236}">
+                  <a16:creationId xmlns:a16="http://schemas.microsoft.com/office/drawing/2014/main" id="{EC20899F-A5E6-0224-9E05-E3D0824FE8DE}"/>
+                </a:ext>
+              </a:extLst>
+            </p:cNvPr>
+            <p:cNvPicPr>
+              <a:picLocks noChangeAspect="1"/>
+            </p:cNvPicPr>
+            <p:nvPr/>
+          </p:nvPicPr>
+          <p:blipFill>
+            <a:blip r:embed="rId9">
+              <a:extLst>
+                <a:ext uri="{28A0092B-C50C-407E-A947-70E740481C1C}">
+                  <a14:useLocalDpi xmlns:a14="http://schemas.microsoft.com/office/drawing/2010/main" val="0"/>
+                </a:ext>
+              </a:extLst>
+            </a:blip>
+            <a:stretch>
+              <a:fillRect/>
+            </a:stretch>
+          </p:blipFill>
+          <p:spPr>
+            <a:xfrm>
+              <a:off x="5004743" y="1719253"/>
+              <a:ext cx="1904499" cy="822932"/>
+            </a:xfrm>
+            <a:prstGeom prst="rect">
+              <a:avLst/>
+            </a:prstGeom>
+          </p:spPr>
+        </p:pic>
+        <p:pic>
+          <p:nvPicPr>
+            <p:cNvPr id="43" name="Picture 42" descr="A black and white city skyline&#10;&#10;AI-generated content may be incorrect.">
+              <a:extLst>
+                <a:ext uri="{FF2B5EF4-FFF2-40B4-BE49-F238E27FC236}">
+                  <a16:creationId xmlns:a16="http://schemas.microsoft.com/office/drawing/2014/main" id="{202ECCA0-4768-CC04-C96F-9077970881E9}"/>
+                </a:ext>
+              </a:extLst>
+            </p:cNvPr>
+            <p:cNvPicPr>
+              <a:picLocks noChangeAspect="1"/>
+            </p:cNvPicPr>
+            <p:nvPr/>
+          </p:nvPicPr>
+          <p:blipFill>
+            <a:blip r:embed="rId10">
+              <a:extLst>
+                <a:ext uri="{28A0092B-C50C-407E-A947-70E740481C1C}">
+                  <a14:useLocalDpi xmlns:a14="http://schemas.microsoft.com/office/drawing/2010/main" val="0"/>
+                </a:ext>
+              </a:extLst>
+            </a:blip>
+            <a:stretch>
+              <a:fillRect/>
+            </a:stretch>
+          </p:blipFill>
+          <p:spPr>
+            <a:xfrm>
+              <a:off x="7003926" y="1719253"/>
+              <a:ext cx="2008999" cy="822932"/>
+            </a:xfrm>
+            <a:prstGeom prst="rect">
+              <a:avLst/>
+            </a:prstGeom>
+          </p:spPr>
+        </p:pic>
+        <p:pic>
+          <p:nvPicPr>
+            <p:cNvPr id="45" name="Picture 44" descr="A black and white image of a city&#10;&#10;AI-generated content may be incorrect.">
+              <a:extLst>
+                <a:ext uri="{FF2B5EF4-FFF2-40B4-BE49-F238E27FC236}">
+                  <a16:creationId xmlns:a16="http://schemas.microsoft.com/office/drawing/2014/main" id="{A6B20050-0AF3-E541-E2D3-667D27CFA603}"/>
+                </a:ext>
+              </a:extLst>
+            </p:cNvPr>
+            <p:cNvPicPr>
+              <a:picLocks noChangeAspect="1"/>
+            </p:cNvPicPr>
+            <p:nvPr/>
+          </p:nvPicPr>
+          <p:blipFill>
+            <a:blip r:embed="rId11">
+              <a:extLst>
+                <a:ext uri="{28A0092B-C50C-407E-A947-70E740481C1C}">
+                  <a14:useLocalDpi xmlns:a14="http://schemas.microsoft.com/office/drawing/2010/main" val="0"/>
+                </a:ext>
+              </a:extLst>
+            </a:blip>
+            <a:stretch>
+              <a:fillRect/>
+            </a:stretch>
+          </p:blipFill>
+          <p:spPr>
+            <a:xfrm>
+              <a:off x="9065392" y="1719253"/>
+              <a:ext cx="1904499" cy="822932"/>
+            </a:xfrm>
+            <a:prstGeom prst="rect">
+              <a:avLst/>
+            </a:prstGeom>
+          </p:spPr>
+        </p:pic>
+      </p:grpSp>
+      <p:grpSp>
+        <p:nvGrpSpPr>
+          <p:cNvPr id="78" name="Group 77">
+            <a:extLst>
+              <a:ext uri="{FF2B5EF4-FFF2-40B4-BE49-F238E27FC236}">
+                <a16:creationId xmlns:a16="http://schemas.microsoft.com/office/drawing/2014/main" id="{AB3C887E-A39E-A239-097A-8388EF0F51E0}"/>
+              </a:ext>
+            </a:extLst>
+          </p:cNvPr>
+          <p:cNvGrpSpPr/>
+          <p:nvPr/>
+        </p:nvGrpSpPr>
+        <p:grpSpPr>
+          <a:xfrm>
+            <a:off x="1422074" y="2613780"/>
+            <a:ext cx="10046163" cy="833382"/>
+            <a:chOff x="926984" y="2996903"/>
+            <a:chExt cx="10046163" cy="833382"/>
+          </a:xfrm>
+        </p:grpSpPr>
+        <p:pic>
+          <p:nvPicPr>
+            <p:cNvPr id="47" name="Picture 46" descr="A black and white image of a city&#10;&#10;AI-generated content may be incorrect.">
+              <a:extLst>
+                <a:ext uri="{FF2B5EF4-FFF2-40B4-BE49-F238E27FC236}">
+                  <a16:creationId xmlns:a16="http://schemas.microsoft.com/office/drawing/2014/main" id="{1E50E02D-9E03-DDEC-1BE7-4FF1A9024904}"/>
+                </a:ext>
+              </a:extLst>
+            </p:cNvPr>
+            <p:cNvPicPr>
+              <a:picLocks noChangeAspect="1"/>
+            </p:cNvPicPr>
+            <p:nvPr/>
+          </p:nvPicPr>
+          <p:blipFill>
+            <a:blip r:embed="rId12">
+              <a:extLst>
+                <a:ext uri="{28A0092B-C50C-407E-A947-70E740481C1C}">
+                  <a14:useLocalDpi xmlns:a14="http://schemas.microsoft.com/office/drawing/2010/main" val="0"/>
+                </a:ext>
+              </a:extLst>
+            </a:blip>
+            <a:stretch>
+              <a:fillRect/>
+            </a:stretch>
+          </p:blipFill>
+          <p:spPr>
+            <a:xfrm>
+              <a:off x="9068648" y="3002128"/>
+              <a:ext cx="1904499" cy="822932"/>
+            </a:xfrm>
+            <a:prstGeom prst="rect">
+              <a:avLst/>
+            </a:prstGeom>
+          </p:spPr>
+        </p:pic>
+        <p:pic>
+          <p:nvPicPr>
+            <p:cNvPr id="49" name="Picture 48" descr="A black and white image of a city&#10;&#10;AI-generated content may be incorrect.">
+              <a:extLst>
+                <a:ext uri="{FF2B5EF4-FFF2-40B4-BE49-F238E27FC236}">
+                  <a16:creationId xmlns:a16="http://schemas.microsoft.com/office/drawing/2014/main" id="{144AC50B-A64B-8AA6-6E16-92E1D483A702}"/>
+                </a:ext>
+              </a:extLst>
+            </p:cNvPr>
+            <p:cNvPicPr>
+              <a:picLocks noChangeAspect="1"/>
+            </p:cNvPicPr>
+            <p:nvPr/>
+          </p:nvPicPr>
+          <p:blipFill>
+            <a:blip r:embed="rId13">
+              <a:extLst>
+                <a:ext uri="{28A0092B-C50C-407E-A947-70E740481C1C}">
+                  <a14:useLocalDpi xmlns:a14="http://schemas.microsoft.com/office/drawing/2010/main" val="0"/>
+                </a:ext>
+              </a:extLst>
+            </a:blip>
+            <a:stretch>
+              <a:fillRect/>
+            </a:stretch>
+          </p:blipFill>
+          <p:spPr>
+            <a:xfrm>
+              <a:off x="7010853" y="3002128"/>
+              <a:ext cx="1904499" cy="822932"/>
+            </a:xfrm>
+            <a:prstGeom prst="rect">
+              <a:avLst/>
+            </a:prstGeom>
+          </p:spPr>
+        </p:pic>
+        <p:pic>
+          <p:nvPicPr>
+            <p:cNvPr id="51" name="Picture 50" descr="A black background with a city skyline&#10;&#10;AI-generated content may be incorrect.">
+              <a:extLst>
+                <a:ext uri="{FF2B5EF4-FFF2-40B4-BE49-F238E27FC236}">
+                  <a16:creationId xmlns:a16="http://schemas.microsoft.com/office/drawing/2014/main" id="{0E85BC26-D177-FDF3-D7C3-288546BEAB21}"/>
+                </a:ext>
+              </a:extLst>
+            </p:cNvPr>
+            <p:cNvPicPr>
+              <a:picLocks noChangeAspect="1"/>
+            </p:cNvPicPr>
+            <p:nvPr/>
+          </p:nvPicPr>
+          <p:blipFill>
+            <a:blip r:embed="rId14">
+              <a:extLst>
+                <a:ext uri="{28A0092B-C50C-407E-A947-70E740481C1C}">
+                  <a14:useLocalDpi xmlns:a14="http://schemas.microsoft.com/office/drawing/2010/main" val="0"/>
+                </a:ext>
+              </a:extLst>
+            </a:blip>
+            <a:stretch>
+              <a:fillRect/>
+            </a:stretch>
+          </p:blipFill>
+          <p:spPr>
+            <a:xfrm>
+              <a:off x="4938639" y="2996903"/>
+              <a:ext cx="2008999" cy="833382"/>
+            </a:xfrm>
+            <a:prstGeom prst="rect">
+              <a:avLst/>
+            </a:prstGeom>
+          </p:spPr>
+        </p:pic>
+        <p:pic>
+          <p:nvPicPr>
+            <p:cNvPr id="53" name="Picture 52" descr="A grey and black city skyline&#10;&#10;AI-generated content may be incorrect.">
+              <a:extLst>
+                <a:ext uri="{FF2B5EF4-FFF2-40B4-BE49-F238E27FC236}">
+                  <a16:creationId xmlns:a16="http://schemas.microsoft.com/office/drawing/2014/main" id="{1F76966A-AF9C-A227-2BEB-A4FC8B702B89}"/>
+                </a:ext>
+              </a:extLst>
+            </p:cNvPr>
+            <p:cNvPicPr>
+              <a:picLocks noChangeAspect="1"/>
+            </p:cNvPicPr>
+            <p:nvPr/>
+          </p:nvPicPr>
+          <p:blipFill>
+            <a:blip r:embed="rId15">
+              <a:extLst>
+                <a:ext uri="{28A0092B-C50C-407E-A947-70E740481C1C}">
+                  <a14:useLocalDpi xmlns:a14="http://schemas.microsoft.com/office/drawing/2010/main" val="0"/>
+                </a:ext>
+              </a:extLst>
+            </a:blip>
+            <a:stretch>
+              <a:fillRect/>
+            </a:stretch>
+          </p:blipFill>
+          <p:spPr>
+            <a:xfrm>
+              <a:off x="2984643" y="3002128"/>
+              <a:ext cx="1904499" cy="822932"/>
+            </a:xfrm>
+            <a:prstGeom prst="rect">
+              <a:avLst/>
+            </a:prstGeom>
+          </p:spPr>
+        </p:pic>
+        <p:pic>
+          <p:nvPicPr>
+            <p:cNvPr id="55" name="Picture 54" descr="A grey and white city skyline&#10;&#10;AI-generated content may be incorrect.">
+              <a:extLst>
+                <a:ext uri="{FF2B5EF4-FFF2-40B4-BE49-F238E27FC236}">
+                  <a16:creationId xmlns:a16="http://schemas.microsoft.com/office/drawing/2014/main" id="{8DE26751-1830-D011-E9C9-5F4087BCF1C3}"/>
+                </a:ext>
+              </a:extLst>
+            </p:cNvPr>
+            <p:cNvPicPr>
+              <a:picLocks noChangeAspect="1"/>
+            </p:cNvPicPr>
+            <p:nvPr/>
+          </p:nvPicPr>
+          <p:blipFill>
+            <a:blip r:embed="rId16">
+              <a:extLst>
+                <a:ext uri="{28A0092B-C50C-407E-A947-70E740481C1C}">
+                  <a14:useLocalDpi xmlns:a14="http://schemas.microsoft.com/office/drawing/2010/main" val="0"/>
+                </a:ext>
+              </a:extLst>
+            </a:blip>
+            <a:stretch>
+              <a:fillRect/>
+            </a:stretch>
+          </p:blipFill>
+          <p:spPr>
+            <a:xfrm>
+              <a:off x="926984" y="3002128"/>
+              <a:ext cx="1904499" cy="822932"/>
+            </a:xfrm>
+            <a:prstGeom prst="rect">
+              <a:avLst/>
+            </a:prstGeom>
+          </p:spPr>
+        </p:pic>
+      </p:grpSp>
+      <p:grpSp>
+        <p:nvGrpSpPr>
+          <p:cNvPr id="79" name="Group 78">
+            <a:extLst>
+              <a:ext uri="{FF2B5EF4-FFF2-40B4-BE49-F238E27FC236}">
+                <a16:creationId xmlns:a16="http://schemas.microsoft.com/office/drawing/2014/main" id="{210D8CED-ABBC-EC98-0CE8-784B6C6BEB8A}"/>
+              </a:ext>
+            </a:extLst>
+          </p:cNvPr>
+          <p:cNvGrpSpPr/>
+          <p:nvPr/>
+        </p:nvGrpSpPr>
+        <p:grpSpPr>
+          <a:xfrm>
+            <a:off x="1423408" y="3584068"/>
+            <a:ext cx="10154334" cy="838607"/>
+            <a:chOff x="926984" y="4287761"/>
+            <a:chExt cx="10154334" cy="838607"/>
+          </a:xfrm>
+        </p:grpSpPr>
+        <p:pic>
+          <p:nvPicPr>
+            <p:cNvPr id="57" name="Picture 56" descr="A black background with a green city skyline&#10;&#10;AI-generated content may be incorrect.">
+              <a:extLst>
+                <a:ext uri="{FF2B5EF4-FFF2-40B4-BE49-F238E27FC236}">
+                  <a16:creationId xmlns:a16="http://schemas.microsoft.com/office/drawing/2014/main" id="{DC46AAC1-D761-DE5F-995C-1943A75161C7}"/>
+                </a:ext>
+              </a:extLst>
+            </p:cNvPr>
+            <p:cNvPicPr>
+              <a:picLocks noChangeAspect="1"/>
+            </p:cNvPicPr>
+            <p:nvPr/>
+          </p:nvPicPr>
+          <p:blipFill>
+            <a:blip r:embed="rId17">
+              <a:extLst>
+                <a:ext uri="{28A0092B-C50C-407E-A947-70E740481C1C}">
+                  <a14:useLocalDpi xmlns:a14="http://schemas.microsoft.com/office/drawing/2010/main" val="0"/>
+                </a:ext>
+              </a:extLst>
+            </a:blip>
+            <a:stretch>
+              <a:fillRect/>
+            </a:stretch>
+          </p:blipFill>
+          <p:spPr>
+            <a:xfrm>
+              <a:off x="9072319" y="4295598"/>
+              <a:ext cx="2008999" cy="822932"/>
+            </a:xfrm>
+            <a:prstGeom prst="rect">
+              <a:avLst/>
+            </a:prstGeom>
+          </p:spPr>
+        </p:pic>
+        <p:pic>
+          <p:nvPicPr>
+            <p:cNvPr id="59" name="Picture 58" descr="A green city skyline with black background&#10;&#10;AI-generated content may be incorrect.">
+              <a:extLst>
+                <a:ext uri="{FF2B5EF4-FFF2-40B4-BE49-F238E27FC236}">
+                  <a16:creationId xmlns:a16="http://schemas.microsoft.com/office/drawing/2014/main" id="{35BD7E24-98DC-7382-F0A6-EF37A3715B20}"/>
+                </a:ext>
+              </a:extLst>
+            </p:cNvPr>
+            <p:cNvPicPr>
+              <a:picLocks noChangeAspect="1"/>
+            </p:cNvPicPr>
+            <p:nvPr/>
+          </p:nvPicPr>
+          <p:blipFill>
+            <a:blip r:embed="rId18">
+              <a:extLst>
+                <a:ext uri="{28A0092B-C50C-407E-A947-70E740481C1C}">
+                  <a14:useLocalDpi xmlns:a14="http://schemas.microsoft.com/office/drawing/2010/main" val="0"/>
+                </a:ext>
+              </a:extLst>
+            </a:blip>
+            <a:stretch>
+              <a:fillRect/>
+            </a:stretch>
+          </p:blipFill>
+          <p:spPr>
+            <a:xfrm>
+              <a:off x="7010853" y="4295598"/>
+              <a:ext cx="2008999" cy="822932"/>
+            </a:xfrm>
+            <a:prstGeom prst="rect">
+              <a:avLst/>
+            </a:prstGeom>
+          </p:spPr>
+        </p:pic>
+        <p:pic>
+          <p:nvPicPr>
+            <p:cNvPr id="61" name="Picture 60" descr="A black and green background with a black background&#10;&#10;AI-generated content may be incorrect.">
+              <a:extLst>
+                <a:ext uri="{FF2B5EF4-FFF2-40B4-BE49-F238E27FC236}">
+                  <a16:creationId xmlns:a16="http://schemas.microsoft.com/office/drawing/2014/main" id="{DD1426A9-476B-FF93-243D-01880C871BEF}"/>
+                </a:ext>
+              </a:extLst>
+            </p:cNvPr>
+            <p:cNvPicPr>
+              <a:picLocks noChangeAspect="1"/>
+            </p:cNvPicPr>
+            <p:nvPr/>
+          </p:nvPicPr>
+          <p:blipFill>
+            <a:blip r:embed="rId19">
+              <a:extLst>
+                <a:ext uri="{28A0092B-C50C-407E-A947-70E740481C1C}">
+                  <a14:useLocalDpi xmlns:a14="http://schemas.microsoft.com/office/drawing/2010/main" val="0"/>
+                </a:ext>
+              </a:extLst>
+            </a:blip>
+            <a:stretch>
+              <a:fillRect/>
+            </a:stretch>
+          </p:blipFill>
+          <p:spPr>
+            <a:xfrm>
+              <a:off x="5004743" y="4287761"/>
+              <a:ext cx="2008999" cy="838607"/>
+            </a:xfrm>
+            <a:prstGeom prst="rect">
+              <a:avLst/>
+            </a:prstGeom>
+          </p:spPr>
+        </p:pic>
+        <p:pic>
+          <p:nvPicPr>
+            <p:cNvPr id="63" name="Picture 62" descr="A black background with green squares&#10;&#10;AI-generated content may be incorrect.">
+              <a:extLst>
+                <a:ext uri="{FF2B5EF4-FFF2-40B4-BE49-F238E27FC236}">
+                  <a16:creationId xmlns:a16="http://schemas.microsoft.com/office/drawing/2014/main" id="{BE8D1C3D-7B3A-AD42-C62F-1823E9B55284}"/>
+                </a:ext>
+              </a:extLst>
+            </p:cNvPr>
+            <p:cNvPicPr>
+              <a:picLocks noChangeAspect="1"/>
+            </p:cNvPicPr>
+            <p:nvPr/>
+          </p:nvPicPr>
+          <p:blipFill>
+            <a:blip r:embed="rId20">
+              <a:extLst>
+                <a:ext uri="{28A0092B-C50C-407E-A947-70E740481C1C}">
+                  <a14:useLocalDpi xmlns:a14="http://schemas.microsoft.com/office/drawing/2010/main" val="0"/>
+                </a:ext>
+              </a:extLst>
+            </a:blip>
+            <a:stretch>
+              <a:fillRect/>
+            </a:stretch>
+          </p:blipFill>
+          <p:spPr>
+            <a:xfrm>
+              <a:off x="2984643" y="4295598"/>
+              <a:ext cx="1904499" cy="822932"/>
+            </a:xfrm>
+            <a:prstGeom prst="rect">
+              <a:avLst/>
+            </a:prstGeom>
+          </p:spPr>
+        </p:pic>
+        <p:pic>
+          <p:nvPicPr>
+            <p:cNvPr id="65" name="Picture 64" descr="A black background with a city skyline&#10;&#10;AI-generated content may be incorrect.">
+              <a:extLst>
+                <a:ext uri="{FF2B5EF4-FFF2-40B4-BE49-F238E27FC236}">
+                  <a16:creationId xmlns:a16="http://schemas.microsoft.com/office/drawing/2014/main" id="{B6E45588-F270-83BC-CFA9-F863753BF93A}"/>
+                </a:ext>
+              </a:extLst>
+            </p:cNvPr>
+            <p:cNvPicPr>
+              <a:picLocks noChangeAspect="1"/>
+            </p:cNvPicPr>
+            <p:nvPr/>
+          </p:nvPicPr>
+          <p:blipFill>
+            <a:blip r:embed="rId21">
+              <a:extLst>
+                <a:ext uri="{28A0092B-C50C-407E-A947-70E740481C1C}">
+                  <a14:useLocalDpi xmlns:a14="http://schemas.microsoft.com/office/drawing/2010/main" val="0"/>
+                </a:ext>
+              </a:extLst>
+            </a:blip>
+            <a:stretch>
+              <a:fillRect/>
+            </a:stretch>
+          </p:blipFill>
+          <p:spPr>
+            <a:xfrm>
+              <a:off x="926984" y="4295598"/>
+              <a:ext cx="1904499" cy="822932"/>
+            </a:xfrm>
+            <a:prstGeom prst="rect">
+              <a:avLst/>
+            </a:prstGeom>
+          </p:spPr>
+        </p:pic>
+      </p:grpSp>
+      <p:grpSp>
+        <p:nvGrpSpPr>
+          <p:cNvPr id="80" name="Group 79">
+            <a:extLst>
+              <a:ext uri="{FF2B5EF4-FFF2-40B4-BE49-F238E27FC236}">
+                <a16:creationId xmlns:a16="http://schemas.microsoft.com/office/drawing/2014/main" id="{57AD1F47-D4C6-4232-3CB2-B4D97A465CCE}"/>
+              </a:ext>
+            </a:extLst>
+          </p:cNvPr>
+          <p:cNvGrpSpPr/>
+          <p:nvPr/>
+        </p:nvGrpSpPr>
+        <p:grpSpPr>
+          <a:xfrm>
+            <a:off x="1412866" y="4615005"/>
+            <a:ext cx="10044214" cy="822932"/>
+            <a:chOff x="925677" y="5568170"/>
+            <a:chExt cx="10044214" cy="822932"/>
+          </a:xfrm>
+        </p:grpSpPr>
+        <p:pic>
+          <p:nvPicPr>
+            <p:cNvPr id="67" name="Picture 66" descr="A green and black city skyline&#10;&#10;AI-generated content may be incorrect.">
+              <a:extLst>
+                <a:ext uri="{FF2B5EF4-FFF2-40B4-BE49-F238E27FC236}">
+                  <a16:creationId xmlns:a16="http://schemas.microsoft.com/office/drawing/2014/main" id="{0E01BFFD-170F-5EA5-7CB5-D27388FB54A6}"/>
+                </a:ext>
+              </a:extLst>
+            </p:cNvPr>
+            <p:cNvPicPr>
+              <a:picLocks noChangeAspect="1"/>
+            </p:cNvPicPr>
+            <p:nvPr/>
+          </p:nvPicPr>
+          <p:blipFill>
+            <a:blip r:embed="rId22">
+              <a:extLst>
+                <a:ext uri="{28A0092B-C50C-407E-A947-70E740481C1C}">
+                  <a14:useLocalDpi xmlns:a14="http://schemas.microsoft.com/office/drawing/2010/main" val="0"/>
+                </a:ext>
+              </a:extLst>
+            </a:blip>
+            <a:stretch>
+              <a:fillRect/>
+            </a:stretch>
+          </p:blipFill>
+          <p:spPr>
+            <a:xfrm>
+              <a:off x="9065392" y="5568170"/>
+              <a:ext cx="1904499" cy="822932"/>
+            </a:xfrm>
+            <a:prstGeom prst="rect">
+              <a:avLst/>
+            </a:prstGeom>
+          </p:spPr>
+        </p:pic>
+        <p:pic>
+          <p:nvPicPr>
+            <p:cNvPr id="69" name="Picture 68" descr="A green and black city skyline&#10;&#10;AI-generated content may be incorrect.">
+              <a:extLst>
+                <a:ext uri="{FF2B5EF4-FFF2-40B4-BE49-F238E27FC236}">
+                  <a16:creationId xmlns:a16="http://schemas.microsoft.com/office/drawing/2014/main" id="{E82731EE-2DB2-FF85-A39D-42E453C048A2}"/>
+                </a:ext>
+              </a:extLst>
+            </p:cNvPr>
+            <p:cNvPicPr>
+              <a:picLocks noChangeAspect="1"/>
+            </p:cNvPicPr>
+            <p:nvPr/>
+          </p:nvPicPr>
+          <p:blipFill>
+            <a:blip r:embed="rId23">
+              <a:extLst>
+                <a:ext uri="{28A0092B-C50C-407E-A947-70E740481C1C}">
+                  <a14:useLocalDpi xmlns:a14="http://schemas.microsoft.com/office/drawing/2010/main" val="0"/>
+                </a:ext>
+              </a:extLst>
+            </a:blip>
+            <a:stretch>
+              <a:fillRect/>
+            </a:stretch>
+          </p:blipFill>
+          <p:spPr>
+            <a:xfrm>
+              <a:off x="7010853" y="5568170"/>
+              <a:ext cx="1904499" cy="822932"/>
+            </a:xfrm>
+            <a:prstGeom prst="rect">
+              <a:avLst/>
+            </a:prstGeom>
+          </p:spPr>
+        </p:pic>
+        <p:pic>
+          <p:nvPicPr>
+            <p:cNvPr id="71" name="Picture 70" descr="A graphic of a city skyline&#10;&#10;AI-generated content may be incorrect.">
+              <a:extLst>
+                <a:ext uri="{FF2B5EF4-FFF2-40B4-BE49-F238E27FC236}">
+                  <a16:creationId xmlns:a16="http://schemas.microsoft.com/office/drawing/2014/main" id="{0EF7D99F-4658-6E01-BD39-F896FED6A61E}"/>
+                </a:ext>
+              </a:extLst>
+            </p:cNvPr>
+            <p:cNvPicPr>
+              <a:picLocks noChangeAspect="1"/>
+            </p:cNvPicPr>
+            <p:nvPr/>
+          </p:nvPicPr>
+          <p:blipFill>
+            <a:blip r:embed="rId24">
+              <a:extLst>
+                <a:ext uri="{28A0092B-C50C-407E-A947-70E740481C1C}">
+                  <a14:useLocalDpi xmlns:a14="http://schemas.microsoft.com/office/drawing/2010/main" val="0"/>
+                </a:ext>
+              </a:extLst>
+            </a:blip>
+            <a:stretch>
+              <a:fillRect/>
+            </a:stretch>
+          </p:blipFill>
+          <p:spPr>
+            <a:xfrm>
+              <a:off x="5004743" y="5568170"/>
+              <a:ext cx="1904499" cy="822932"/>
+            </a:xfrm>
+            <a:prstGeom prst="rect">
+              <a:avLst/>
+            </a:prstGeom>
+          </p:spPr>
+        </p:pic>
+        <p:pic>
+          <p:nvPicPr>
+            <p:cNvPr id="73" name="Picture 72" descr="A green city skyline with black background&#10;&#10;AI-generated content may be incorrect.">
+              <a:extLst>
+                <a:ext uri="{FF2B5EF4-FFF2-40B4-BE49-F238E27FC236}">
+                  <a16:creationId xmlns:a16="http://schemas.microsoft.com/office/drawing/2014/main" id="{78433D84-E8FE-0AEB-EDDB-389E8FE6885D}"/>
+                </a:ext>
+              </a:extLst>
+            </p:cNvPr>
+            <p:cNvPicPr>
+              <a:picLocks noChangeAspect="1"/>
+            </p:cNvPicPr>
+            <p:nvPr/>
+          </p:nvPicPr>
+          <p:blipFill>
+            <a:blip r:embed="rId25">
+              <a:extLst>
+                <a:ext uri="{28A0092B-C50C-407E-A947-70E740481C1C}">
+                  <a14:useLocalDpi xmlns:a14="http://schemas.microsoft.com/office/drawing/2010/main" val="0"/>
+                </a:ext>
+              </a:extLst>
+            </a:blip>
+            <a:stretch>
+              <a:fillRect/>
+            </a:stretch>
+          </p:blipFill>
+          <p:spPr>
+            <a:xfrm>
+              <a:off x="2984643" y="5568170"/>
+              <a:ext cx="1904499" cy="822932"/>
+            </a:xfrm>
+            <a:prstGeom prst="rect">
+              <a:avLst/>
+            </a:prstGeom>
+          </p:spPr>
+        </p:pic>
+        <p:pic>
+          <p:nvPicPr>
+            <p:cNvPr id="75" name="Picture 74" descr="A green and black sound wave&#10;&#10;AI-generated content may be incorrect.">
+              <a:extLst>
+                <a:ext uri="{FF2B5EF4-FFF2-40B4-BE49-F238E27FC236}">
+                  <a16:creationId xmlns:a16="http://schemas.microsoft.com/office/drawing/2014/main" id="{B2A02271-DF14-A42B-A152-CDDE5C84B9E3}"/>
+                </a:ext>
+              </a:extLst>
+            </p:cNvPr>
+            <p:cNvPicPr>
+              <a:picLocks noChangeAspect="1"/>
+            </p:cNvPicPr>
+            <p:nvPr/>
+          </p:nvPicPr>
+          <p:blipFill>
+            <a:blip r:embed="rId26">
+              <a:extLst>
+                <a:ext uri="{28A0092B-C50C-407E-A947-70E740481C1C}">
+                  <a14:useLocalDpi xmlns:a14="http://schemas.microsoft.com/office/drawing/2010/main" val="0"/>
+                </a:ext>
+              </a:extLst>
+            </a:blip>
+            <a:stretch>
+              <a:fillRect/>
+            </a:stretch>
+          </p:blipFill>
+          <p:spPr>
+            <a:xfrm>
+              <a:off x="925677" y="5568170"/>
+              <a:ext cx="1907112" cy="822932"/>
+            </a:xfrm>
+            <a:prstGeom prst="rect">
+              <a:avLst/>
+            </a:prstGeom>
+          </p:spPr>
+        </p:pic>
+      </p:grpSp>
+      <p:sp>
+        <p:nvSpPr>
+          <p:cNvPr id="82" name="TextBox 81">
+            <a:extLst>
+              <a:ext uri="{FF2B5EF4-FFF2-40B4-BE49-F238E27FC236}">
+                <a16:creationId xmlns:a16="http://schemas.microsoft.com/office/drawing/2014/main" id="{0001F0DA-F316-DFEE-B31B-602F542BDD59}"/>
+              </a:ext>
+            </a:extLst>
+          </p:cNvPr>
+          <p:cNvSpPr txBox="1"/>
+          <p:nvPr/>
+        </p:nvSpPr>
+        <p:spPr>
+          <a:xfrm rot="16200000">
+            <a:off x="837156" y="827913"/>
+            <a:ext cx="822931" cy="261610"/>
+          </a:xfrm>
+          <a:prstGeom prst="rect">
+            <a:avLst/>
+          </a:prstGeom>
+          <a:noFill/>
+        </p:spPr>
+        <p:txBody>
+          <a:bodyPr wrap="square" rtlCol="0" anchor="ctr">
+            <a:spAutoFit/>
+          </a:bodyPr>
+          <a:lstStyle/>
+          <a:p>
+            <a:pPr algn="ctr"/>
+            <a:r>
+              <a:rPr lang="en-US" altLang="zh-CN" sz="1100" dirty="0">
+                <a:latin typeface="Arial" panose="020B0604020202020204" pitchFamily="34" charset="0"/>
+                <a:cs typeface="Arial" panose="020B0604020202020204" pitchFamily="34" charset="0"/>
+              </a:rPr>
+              <a:t>Density</a:t>
+            </a:r>
+            <a:endParaRPr lang="zh-CN" altLang="en-US" sz="1100" dirty="0">
+              <a:latin typeface="Arial" panose="020B0604020202020204" pitchFamily="34" charset="0"/>
+              <a:cs typeface="Arial" panose="020B0604020202020204" pitchFamily="34" charset="0"/>
+            </a:endParaRPr>
+          </a:p>
+        </p:txBody>
+      </p:sp>
+      <p:sp>
+        <p:nvSpPr>
+          <p:cNvPr id="83" name="TextBox 82">
+            <a:extLst>
+              <a:ext uri="{FF2B5EF4-FFF2-40B4-BE49-F238E27FC236}">
+                <a16:creationId xmlns:a16="http://schemas.microsoft.com/office/drawing/2014/main" id="{EF9BFA0A-7C44-E5A6-3253-45B866E79814}"/>
+              </a:ext>
+            </a:extLst>
+          </p:cNvPr>
+          <p:cNvSpPr txBox="1"/>
+          <p:nvPr/>
+        </p:nvSpPr>
+        <p:spPr>
+          <a:xfrm rot="16200000">
+            <a:off x="837156" y="1827615"/>
+            <a:ext cx="822931" cy="261610"/>
+          </a:xfrm>
+          <a:prstGeom prst="rect">
+            <a:avLst/>
+          </a:prstGeom>
+          <a:noFill/>
+        </p:spPr>
+        <p:txBody>
+          <a:bodyPr wrap="square" rtlCol="0" anchor="ctr">
+            <a:spAutoFit/>
+          </a:bodyPr>
+          <a:lstStyle/>
+          <a:p>
+            <a:pPr algn="ctr"/>
+            <a:r>
+              <a:rPr lang="en-US" altLang="zh-CN" sz="1100" dirty="0">
+                <a:latin typeface="Arial" panose="020B0604020202020204" pitchFamily="34" charset="0"/>
+                <a:cs typeface="Arial" panose="020B0604020202020204" pitchFamily="34" charset="0"/>
+              </a:rPr>
+              <a:t>Density</a:t>
+            </a:r>
+            <a:endParaRPr lang="zh-CN" altLang="en-US" sz="1100" dirty="0">
+              <a:latin typeface="Arial" panose="020B0604020202020204" pitchFamily="34" charset="0"/>
+              <a:cs typeface="Arial" panose="020B0604020202020204" pitchFamily="34" charset="0"/>
+            </a:endParaRPr>
+          </a:p>
+        </p:txBody>
+      </p:sp>
+      <p:sp>
+        <p:nvSpPr>
+          <p:cNvPr id="84" name="TextBox 83">
+            <a:extLst>
+              <a:ext uri="{FF2B5EF4-FFF2-40B4-BE49-F238E27FC236}">
+                <a16:creationId xmlns:a16="http://schemas.microsoft.com/office/drawing/2014/main" id="{486F4371-8408-71F3-34C8-C1FAA6539325}"/>
+              </a:ext>
+            </a:extLst>
+          </p:cNvPr>
+          <p:cNvSpPr txBox="1"/>
+          <p:nvPr/>
+        </p:nvSpPr>
+        <p:spPr>
+          <a:xfrm rot="16200000">
+            <a:off x="837156" y="2821313"/>
+            <a:ext cx="822931" cy="261610"/>
+          </a:xfrm>
+          <a:prstGeom prst="rect">
+            <a:avLst/>
+          </a:prstGeom>
+          <a:noFill/>
+        </p:spPr>
+        <p:txBody>
+          <a:bodyPr wrap="square" rtlCol="0" anchor="ctr">
+            <a:spAutoFit/>
+          </a:bodyPr>
+          <a:lstStyle/>
+          <a:p>
+            <a:pPr algn="ctr"/>
+            <a:r>
+              <a:rPr lang="en-US" altLang="zh-CN" sz="1100" dirty="0">
+                <a:latin typeface="Arial" panose="020B0604020202020204" pitchFamily="34" charset="0"/>
+                <a:cs typeface="Arial" panose="020B0604020202020204" pitchFamily="34" charset="0"/>
+              </a:rPr>
+              <a:t>Density</a:t>
+            </a:r>
+            <a:endParaRPr lang="zh-CN" altLang="en-US" sz="1100" dirty="0">
+              <a:latin typeface="Arial" panose="020B0604020202020204" pitchFamily="34" charset="0"/>
+              <a:cs typeface="Arial" panose="020B0604020202020204" pitchFamily="34" charset="0"/>
+            </a:endParaRPr>
+          </a:p>
+        </p:txBody>
+      </p:sp>
+      <p:sp>
+        <p:nvSpPr>
+          <p:cNvPr id="85" name="TextBox 84">
+            <a:extLst>
+              <a:ext uri="{FF2B5EF4-FFF2-40B4-BE49-F238E27FC236}">
+                <a16:creationId xmlns:a16="http://schemas.microsoft.com/office/drawing/2014/main" id="{ACEEAD51-1EDF-AD4B-3C8F-CA3DDF70CABF}"/>
+              </a:ext>
+            </a:extLst>
+          </p:cNvPr>
+          <p:cNvSpPr txBox="1"/>
+          <p:nvPr/>
+        </p:nvSpPr>
+        <p:spPr>
+          <a:xfrm rot="16200000">
+            <a:off x="837156" y="3805894"/>
+            <a:ext cx="822931" cy="261610"/>
+          </a:xfrm>
+          <a:prstGeom prst="rect">
+            <a:avLst/>
+          </a:prstGeom>
+          <a:noFill/>
+        </p:spPr>
+        <p:txBody>
+          <a:bodyPr wrap="square" rtlCol="0" anchor="ctr">
+            <a:spAutoFit/>
+          </a:bodyPr>
+          <a:lstStyle/>
+          <a:p>
+            <a:pPr algn="ctr"/>
+            <a:r>
+              <a:rPr lang="en-US" altLang="zh-CN" sz="1100" dirty="0">
+                <a:latin typeface="Arial" panose="020B0604020202020204" pitchFamily="34" charset="0"/>
+                <a:cs typeface="Arial" panose="020B0604020202020204" pitchFamily="34" charset="0"/>
+              </a:rPr>
+              <a:t>Density</a:t>
+            </a:r>
+            <a:endParaRPr lang="zh-CN" altLang="en-US" sz="1100" dirty="0">
+              <a:latin typeface="Arial" panose="020B0604020202020204" pitchFamily="34" charset="0"/>
+              <a:cs typeface="Arial" panose="020B0604020202020204" pitchFamily="34" charset="0"/>
+            </a:endParaRPr>
+          </a:p>
+        </p:txBody>
+      </p:sp>
+      <p:sp>
+        <p:nvSpPr>
+          <p:cNvPr id="86" name="TextBox 85">
+            <a:extLst>
+              <a:ext uri="{FF2B5EF4-FFF2-40B4-BE49-F238E27FC236}">
+                <a16:creationId xmlns:a16="http://schemas.microsoft.com/office/drawing/2014/main" id="{C6EAAB83-0EC4-B34C-EC7C-3D0C55E44645}"/>
+              </a:ext>
+            </a:extLst>
+          </p:cNvPr>
+          <p:cNvSpPr txBox="1"/>
+          <p:nvPr/>
+        </p:nvSpPr>
+        <p:spPr>
+          <a:xfrm rot="16200000">
+            <a:off x="837156" y="4799592"/>
+            <a:ext cx="822931" cy="261610"/>
+          </a:xfrm>
+          <a:prstGeom prst="rect">
+            <a:avLst/>
+          </a:prstGeom>
+          <a:noFill/>
+        </p:spPr>
+        <p:txBody>
+          <a:bodyPr wrap="square" rtlCol="0" anchor="ctr">
+            <a:spAutoFit/>
+          </a:bodyPr>
+          <a:lstStyle/>
+          <a:p>
+            <a:pPr algn="ctr"/>
+            <a:r>
+              <a:rPr lang="en-US" altLang="zh-CN" sz="1100" dirty="0">
+                <a:latin typeface="Arial" panose="020B0604020202020204" pitchFamily="34" charset="0"/>
+                <a:cs typeface="Arial" panose="020B0604020202020204" pitchFamily="34" charset="0"/>
+              </a:rPr>
+              <a:t>Density</a:t>
+            </a:r>
+            <a:endParaRPr lang="zh-CN" altLang="en-US" sz="1100" dirty="0">
+              <a:latin typeface="Arial" panose="020B0604020202020204" pitchFamily="34" charset="0"/>
+              <a:cs typeface="Arial" panose="020B0604020202020204" pitchFamily="34" charset="0"/>
+            </a:endParaRPr>
+          </a:p>
+        </p:txBody>
+      </p:sp>
+      <p:sp>
+        <p:nvSpPr>
+          <p:cNvPr id="87" name="TextBox 86">
+            <a:extLst>
+              <a:ext uri="{FF2B5EF4-FFF2-40B4-BE49-F238E27FC236}">
+                <a16:creationId xmlns:a16="http://schemas.microsoft.com/office/drawing/2014/main" id="{249B86AB-1253-8833-B7FF-42CED2B0812F}"/>
+              </a:ext>
+            </a:extLst>
+          </p:cNvPr>
+          <p:cNvSpPr txBox="1"/>
+          <p:nvPr/>
+        </p:nvSpPr>
+        <p:spPr>
+          <a:xfrm>
+            <a:off x="178469" y="820219"/>
+            <a:ext cx="890358" cy="276999"/>
+          </a:xfrm>
+          <a:prstGeom prst="rect">
+            <a:avLst/>
+          </a:prstGeom>
+          <a:noFill/>
+        </p:spPr>
+        <p:txBody>
+          <a:bodyPr wrap="square" rtlCol="0" anchor="ctr">
+            <a:spAutoFit/>
+          </a:bodyPr>
+          <a:lstStyle/>
+          <a:p>
+            <a:pPr algn="ctr"/>
+            <a:r>
+              <a:rPr lang="en-US" altLang="zh-CN" sz="1200" b="1" i="1" dirty="0">
+                <a:latin typeface="Arial" panose="020B0604020202020204" pitchFamily="34" charset="0"/>
+                <a:cs typeface="Arial" panose="020B0604020202020204" pitchFamily="34" charset="0"/>
+              </a:rPr>
+              <a:t>Van-2 ton</a:t>
+            </a:r>
+            <a:endParaRPr lang="zh-CN" altLang="en-US" sz="1200" b="1" i="1" dirty="0">
+              <a:latin typeface="Arial" panose="020B0604020202020204" pitchFamily="34" charset="0"/>
+              <a:cs typeface="Arial" panose="020B0604020202020204" pitchFamily="34" charset="0"/>
+            </a:endParaRPr>
+          </a:p>
+        </p:txBody>
+      </p:sp>
+      <p:sp>
+        <p:nvSpPr>
+          <p:cNvPr id="88" name="TextBox 87">
+            <a:extLst>
+              <a:ext uri="{FF2B5EF4-FFF2-40B4-BE49-F238E27FC236}">
+                <a16:creationId xmlns:a16="http://schemas.microsoft.com/office/drawing/2014/main" id="{CC30F59D-CC28-45C6-253A-B9B4785F6CE5}"/>
+              </a:ext>
+            </a:extLst>
+          </p:cNvPr>
+          <p:cNvSpPr txBox="1"/>
+          <p:nvPr/>
+        </p:nvSpPr>
+        <p:spPr>
+          <a:xfrm>
+            <a:off x="178469" y="1819921"/>
+            <a:ext cx="890358" cy="276999"/>
+          </a:xfrm>
+          <a:prstGeom prst="rect">
+            <a:avLst/>
+          </a:prstGeom>
+          <a:noFill/>
+        </p:spPr>
+        <p:txBody>
+          <a:bodyPr wrap="square" rtlCol="0" anchor="ctr">
+            <a:spAutoFit/>
+          </a:bodyPr>
+          <a:lstStyle/>
+          <a:p>
+            <a:pPr algn="ctr"/>
+            <a:r>
+              <a:rPr lang="en-US" altLang="zh-CN" sz="1200" b="1" i="1" dirty="0">
+                <a:latin typeface="Arial" panose="020B0604020202020204" pitchFamily="34" charset="0"/>
+                <a:cs typeface="Arial" panose="020B0604020202020204" pitchFamily="34" charset="0"/>
+              </a:rPr>
+              <a:t>CB-80 kg</a:t>
+            </a:r>
+            <a:endParaRPr lang="zh-CN" altLang="en-US" sz="1200" b="1" i="1" dirty="0">
+              <a:latin typeface="Arial" panose="020B0604020202020204" pitchFamily="34" charset="0"/>
+              <a:cs typeface="Arial" panose="020B0604020202020204" pitchFamily="34" charset="0"/>
+            </a:endParaRPr>
+          </a:p>
+        </p:txBody>
+      </p:sp>
+      <p:sp>
+        <p:nvSpPr>
+          <p:cNvPr id="89" name="TextBox 88">
+            <a:extLst>
+              <a:ext uri="{FF2B5EF4-FFF2-40B4-BE49-F238E27FC236}">
+                <a16:creationId xmlns:a16="http://schemas.microsoft.com/office/drawing/2014/main" id="{3C1854F1-6332-51AF-959E-1F07D059295C}"/>
+              </a:ext>
+            </a:extLst>
+          </p:cNvPr>
+          <p:cNvSpPr txBox="1"/>
+          <p:nvPr/>
+        </p:nvSpPr>
+        <p:spPr>
+          <a:xfrm>
+            <a:off x="147808" y="2788693"/>
+            <a:ext cx="951681" cy="276999"/>
+          </a:xfrm>
+          <a:prstGeom prst="rect">
+            <a:avLst/>
+          </a:prstGeom>
+          <a:noFill/>
+        </p:spPr>
+        <p:txBody>
+          <a:bodyPr wrap="square" rtlCol="0" anchor="ctr">
+            <a:spAutoFit/>
+          </a:bodyPr>
+          <a:lstStyle/>
+          <a:p>
+            <a:pPr algn="ctr"/>
+            <a:r>
+              <a:rPr lang="en-US" altLang="zh-CN" sz="1200" b="1" i="1" dirty="0">
+                <a:latin typeface="Arial" panose="020B0604020202020204" pitchFamily="34" charset="0"/>
+                <a:cs typeface="Arial" panose="020B0604020202020204" pitchFamily="34" charset="0"/>
+              </a:rPr>
+              <a:t>CB-100 kg</a:t>
+            </a:r>
+            <a:endParaRPr lang="zh-CN" altLang="en-US" sz="1200" b="1" i="1" dirty="0">
+              <a:latin typeface="Arial" panose="020B0604020202020204" pitchFamily="34" charset="0"/>
+              <a:cs typeface="Arial" panose="020B0604020202020204" pitchFamily="34" charset="0"/>
+            </a:endParaRPr>
+          </a:p>
+        </p:txBody>
+      </p:sp>
+      <p:sp>
+        <p:nvSpPr>
+          <p:cNvPr id="90" name="TextBox 89">
+            <a:extLst>
+              <a:ext uri="{FF2B5EF4-FFF2-40B4-BE49-F238E27FC236}">
+                <a16:creationId xmlns:a16="http://schemas.microsoft.com/office/drawing/2014/main" id="{C5DF10FE-E17D-CAE3-5769-A936EDC6002E}"/>
+              </a:ext>
+            </a:extLst>
+          </p:cNvPr>
+          <p:cNvSpPr txBox="1"/>
+          <p:nvPr/>
+        </p:nvSpPr>
+        <p:spPr>
+          <a:xfrm>
+            <a:off x="147808" y="3757465"/>
+            <a:ext cx="951681" cy="276999"/>
+          </a:xfrm>
+          <a:prstGeom prst="rect">
+            <a:avLst/>
+          </a:prstGeom>
+          <a:noFill/>
+        </p:spPr>
+        <p:txBody>
+          <a:bodyPr wrap="square" rtlCol="0" anchor="ctr">
+            <a:spAutoFit/>
+          </a:bodyPr>
+          <a:lstStyle/>
+          <a:p>
+            <a:pPr algn="ctr"/>
+            <a:r>
+              <a:rPr lang="en-US" altLang="zh-CN" sz="1200" b="1" i="1" dirty="0">
+                <a:latin typeface="Arial" panose="020B0604020202020204" pitchFamily="34" charset="0"/>
+                <a:cs typeface="Arial" panose="020B0604020202020204" pitchFamily="34" charset="0"/>
+              </a:rPr>
+              <a:t>CB-150kg</a:t>
+            </a:r>
+            <a:endParaRPr lang="zh-CN" altLang="en-US" sz="1200" b="1" i="1" dirty="0">
+              <a:latin typeface="Arial" panose="020B0604020202020204" pitchFamily="34" charset="0"/>
+              <a:cs typeface="Arial" panose="020B0604020202020204" pitchFamily="34" charset="0"/>
+            </a:endParaRPr>
+          </a:p>
+        </p:txBody>
+      </p:sp>
+      <p:sp>
+        <p:nvSpPr>
+          <p:cNvPr id="91" name="TextBox 90">
+            <a:extLst>
+              <a:ext uri="{FF2B5EF4-FFF2-40B4-BE49-F238E27FC236}">
+                <a16:creationId xmlns:a16="http://schemas.microsoft.com/office/drawing/2014/main" id="{29CB8FDC-9379-FD8B-1D1C-703B1844FEE3}"/>
+              </a:ext>
+            </a:extLst>
+          </p:cNvPr>
+          <p:cNvSpPr txBox="1"/>
+          <p:nvPr/>
+        </p:nvSpPr>
+        <p:spPr>
+          <a:xfrm>
+            <a:off x="132522" y="4757167"/>
+            <a:ext cx="982253" cy="276999"/>
+          </a:xfrm>
+          <a:prstGeom prst="rect">
+            <a:avLst/>
+          </a:prstGeom>
+          <a:noFill/>
+        </p:spPr>
+        <p:txBody>
+          <a:bodyPr wrap="square" rtlCol="0" anchor="ctr">
+            <a:spAutoFit/>
+          </a:bodyPr>
+          <a:lstStyle/>
+          <a:p>
+            <a:pPr algn="ctr"/>
+            <a:r>
+              <a:rPr lang="en-US" altLang="zh-CN" sz="1200" b="1" i="1" dirty="0">
+                <a:latin typeface="Arial" panose="020B0604020202020204" pitchFamily="34" charset="0"/>
+                <a:cs typeface="Arial" panose="020B0604020202020204" pitchFamily="34" charset="0"/>
+              </a:rPr>
+              <a:t>CB-200 kg</a:t>
+            </a:r>
+            <a:endParaRPr lang="zh-CN" altLang="en-US" sz="1200" b="1" i="1" dirty="0">
+              <a:latin typeface="Arial" panose="020B0604020202020204" pitchFamily="34" charset="0"/>
+              <a:cs typeface="Arial" panose="020B0604020202020204" pitchFamily="34" charset="0"/>
+            </a:endParaRPr>
+          </a:p>
+        </p:txBody>
+      </p:sp>
+      <p:sp>
+        <p:nvSpPr>
+          <p:cNvPr id="92" name="TextBox 91">
+            <a:extLst>
+              <a:ext uri="{FF2B5EF4-FFF2-40B4-BE49-F238E27FC236}">
+                <a16:creationId xmlns:a16="http://schemas.microsoft.com/office/drawing/2014/main" id="{DD848E56-B84F-E0F7-388B-5AE8FDD9D0B6}"/>
+              </a:ext>
+            </a:extLst>
+          </p:cNvPr>
+          <p:cNvSpPr txBox="1"/>
+          <p:nvPr/>
+        </p:nvSpPr>
+        <p:spPr>
+          <a:xfrm>
+            <a:off x="1690255" y="5587905"/>
+            <a:ext cx="1565564" cy="276997"/>
+          </a:xfrm>
+          <a:prstGeom prst="rect">
+            <a:avLst/>
+          </a:prstGeom>
+          <a:noFill/>
+        </p:spPr>
+        <p:txBody>
+          <a:bodyPr wrap="square" rtlCol="0" anchor="ctr">
+            <a:spAutoFit/>
+          </a:bodyPr>
+          <a:lstStyle/>
+          <a:p>
+            <a:pPr algn="ctr"/>
+            <a:r>
+              <a:rPr lang="en-US" altLang="zh-CN" sz="1200" b="1" dirty="0">
+                <a:latin typeface="Arial" panose="020B0604020202020204" pitchFamily="34" charset="0"/>
+                <a:cs typeface="Arial" panose="020B0604020202020204" pitchFamily="34" charset="0"/>
+              </a:rPr>
+              <a:t>VKT (km)</a:t>
+            </a:r>
+            <a:endParaRPr lang="zh-CN" altLang="en-US" sz="1200" b="1" dirty="0">
+              <a:latin typeface="Arial" panose="020B0604020202020204" pitchFamily="34" charset="0"/>
+              <a:cs typeface="Arial" panose="020B0604020202020204" pitchFamily="34" charset="0"/>
+            </a:endParaRPr>
+          </a:p>
+        </p:txBody>
+      </p:sp>
+      <p:sp>
+        <p:nvSpPr>
+          <p:cNvPr id="93" name="TextBox 92">
+            <a:extLst>
+              <a:ext uri="{FF2B5EF4-FFF2-40B4-BE49-F238E27FC236}">
+                <a16:creationId xmlns:a16="http://schemas.microsoft.com/office/drawing/2014/main" id="{016853F8-D668-483F-EF12-2F8960CF40B9}"/>
+              </a:ext>
+            </a:extLst>
+          </p:cNvPr>
+          <p:cNvSpPr txBox="1"/>
+          <p:nvPr/>
+        </p:nvSpPr>
+        <p:spPr>
+          <a:xfrm>
+            <a:off x="3616038" y="5587904"/>
+            <a:ext cx="1768194" cy="276999"/>
+          </a:xfrm>
+          <a:prstGeom prst="rect">
+            <a:avLst/>
+          </a:prstGeom>
+          <a:noFill/>
+        </p:spPr>
+        <p:txBody>
+          <a:bodyPr wrap="square" rtlCol="0" anchor="ctr">
+            <a:spAutoFit/>
+          </a:bodyPr>
+          <a:lstStyle/>
+          <a:p>
+            <a:pPr algn="ctr"/>
+            <a:r>
+              <a:rPr lang="en-US" altLang="zh-CN" sz="1200" b="1" dirty="0">
+                <a:latin typeface="Arial" panose="020B0604020202020204" pitchFamily="34" charset="0"/>
+                <a:cs typeface="Arial" panose="020B0604020202020204" pitchFamily="34" charset="0"/>
+              </a:rPr>
+              <a:t>Transit time (min)</a:t>
+            </a:r>
+            <a:endParaRPr lang="zh-CN" altLang="en-US" sz="1200" b="1" dirty="0">
+              <a:latin typeface="Arial" panose="020B0604020202020204" pitchFamily="34" charset="0"/>
+              <a:cs typeface="Arial" panose="020B0604020202020204" pitchFamily="34" charset="0"/>
+            </a:endParaRPr>
+          </a:p>
+        </p:txBody>
+      </p:sp>
+      <p:sp>
+        <p:nvSpPr>
+          <p:cNvPr id="94" name="TextBox 93">
+            <a:extLst>
+              <a:ext uri="{FF2B5EF4-FFF2-40B4-BE49-F238E27FC236}">
+                <a16:creationId xmlns:a16="http://schemas.microsoft.com/office/drawing/2014/main" id="{AA516F53-A4AA-BB08-04B9-0050134DDB9F}"/>
+              </a:ext>
+            </a:extLst>
+          </p:cNvPr>
+          <p:cNvSpPr txBox="1"/>
+          <p:nvPr/>
+        </p:nvSpPr>
+        <p:spPr>
+          <a:xfrm>
+            <a:off x="5628237" y="5495571"/>
+            <a:ext cx="1768194" cy="461665"/>
+          </a:xfrm>
+          <a:prstGeom prst="rect">
+            <a:avLst/>
+          </a:prstGeom>
+          <a:noFill/>
+        </p:spPr>
+        <p:txBody>
+          <a:bodyPr wrap="square" rtlCol="0" anchor="ctr">
+            <a:spAutoFit/>
+          </a:bodyPr>
+          <a:lstStyle/>
+          <a:p>
+            <a:pPr algn="ctr"/>
+            <a:r>
+              <a:rPr lang="en-US" altLang="zh-CN" sz="1200" b="1" dirty="0">
+                <a:latin typeface="Arial" panose="020B0604020202020204" pitchFamily="34" charset="0"/>
+                <a:cs typeface="Arial" panose="020B0604020202020204" pitchFamily="34" charset="0"/>
+              </a:rPr>
+              <a:t>Ton-km traveled </a:t>
+            </a:r>
+          </a:p>
+          <a:p>
+            <a:pPr algn="ctr"/>
+            <a:r>
+              <a:rPr lang="en-US" altLang="zh-CN" sz="1200" b="1" dirty="0">
+                <a:latin typeface="Arial" panose="020B0604020202020204" pitchFamily="34" charset="0"/>
+                <a:cs typeface="Arial" panose="020B0604020202020204" pitchFamily="34" charset="0"/>
+              </a:rPr>
+              <a:t>(ton</a:t>
+            </a:r>
+            <a:r>
+              <a:rPr lang="zh-CN" altLang="en-US" sz="1200" b="0" i="0" dirty="0">
+                <a:effectLst/>
+                <a:latin typeface="Google Sans"/>
+              </a:rPr>
+              <a:t>⋅</a:t>
+            </a:r>
+            <a:r>
+              <a:rPr lang="en-US" altLang="zh-CN" sz="1200" b="1" dirty="0">
+                <a:latin typeface="Arial" panose="020B0604020202020204" pitchFamily="34" charset="0"/>
+                <a:cs typeface="Arial" panose="020B0604020202020204" pitchFamily="34" charset="0"/>
+              </a:rPr>
+              <a:t>km)</a:t>
+            </a:r>
+            <a:endParaRPr lang="zh-CN" altLang="en-US" sz="1200" b="1" dirty="0">
+              <a:latin typeface="Arial" panose="020B0604020202020204" pitchFamily="34" charset="0"/>
+              <a:cs typeface="Arial" panose="020B0604020202020204" pitchFamily="34" charset="0"/>
+            </a:endParaRPr>
+          </a:p>
+        </p:txBody>
+      </p:sp>
+      <p:sp>
+        <p:nvSpPr>
+          <p:cNvPr id="95" name="TextBox 94">
+            <a:extLst>
+              <a:ext uri="{FF2B5EF4-FFF2-40B4-BE49-F238E27FC236}">
+                <a16:creationId xmlns:a16="http://schemas.microsoft.com/office/drawing/2014/main" id="{B9320B6C-954F-E0F3-2DD7-0F45FB7BACD5}"/>
+              </a:ext>
+            </a:extLst>
+          </p:cNvPr>
+          <p:cNvSpPr txBox="1"/>
+          <p:nvPr/>
+        </p:nvSpPr>
+        <p:spPr>
+          <a:xfrm>
+            <a:off x="7623090" y="5587904"/>
+            <a:ext cx="1768194" cy="276999"/>
+          </a:xfrm>
+          <a:prstGeom prst="rect">
+            <a:avLst/>
+          </a:prstGeom>
+          <a:noFill/>
+        </p:spPr>
+        <p:txBody>
+          <a:bodyPr wrap="square" rtlCol="0" anchor="ctr">
+            <a:spAutoFit/>
+          </a:bodyPr>
+          <a:lstStyle/>
+          <a:p>
+            <a:pPr algn="ctr"/>
+            <a:r>
+              <a:rPr lang="en-US" altLang="zh-CN" sz="1200" b="1" dirty="0">
+                <a:latin typeface="Arial" panose="020B0604020202020204" pitchFamily="34" charset="0"/>
+                <a:cs typeface="Arial" panose="020B0604020202020204" pitchFamily="34" charset="0"/>
+              </a:rPr>
+              <a:t>EPI</a:t>
+            </a:r>
+            <a:endParaRPr lang="zh-CN" altLang="en-US" sz="1200" b="1" dirty="0">
+              <a:latin typeface="Arial" panose="020B0604020202020204" pitchFamily="34" charset="0"/>
+              <a:cs typeface="Arial" panose="020B0604020202020204" pitchFamily="34" charset="0"/>
+            </a:endParaRPr>
+          </a:p>
+        </p:txBody>
+      </p:sp>
+      <p:sp>
+        <p:nvSpPr>
+          <p:cNvPr id="96" name="TextBox 95">
+            <a:extLst>
+              <a:ext uri="{FF2B5EF4-FFF2-40B4-BE49-F238E27FC236}">
+                <a16:creationId xmlns:a16="http://schemas.microsoft.com/office/drawing/2014/main" id="{76708487-1A41-154C-8A7D-CE1821DB6DCA}"/>
+              </a:ext>
+            </a:extLst>
+          </p:cNvPr>
+          <p:cNvSpPr txBox="1"/>
+          <p:nvPr/>
+        </p:nvSpPr>
+        <p:spPr>
+          <a:xfrm>
+            <a:off x="9620733" y="5495571"/>
+            <a:ext cx="1768194" cy="461665"/>
+          </a:xfrm>
+          <a:prstGeom prst="rect">
+            <a:avLst/>
+          </a:prstGeom>
+          <a:noFill/>
+        </p:spPr>
+        <p:txBody>
+          <a:bodyPr wrap="square" rtlCol="0" anchor="ctr">
+            <a:spAutoFit/>
+          </a:bodyPr>
+          <a:lstStyle/>
+          <a:p>
+            <a:pPr algn="ctr"/>
+            <a:r>
+              <a:rPr lang="en-US" altLang="zh-CN" sz="1200" b="1" dirty="0">
+                <a:latin typeface="Arial" panose="020B0604020202020204" pitchFamily="34" charset="0"/>
+                <a:cs typeface="Arial" panose="020B0604020202020204" pitchFamily="34" charset="0"/>
+              </a:rPr>
+              <a:t>WTW CO</a:t>
+            </a:r>
+            <a:r>
+              <a:rPr lang="en-US" altLang="zh-CN" sz="1200" b="1" baseline="-25000" dirty="0">
+                <a:latin typeface="Arial" panose="020B0604020202020204" pitchFamily="34" charset="0"/>
+                <a:cs typeface="Arial" panose="020B0604020202020204" pitchFamily="34" charset="0"/>
+              </a:rPr>
+              <a:t>2</a:t>
+            </a:r>
+            <a:r>
+              <a:rPr lang="en-US" altLang="zh-CN" sz="1200" b="1" dirty="0">
+                <a:latin typeface="Arial" panose="020B0604020202020204" pitchFamily="34" charset="0"/>
+                <a:cs typeface="Arial" panose="020B0604020202020204" pitchFamily="34" charset="0"/>
+              </a:rPr>
+              <a:t>-eq emissions (g)</a:t>
+            </a:r>
+            <a:endParaRPr lang="zh-CN" altLang="en-US" sz="1200" b="1" dirty="0">
+              <a:latin typeface="Arial" panose="020B0604020202020204" pitchFamily="34" charset="0"/>
+              <a:cs typeface="Arial" panose="020B0604020202020204" pitchFamily="34" charset="0"/>
+            </a:endParaRPr>
+          </a:p>
+        </p:txBody>
+      </p:sp>
+    </p:spTree>
+    <p:extLst>
+      <p:ext uri="{BB962C8B-B14F-4D97-AF65-F5344CB8AC3E}">
+        <p14:creationId xmlns:p14="http://schemas.microsoft.com/office/powerpoint/2010/main" val="1975392684"/>
       </p:ext>
     </p:extLst>
   </p:cSld>

</xml_diff>

<commit_message>
minor revision of SA figure slides
</commit_message>
<xml_diff>
--- a/figures/freightEmissions/figuresSA.pptx
+++ b/figures/freightEmissions/figuresSA.pptx
@@ -7,6 +7,7 @@
   <p:sldIdLst>
     <p:sldId id="256" r:id="rId2"/>
     <p:sldId id="257" r:id="rId3"/>
+    <p:sldId id="258" r:id="rId4"/>
   </p:sldIdLst>
   <p:sldSz cx="12192000" cy="6858000"/>
   <p:notesSz cx="6858000" cy="9144000"/>
@@ -105,6 +106,11 @@
       </a:defRPr>
     </a:lvl9pPr>
   </p:defaultTextStyle>
+  <p:extLst>
+    <p:ext uri="{EFAFB233-063F-42B5-8137-9DF3F51BA10A}">
+      <p15:sldGuideLst xmlns:p15="http://schemas.microsoft.com/office/powerpoint/2012/main"/>
+    </p:ext>
+  </p:extLst>
 </p:presentation>
 </file>
 
@@ -257,7 +263,7 @@
           <a:p>
             <a:fld id="{DFB0DADC-F014-4C6E-831A-01FA9A58C7BC}" type="datetimeFigureOut">
               <a:rPr lang="zh-CN" altLang="en-US" smtClean="0"/>
-              <a:t>2025/3/31</a:t>
+              <a:t>2025/4/3</a:t>
             </a:fld>
             <a:endParaRPr lang="zh-CN" altLang="en-US"/>
           </a:p>
@@ -457,7 +463,7 @@
           <a:p>
             <a:fld id="{DFB0DADC-F014-4C6E-831A-01FA9A58C7BC}" type="datetimeFigureOut">
               <a:rPr lang="zh-CN" altLang="en-US" smtClean="0"/>
-              <a:t>2025/3/31</a:t>
+              <a:t>2025/4/3</a:t>
             </a:fld>
             <a:endParaRPr lang="zh-CN" altLang="en-US"/>
           </a:p>
@@ -667,7 +673,7 @@
           <a:p>
             <a:fld id="{DFB0DADC-F014-4C6E-831A-01FA9A58C7BC}" type="datetimeFigureOut">
               <a:rPr lang="zh-CN" altLang="en-US" smtClean="0"/>
-              <a:t>2025/3/31</a:t>
+              <a:t>2025/4/3</a:t>
             </a:fld>
             <a:endParaRPr lang="zh-CN" altLang="en-US"/>
           </a:p>
@@ -867,7 +873,7 @@
           <a:p>
             <a:fld id="{DFB0DADC-F014-4C6E-831A-01FA9A58C7BC}" type="datetimeFigureOut">
               <a:rPr lang="zh-CN" altLang="en-US" smtClean="0"/>
-              <a:t>2025/3/31</a:t>
+              <a:t>2025/4/3</a:t>
             </a:fld>
             <a:endParaRPr lang="zh-CN" altLang="en-US"/>
           </a:p>
@@ -1143,7 +1149,7 @@
           <a:p>
             <a:fld id="{DFB0DADC-F014-4C6E-831A-01FA9A58C7BC}" type="datetimeFigureOut">
               <a:rPr lang="zh-CN" altLang="en-US" smtClean="0"/>
-              <a:t>2025/3/31</a:t>
+              <a:t>2025/4/3</a:t>
             </a:fld>
             <a:endParaRPr lang="zh-CN" altLang="en-US"/>
           </a:p>
@@ -1411,7 +1417,7 @@
           <a:p>
             <a:fld id="{DFB0DADC-F014-4C6E-831A-01FA9A58C7BC}" type="datetimeFigureOut">
               <a:rPr lang="zh-CN" altLang="en-US" smtClean="0"/>
-              <a:t>2025/3/31</a:t>
+              <a:t>2025/4/3</a:t>
             </a:fld>
             <a:endParaRPr lang="zh-CN" altLang="en-US"/>
           </a:p>
@@ -1826,7 +1832,7 @@
           <a:p>
             <a:fld id="{DFB0DADC-F014-4C6E-831A-01FA9A58C7BC}" type="datetimeFigureOut">
               <a:rPr lang="zh-CN" altLang="en-US" smtClean="0"/>
-              <a:t>2025/3/31</a:t>
+              <a:t>2025/4/3</a:t>
             </a:fld>
             <a:endParaRPr lang="zh-CN" altLang="en-US"/>
           </a:p>
@@ -1968,7 +1974,7 @@
           <a:p>
             <a:fld id="{DFB0DADC-F014-4C6E-831A-01FA9A58C7BC}" type="datetimeFigureOut">
               <a:rPr lang="zh-CN" altLang="en-US" smtClean="0"/>
-              <a:t>2025/3/31</a:t>
+              <a:t>2025/4/3</a:t>
             </a:fld>
             <a:endParaRPr lang="zh-CN" altLang="en-US"/>
           </a:p>
@@ -2081,7 +2087,7 @@
           <a:p>
             <a:fld id="{DFB0DADC-F014-4C6E-831A-01FA9A58C7BC}" type="datetimeFigureOut">
               <a:rPr lang="zh-CN" altLang="en-US" smtClean="0"/>
-              <a:t>2025/3/31</a:t>
+              <a:t>2025/4/3</a:t>
             </a:fld>
             <a:endParaRPr lang="zh-CN" altLang="en-US"/>
           </a:p>
@@ -2394,7 +2400,7 @@
           <a:p>
             <a:fld id="{DFB0DADC-F014-4C6E-831A-01FA9A58C7BC}" type="datetimeFigureOut">
               <a:rPr lang="zh-CN" altLang="en-US" smtClean="0"/>
-              <a:t>2025/3/31</a:t>
+              <a:t>2025/4/3</a:t>
             </a:fld>
             <a:endParaRPr lang="zh-CN" altLang="en-US"/>
           </a:p>
@@ -2683,7 +2689,7 @@
           <a:p>
             <a:fld id="{DFB0DADC-F014-4C6E-831A-01FA9A58C7BC}" type="datetimeFigureOut">
               <a:rPr lang="zh-CN" altLang="en-US" smtClean="0"/>
-              <a:t>2025/3/31</a:t>
+              <a:t>2025/4/3</a:t>
             </a:fld>
             <a:endParaRPr lang="zh-CN" altLang="en-US"/>
           </a:p>
@@ -2926,7 +2932,7 @@
           <a:p>
             <a:fld id="{DFB0DADC-F014-4C6E-831A-01FA9A58C7BC}" type="datetimeFigureOut">
               <a:rPr lang="zh-CN" altLang="en-US" smtClean="0"/>
-              <a:t>2025/3/31</a:t>
+              <a:t>2025/4/3</a:t>
             </a:fld>
             <a:endParaRPr lang="zh-CN" altLang="en-US"/>
           </a:p>
@@ -6375,6 +6381,1754 @@
 </p:sld>
 </file>
 
+<file path=ppt/slides/slide3.xml><?xml version="1.0" encoding="utf-8"?>
+<p:sld xmlns:a="http://schemas.openxmlformats.org/drawingml/2006/main" xmlns:r="http://schemas.openxmlformats.org/officeDocument/2006/relationships" xmlns:p="http://schemas.openxmlformats.org/presentationml/2006/main">
+  <p:cSld>
+    <p:spTree>
+      <p:nvGrpSpPr>
+        <p:cNvPr id="1" name="">
+          <a:extLst>
+            <a:ext uri="{FF2B5EF4-FFF2-40B4-BE49-F238E27FC236}">
+              <a16:creationId xmlns:a16="http://schemas.microsoft.com/office/drawing/2014/main" id="{9575BB9F-8722-769E-AF4B-ADE5B345C319}"/>
+            </a:ext>
+          </a:extLst>
+        </p:cNvPr>
+        <p:cNvGrpSpPr/>
+        <p:nvPr/>
+      </p:nvGrpSpPr>
+      <p:grpSpPr>
+        <a:xfrm>
+          <a:off x="0" y="0"/>
+          <a:ext cx="0" cy="0"/>
+          <a:chOff x="0" y="0"/>
+          <a:chExt cx="0" cy="0"/>
+        </a:xfrm>
+      </p:grpSpPr>
+      <p:sp>
+        <p:nvSpPr>
+          <p:cNvPr id="82" name="TextBox 81">
+            <a:extLst>
+              <a:ext uri="{FF2B5EF4-FFF2-40B4-BE49-F238E27FC236}">
+                <a16:creationId xmlns:a16="http://schemas.microsoft.com/office/drawing/2014/main" id="{69BB968B-8006-6CEF-3F81-325AED17469D}"/>
+              </a:ext>
+            </a:extLst>
+          </p:cNvPr>
+          <p:cNvSpPr txBox="1"/>
+          <p:nvPr/>
+        </p:nvSpPr>
+        <p:spPr>
+          <a:xfrm rot="16200000">
+            <a:off x="812254" y="1288084"/>
+            <a:ext cx="822931" cy="261610"/>
+          </a:xfrm>
+          <a:prstGeom prst="rect">
+            <a:avLst/>
+          </a:prstGeom>
+          <a:noFill/>
+        </p:spPr>
+        <p:txBody>
+          <a:bodyPr wrap="square" rtlCol="0" anchor="ctr">
+            <a:spAutoFit/>
+          </a:bodyPr>
+          <a:lstStyle/>
+          <a:p>
+            <a:pPr algn="ctr"/>
+            <a:r>
+              <a:rPr lang="en-US" altLang="zh-CN" sz="1100" dirty="0">
+                <a:latin typeface="Arial" panose="020B0604020202020204" pitchFamily="34" charset="0"/>
+                <a:cs typeface="Arial" panose="020B0604020202020204" pitchFamily="34" charset="0"/>
+              </a:rPr>
+              <a:t>Density</a:t>
+            </a:r>
+            <a:endParaRPr lang="zh-CN" altLang="en-US" sz="1100" dirty="0">
+              <a:latin typeface="Arial" panose="020B0604020202020204" pitchFamily="34" charset="0"/>
+              <a:cs typeface="Arial" panose="020B0604020202020204" pitchFamily="34" charset="0"/>
+            </a:endParaRPr>
+          </a:p>
+        </p:txBody>
+      </p:sp>
+      <p:sp>
+        <p:nvSpPr>
+          <p:cNvPr id="83" name="TextBox 82">
+            <a:extLst>
+              <a:ext uri="{FF2B5EF4-FFF2-40B4-BE49-F238E27FC236}">
+                <a16:creationId xmlns:a16="http://schemas.microsoft.com/office/drawing/2014/main" id="{C5B5BB06-0050-F7CC-F907-B9FC0F494A75}"/>
+              </a:ext>
+            </a:extLst>
+          </p:cNvPr>
+          <p:cNvSpPr txBox="1"/>
+          <p:nvPr/>
+        </p:nvSpPr>
+        <p:spPr>
+          <a:xfrm rot="16200000">
+            <a:off x="842915" y="2886740"/>
+            <a:ext cx="822931" cy="261610"/>
+          </a:xfrm>
+          <a:prstGeom prst="rect">
+            <a:avLst/>
+          </a:prstGeom>
+          <a:noFill/>
+        </p:spPr>
+        <p:txBody>
+          <a:bodyPr wrap="square" rtlCol="0" anchor="ctr">
+            <a:spAutoFit/>
+          </a:bodyPr>
+          <a:lstStyle/>
+          <a:p>
+            <a:pPr algn="ctr"/>
+            <a:r>
+              <a:rPr lang="en-US" altLang="zh-CN" sz="1100" dirty="0">
+                <a:latin typeface="Arial" panose="020B0604020202020204" pitchFamily="34" charset="0"/>
+                <a:cs typeface="Arial" panose="020B0604020202020204" pitchFamily="34" charset="0"/>
+              </a:rPr>
+              <a:t>Density</a:t>
+            </a:r>
+            <a:endParaRPr lang="zh-CN" altLang="en-US" sz="1100" dirty="0">
+              <a:latin typeface="Arial" panose="020B0604020202020204" pitchFamily="34" charset="0"/>
+              <a:cs typeface="Arial" panose="020B0604020202020204" pitchFamily="34" charset="0"/>
+            </a:endParaRPr>
+          </a:p>
+        </p:txBody>
+      </p:sp>
+      <p:sp>
+        <p:nvSpPr>
+          <p:cNvPr id="84" name="TextBox 83">
+            <a:extLst>
+              <a:ext uri="{FF2B5EF4-FFF2-40B4-BE49-F238E27FC236}">
+                <a16:creationId xmlns:a16="http://schemas.microsoft.com/office/drawing/2014/main" id="{99C053B9-9A15-D8E0-2817-D75AB4999744}"/>
+              </a:ext>
+            </a:extLst>
+          </p:cNvPr>
+          <p:cNvSpPr txBox="1"/>
+          <p:nvPr/>
+        </p:nvSpPr>
+        <p:spPr>
+          <a:xfrm rot="16200000">
+            <a:off x="842915" y="3880438"/>
+            <a:ext cx="822931" cy="261610"/>
+          </a:xfrm>
+          <a:prstGeom prst="rect">
+            <a:avLst/>
+          </a:prstGeom>
+          <a:noFill/>
+        </p:spPr>
+        <p:txBody>
+          <a:bodyPr wrap="square" rtlCol="0" anchor="ctr">
+            <a:spAutoFit/>
+          </a:bodyPr>
+          <a:lstStyle/>
+          <a:p>
+            <a:pPr algn="ctr"/>
+            <a:r>
+              <a:rPr lang="en-US" altLang="zh-CN" sz="1100" dirty="0">
+                <a:latin typeface="Arial" panose="020B0604020202020204" pitchFamily="34" charset="0"/>
+                <a:cs typeface="Arial" panose="020B0604020202020204" pitchFamily="34" charset="0"/>
+              </a:rPr>
+              <a:t>Density</a:t>
+            </a:r>
+            <a:endParaRPr lang="zh-CN" altLang="en-US" sz="1100" dirty="0">
+              <a:latin typeface="Arial" panose="020B0604020202020204" pitchFamily="34" charset="0"/>
+              <a:cs typeface="Arial" panose="020B0604020202020204" pitchFamily="34" charset="0"/>
+            </a:endParaRPr>
+          </a:p>
+        </p:txBody>
+      </p:sp>
+      <p:sp>
+        <p:nvSpPr>
+          <p:cNvPr id="85" name="TextBox 84">
+            <a:extLst>
+              <a:ext uri="{FF2B5EF4-FFF2-40B4-BE49-F238E27FC236}">
+                <a16:creationId xmlns:a16="http://schemas.microsoft.com/office/drawing/2014/main" id="{47CE5E17-2A3F-E0C1-4A8A-2E58BDE7A016}"/>
+              </a:ext>
+            </a:extLst>
+          </p:cNvPr>
+          <p:cNvSpPr txBox="1"/>
+          <p:nvPr/>
+        </p:nvSpPr>
+        <p:spPr>
+          <a:xfrm rot="16200000">
+            <a:off x="842915" y="4865019"/>
+            <a:ext cx="822931" cy="261610"/>
+          </a:xfrm>
+          <a:prstGeom prst="rect">
+            <a:avLst/>
+          </a:prstGeom>
+          <a:noFill/>
+        </p:spPr>
+        <p:txBody>
+          <a:bodyPr wrap="square" rtlCol="0" anchor="ctr">
+            <a:spAutoFit/>
+          </a:bodyPr>
+          <a:lstStyle/>
+          <a:p>
+            <a:pPr algn="ctr"/>
+            <a:r>
+              <a:rPr lang="en-US" altLang="zh-CN" sz="1100" dirty="0">
+                <a:latin typeface="Arial" panose="020B0604020202020204" pitchFamily="34" charset="0"/>
+                <a:cs typeface="Arial" panose="020B0604020202020204" pitchFamily="34" charset="0"/>
+              </a:rPr>
+              <a:t>Density</a:t>
+            </a:r>
+            <a:endParaRPr lang="zh-CN" altLang="en-US" sz="1100" dirty="0">
+              <a:latin typeface="Arial" panose="020B0604020202020204" pitchFamily="34" charset="0"/>
+              <a:cs typeface="Arial" panose="020B0604020202020204" pitchFamily="34" charset="0"/>
+            </a:endParaRPr>
+          </a:p>
+        </p:txBody>
+      </p:sp>
+      <p:sp>
+        <p:nvSpPr>
+          <p:cNvPr id="86" name="TextBox 85">
+            <a:extLst>
+              <a:ext uri="{FF2B5EF4-FFF2-40B4-BE49-F238E27FC236}">
+                <a16:creationId xmlns:a16="http://schemas.microsoft.com/office/drawing/2014/main" id="{EBE623CD-0D9D-FC3A-BBB4-2900D73EBC25}"/>
+              </a:ext>
+            </a:extLst>
+          </p:cNvPr>
+          <p:cNvSpPr txBox="1"/>
+          <p:nvPr/>
+        </p:nvSpPr>
+        <p:spPr>
+          <a:xfrm rot="16200000">
+            <a:off x="842915" y="5858717"/>
+            <a:ext cx="822931" cy="261610"/>
+          </a:xfrm>
+          <a:prstGeom prst="rect">
+            <a:avLst/>
+          </a:prstGeom>
+          <a:noFill/>
+        </p:spPr>
+        <p:txBody>
+          <a:bodyPr wrap="square" rtlCol="0" anchor="ctr">
+            <a:spAutoFit/>
+          </a:bodyPr>
+          <a:lstStyle/>
+          <a:p>
+            <a:pPr algn="ctr"/>
+            <a:r>
+              <a:rPr lang="en-US" altLang="zh-CN" sz="1100" dirty="0">
+                <a:latin typeface="Arial" panose="020B0604020202020204" pitchFamily="34" charset="0"/>
+                <a:cs typeface="Arial" panose="020B0604020202020204" pitchFamily="34" charset="0"/>
+              </a:rPr>
+              <a:t>Density</a:t>
+            </a:r>
+            <a:endParaRPr lang="zh-CN" altLang="en-US" sz="1100" dirty="0">
+              <a:latin typeface="Arial" panose="020B0604020202020204" pitchFamily="34" charset="0"/>
+              <a:cs typeface="Arial" panose="020B0604020202020204" pitchFamily="34" charset="0"/>
+            </a:endParaRPr>
+          </a:p>
+        </p:txBody>
+      </p:sp>
+      <p:sp>
+        <p:nvSpPr>
+          <p:cNvPr id="87" name="TextBox 86">
+            <a:extLst>
+              <a:ext uri="{FF2B5EF4-FFF2-40B4-BE49-F238E27FC236}">
+                <a16:creationId xmlns:a16="http://schemas.microsoft.com/office/drawing/2014/main" id="{655742CB-4305-BCEE-BBE6-DC6321F30CB6}"/>
+              </a:ext>
+            </a:extLst>
+          </p:cNvPr>
+          <p:cNvSpPr txBox="1"/>
+          <p:nvPr/>
+        </p:nvSpPr>
+        <p:spPr>
+          <a:xfrm>
+            <a:off x="153567" y="1280390"/>
+            <a:ext cx="890358" cy="276999"/>
+          </a:xfrm>
+          <a:prstGeom prst="rect">
+            <a:avLst/>
+          </a:prstGeom>
+          <a:noFill/>
+        </p:spPr>
+        <p:txBody>
+          <a:bodyPr wrap="square" rtlCol="0" anchor="ctr">
+            <a:spAutoFit/>
+          </a:bodyPr>
+          <a:lstStyle/>
+          <a:p>
+            <a:pPr algn="ctr"/>
+            <a:r>
+              <a:rPr lang="en-US" altLang="zh-CN" sz="1200" b="1" i="1" dirty="0">
+                <a:latin typeface="Arial" panose="020B0604020202020204" pitchFamily="34" charset="0"/>
+                <a:cs typeface="Arial" panose="020B0604020202020204" pitchFamily="34" charset="0"/>
+              </a:rPr>
+              <a:t>Van-2 ton</a:t>
+            </a:r>
+            <a:endParaRPr lang="zh-CN" altLang="en-US" sz="1200" b="1" i="1" dirty="0">
+              <a:latin typeface="Arial" panose="020B0604020202020204" pitchFamily="34" charset="0"/>
+              <a:cs typeface="Arial" panose="020B0604020202020204" pitchFamily="34" charset="0"/>
+            </a:endParaRPr>
+          </a:p>
+        </p:txBody>
+      </p:sp>
+      <p:sp>
+        <p:nvSpPr>
+          <p:cNvPr id="88" name="TextBox 87">
+            <a:extLst>
+              <a:ext uri="{FF2B5EF4-FFF2-40B4-BE49-F238E27FC236}">
+                <a16:creationId xmlns:a16="http://schemas.microsoft.com/office/drawing/2014/main" id="{FFB4A391-94FE-4606-17FF-5EC99535DCF8}"/>
+              </a:ext>
+            </a:extLst>
+          </p:cNvPr>
+          <p:cNvSpPr txBox="1"/>
+          <p:nvPr/>
+        </p:nvSpPr>
+        <p:spPr>
+          <a:xfrm>
+            <a:off x="184228" y="2879046"/>
+            <a:ext cx="890358" cy="276999"/>
+          </a:xfrm>
+          <a:prstGeom prst="rect">
+            <a:avLst/>
+          </a:prstGeom>
+          <a:noFill/>
+        </p:spPr>
+        <p:txBody>
+          <a:bodyPr wrap="square" rtlCol="0" anchor="ctr">
+            <a:spAutoFit/>
+          </a:bodyPr>
+          <a:lstStyle/>
+          <a:p>
+            <a:pPr algn="ctr"/>
+            <a:r>
+              <a:rPr lang="en-US" altLang="zh-CN" sz="1200" b="1" i="1" dirty="0">
+                <a:latin typeface="Arial" panose="020B0604020202020204" pitchFamily="34" charset="0"/>
+                <a:cs typeface="Arial" panose="020B0604020202020204" pitchFamily="34" charset="0"/>
+              </a:rPr>
+              <a:t>CB-80 kg</a:t>
+            </a:r>
+            <a:endParaRPr lang="zh-CN" altLang="en-US" sz="1200" b="1" i="1" dirty="0">
+              <a:latin typeface="Arial" panose="020B0604020202020204" pitchFamily="34" charset="0"/>
+              <a:cs typeface="Arial" panose="020B0604020202020204" pitchFamily="34" charset="0"/>
+            </a:endParaRPr>
+          </a:p>
+        </p:txBody>
+      </p:sp>
+      <p:sp>
+        <p:nvSpPr>
+          <p:cNvPr id="89" name="TextBox 88">
+            <a:extLst>
+              <a:ext uri="{FF2B5EF4-FFF2-40B4-BE49-F238E27FC236}">
+                <a16:creationId xmlns:a16="http://schemas.microsoft.com/office/drawing/2014/main" id="{EEC5D705-FE6C-AEE1-035B-E21546E4378F}"/>
+              </a:ext>
+            </a:extLst>
+          </p:cNvPr>
+          <p:cNvSpPr txBox="1"/>
+          <p:nvPr/>
+        </p:nvSpPr>
+        <p:spPr>
+          <a:xfrm>
+            <a:off x="153567" y="3847818"/>
+            <a:ext cx="951681" cy="276999"/>
+          </a:xfrm>
+          <a:prstGeom prst="rect">
+            <a:avLst/>
+          </a:prstGeom>
+          <a:noFill/>
+        </p:spPr>
+        <p:txBody>
+          <a:bodyPr wrap="square" rtlCol="0" anchor="ctr">
+            <a:spAutoFit/>
+          </a:bodyPr>
+          <a:lstStyle/>
+          <a:p>
+            <a:pPr algn="ctr"/>
+            <a:r>
+              <a:rPr lang="en-US" altLang="zh-CN" sz="1200" b="1" i="1" dirty="0">
+                <a:latin typeface="Arial" panose="020B0604020202020204" pitchFamily="34" charset="0"/>
+                <a:cs typeface="Arial" panose="020B0604020202020204" pitchFamily="34" charset="0"/>
+              </a:rPr>
+              <a:t>CB-100 kg</a:t>
+            </a:r>
+            <a:endParaRPr lang="zh-CN" altLang="en-US" sz="1200" b="1" i="1" dirty="0">
+              <a:latin typeface="Arial" panose="020B0604020202020204" pitchFamily="34" charset="0"/>
+              <a:cs typeface="Arial" panose="020B0604020202020204" pitchFamily="34" charset="0"/>
+            </a:endParaRPr>
+          </a:p>
+        </p:txBody>
+      </p:sp>
+      <p:sp>
+        <p:nvSpPr>
+          <p:cNvPr id="90" name="TextBox 89">
+            <a:extLst>
+              <a:ext uri="{FF2B5EF4-FFF2-40B4-BE49-F238E27FC236}">
+                <a16:creationId xmlns:a16="http://schemas.microsoft.com/office/drawing/2014/main" id="{F2AE9A47-8789-02B8-1606-E8AF4AD27747}"/>
+              </a:ext>
+            </a:extLst>
+          </p:cNvPr>
+          <p:cNvSpPr txBox="1"/>
+          <p:nvPr/>
+        </p:nvSpPr>
+        <p:spPr>
+          <a:xfrm>
+            <a:off x="153567" y="4816590"/>
+            <a:ext cx="951681" cy="276999"/>
+          </a:xfrm>
+          <a:prstGeom prst="rect">
+            <a:avLst/>
+          </a:prstGeom>
+          <a:noFill/>
+        </p:spPr>
+        <p:txBody>
+          <a:bodyPr wrap="square" rtlCol="0" anchor="ctr">
+            <a:spAutoFit/>
+          </a:bodyPr>
+          <a:lstStyle/>
+          <a:p>
+            <a:pPr algn="ctr"/>
+            <a:r>
+              <a:rPr lang="en-US" altLang="zh-CN" sz="1200" b="1" i="1" dirty="0">
+                <a:latin typeface="Arial" panose="020B0604020202020204" pitchFamily="34" charset="0"/>
+                <a:cs typeface="Arial" panose="020B0604020202020204" pitchFamily="34" charset="0"/>
+              </a:rPr>
+              <a:t>CB-150kg</a:t>
+            </a:r>
+            <a:endParaRPr lang="zh-CN" altLang="en-US" sz="1200" b="1" i="1" dirty="0">
+              <a:latin typeface="Arial" panose="020B0604020202020204" pitchFamily="34" charset="0"/>
+              <a:cs typeface="Arial" panose="020B0604020202020204" pitchFamily="34" charset="0"/>
+            </a:endParaRPr>
+          </a:p>
+        </p:txBody>
+      </p:sp>
+      <p:sp>
+        <p:nvSpPr>
+          <p:cNvPr id="91" name="TextBox 90">
+            <a:extLst>
+              <a:ext uri="{FF2B5EF4-FFF2-40B4-BE49-F238E27FC236}">
+                <a16:creationId xmlns:a16="http://schemas.microsoft.com/office/drawing/2014/main" id="{8B81010B-7C7A-06A3-4B67-1F04EE4B6B90}"/>
+              </a:ext>
+            </a:extLst>
+          </p:cNvPr>
+          <p:cNvSpPr txBox="1"/>
+          <p:nvPr/>
+        </p:nvSpPr>
+        <p:spPr>
+          <a:xfrm>
+            <a:off x="138281" y="5816292"/>
+            <a:ext cx="982253" cy="276999"/>
+          </a:xfrm>
+          <a:prstGeom prst="rect">
+            <a:avLst/>
+          </a:prstGeom>
+          <a:noFill/>
+        </p:spPr>
+        <p:txBody>
+          <a:bodyPr wrap="square" rtlCol="0" anchor="ctr">
+            <a:spAutoFit/>
+          </a:bodyPr>
+          <a:lstStyle/>
+          <a:p>
+            <a:pPr algn="ctr"/>
+            <a:r>
+              <a:rPr lang="en-US" altLang="zh-CN" sz="1200" b="1" i="1" dirty="0">
+                <a:latin typeface="Arial" panose="020B0604020202020204" pitchFamily="34" charset="0"/>
+                <a:cs typeface="Arial" panose="020B0604020202020204" pitchFamily="34" charset="0"/>
+              </a:rPr>
+              <a:t>CB-200 kg</a:t>
+            </a:r>
+            <a:endParaRPr lang="zh-CN" altLang="en-US" sz="1200" b="1" i="1" dirty="0">
+              <a:latin typeface="Arial" panose="020B0604020202020204" pitchFamily="34" charset="0"/>
+              <a:cs typeface="Arial" panose="020B0604020202020204" pitchFamily="34" charset="0"/>
+            </a:endParaRPr>
+          </a:p>
+        </p:txBody>
+      </p:sp>
+      <p:sp>
+        <p:nvSpPr>
+          <p:cNvPr id="92" name="TextBox 91">
+            <a:extLst>
+              <a:ext uri="{FF2B5EF4-FFF2-40B4-BE49-F238E27FC236}">
+                <a16:creationId xmlns:a16="http://schemas.microsoft.com/office/drawing/2014/main" id="{F3F5DC8C-01A2-A3A3-DDBC-B86EFAEBE3DA}"/>
+              </a:ext>
+            </a:extLst>
+          </p:cNvPr>
+          <p:cNvSpPr txBox="1"/>
+          <p:nvPr/>
+        </p:nvSpPr>
+        <p:spPr>
+          <a:xfrm>
+            <a:off x="1696014" y="6647030"/>
+            <a:ext cx="1565564" cy="276997"/>
+          </a:xfrm>
+          <a:prstGeom prst="rect">
+            <a:avLst/>
+          </a:prstGeom>
+          <a:noFill/>
+        </p:spPr>
+        <p:txBody>
+          <a:bodyPr wrap="square" rtlCol="0" anchor="ctr">
+            <a:spAutoFit/>
+          </a:bodyPr>
+          <a:lstStyle/>
+          <a:p>
+            <a:pPr algn="ctr"/>
+            <a:r>
+              <a:rPr lang="en-US" altLang="zh-CN" sz="1200" b="1" dirty="0">
+                <a:latin typeface="Arial" panose="020B0604020202020204" pitchFamily="34" charset="0"/>
+                <a:cs typeface="Arial" panose="020B0604020202020204" pitchFamily="34" charset="0"/>
+              </a:rPr>
+              <a:t>VKT (km)</a:t>
+            </a:r>
+            <a:endParaRPr lang="zh-CN" altLang="en-US" sz="1200" b="1" dirty="0">
+              <a:latin typeface="Arial" panose="020B0604020202020204" pitchFamily="34" charset="0"/>
+              <a:cs typeface="Arial" panose="020B0604020202020204" pitchFamily="34" charset="0"/>
+            </a:endParaRPr>
+          </a:p>
+        </p:txBody>
+      </p:sp>
+      <p:sp>
+        <p:nvSpPr>
+          <p:cNvPr id="93" name="TextBox 92">
+            <a:extLst>
+              <a:ext uri="{FF2B5EF4-FFF2-40B4-BE49-F238E27FC236}">
+                <a16:creationId xmlns:a16="http://schemas.microsoft.com/office/drawing/2014/main" id="{3FB0AFC6-9112-4F00-9D4F-F5F7A260DB26}"/>
+              </a:ext>
+            </a:extLst>
+          </p:cNvPr>
+          <p:cNvSpPr txBox="1"/>
+          <p:nvPr/>
+        </p:nvSpPr>
+        <p:spPr>
+          <a:xfrm>
+            <a:off x="3621797" y="6647029"/>
+            <a:ext cx="1768194" cy="276999"/>
+          </a:xfrm>
+          <a:prstGeom prst="rect">
+            <a:avLst/>
+          </a:prstGeom>
+          <a:noFill/>
+        </p:spPr>
+        <p:txBody>
+          <a:bodyPr wrap="square" rtlCol="0" anchor="ctr">
+            <a:spAutoFit/>
+          </a:bodyPr>
+          <a:lstStyle/>
+          <a:p>
+            <a:pPr algn="ctr"/>
+            <a:r>
+              <a:rPr lang="en-US" altLang="zh-CN" sz="1200" b="1" dirty="0">
+                <a:latin typeface="Arial" panose="020B0604020202020204" pitchFamily="34" charset="0"/>
+                <a:cs typeface="Arial" panose="020B0604020202020204" pitchFamily="34" charset="0"/>
+              </a:rPr>
+              <a:t>Transit time (min)</a:t>
+            </a:r>
+            <a:endParaRPr lang="zh-CN" altLang="en-US" sz="1200" b="1" dirty="0">
+              <a:latin typeface="Arial" panose="020B0604020202020204" pitchFamily="34" charset="0"/>
+              <a:cs typeface="Arial" panose="020B0604020202020204" pitchFamily="34" charset="0"/>
+            </a:endParaRPr>
+          </a:p>
+        </p:txBody>
+      </p:sp>
+      <p:sp>
+        <p:nvSpPr>
+          <p:cNvPr id="94" name="TextBox 93">
+            <a:extLst>
+              <a:ext uri="{FF2B5EF4-FFF2-40B4-BE49-F238E27FC236}">
+                <a16:creationId xmlns:a16="http://schemas.microsoft.com/office/drawing/2014/main" id="{84F664A2-9DFF-9BF2-62C3-DC3108A53BBB}"/>
+              </a:ext>
+            </a:extLst>
+          </p:cNvPr>
+          <p:cNvSpPr txBox="1"/>
+          <p:nvPr/>
+        </p:nvSpPr>
+        <p:spPr>
+          <a:xfrm>
+            <a:off x="5633996" y="6554696"/>
+            <a:ext cx="1768194" cy="461665"/>
+          </a:xfrm>
+          <a:prstGeom prst="rect">
+            <a:avLst/>
+          </a:prstGeom>
+          <a:noFill/>
+        </p:spPr>
+        <p:txBody>
+          <a:bodyPr wrap="square" rtlCol="0" anchor="ctr">
+            <a:spAutoFit/>
+          </a:bodyPr>
+          <a:lstStyle/>
+          <a:p>
+            <a:pPr algn="ctr"/>
+            <a:r>
+              <a:rPr lang="en-US" altLang="zh-CN" sz="1200" b="1" dirty="0">
+                <a:latin typeface="Arial" panose="020B0604020202020204" pitchFamily="34" charset="0"/>
+                <a:cs typeface="Arial" panose="020B0604020202020204" pitchFamily="34" charset="0"/>
+              </a:rPr>
+              <a:t>Ton-km traveled </a:t>
+            </a:r>
+          </a:p>
+          <a:p>
+            <a:pPr algn="ctr"/>
+            <a:r>
+              <a:rPr lang="en-US" altLang="zh-CN" sz="1200" b="1" dirty="0">
+                <a:latin typeface="Arial" panose="020B0604020202020204" pitchFamily="34" charset="0"/>
+                <a:cs typeface="Arial" panose="020B0604020202020204" pitchFamily="34" charset="0"/>
+              </a:rPr>
+              <a:t>(ton</a:t>
+            </a:r>
+            <a:r>
+              <a:rPr lang="zh-CN" altLang="en-US" sz="1200" b="0" i="0" dirty="0">
+                <a:effectLst/>
+                <a:latin typeface="Google Sans"/>
+              </a:rPr>
+              <a:t>⋅</a:t>
+            </a:r>
+            <a:r>
+              <a:rPr lang="en-US" altLang="zh-CN" sz="1200" b="1" dirty="0">
+                <a:latin typeface="Arial" panose="020B0604020202020204" pitchFamily="34" charset="0"/>
+                <a:cs typeface="Arial" panose="020B0604020202020204" pitchFamily="34" charset="0"/>
+              </a:rPr>
+              <a:t>km)</a:t>
+            </a:r>
+            <a:endParaRPr lang="zh-CN" altLang="en-US" sz="1200" b="1" dirty="0">
+              <a:latin typeface="Arial" panose="020B0604020202020204" pitchFamily="34" charset="0"/>
+              <a:cs typeface="Arial" panose="020B0604020202020204" pitchFamily="34" charset="0"/>
+            </a:endParaRPr>
+          </a:p>
+        </p:txBody>
+      </p:sp>
+      <p:sp>
+        <p:nvSpPr>
+          <p:cNvPr id="95" name="TextBox 94">
+            <a:extLst>
+              <a:ext uri="{FF2B5EF4-FFF2-40B4-BE49-F238E27FC236}">
+                <a16:creationId xmlns:a16="http://schemas.microsoft.com/office/drawing/2014/main" id="{C6848F86-4553-0681-E726-70F09D7F9F61}"/>
+              </a:ext>
+            </a:extLst>
+          </p:cNvPr>
+          <p:cNvSpPr txBox="1"/>
+          <p:nvPr/>
+        </p:nvSpPr>
+        <p:spPr>
+          <a:xfrm>
+            <a:off x="7628849" y="6647029"/>
+            <a:ext cx="1768194" cy="276999"/>
+          </a:xfrm>
+          <a:prstGeom prst="rect">
+            <a:avLst/>
+          </a:prstGeom>
+          <a:noFill/>
+        </p:spPr>
+        <p:txBody>
+          <a:bodyPr wrap="square" rtlCol="0" anchor="ctr">
+            <a:spAutoFit/>
+          </a:bodyPr>
+          <a:lstStyle/>
+          <a:p>
+            <a:pPr algn="ctr"/>
+            <a:r>
+              <a:rPr lang="en-US" altLang="zh-CN" sz="1200" b="1" dirty="0">
+                <a:latin typeface="Arial" panose="020B0604020202020204" pitchFamily="34" charset="0"/>
+                <a:cs typeface="Arial" panose="020B0604020202020204" pitchFamily="34" charset="0"/>
+              </a:rPr>
+              <a:t>EPI</a:t>
+            </a:r>
+            <a:endParaRPr lang="zh-CN" altLang="en-US" sz="1200" b="1" dirty="0">
+              <a:latin typeface="Arial" panose="020B0604020202020204" pitchFamily="34" charset="0"/>
+              <a:cs typeface="Arial" panose="020B0604020202020204" pitchFamily="34" charset="0"/>
+            </a:endParaRPr>
+          </a:p>
+        </p:txBody>
+      </p:sp>
+      <p:sp>
+        <p:nvSpPr>
+          <p:cNvPr id="96" name="TextBox 95">
+            <a:extLst>
+              <a:ext uri="{FF2B5EF4-FFF2-40B4-BE49-F238E27FC236}">
+                <a16:creationId xmlns:a16="http://schemas.microsoft.com/office/drawing/2014/main" id="{6B4B2F44-F669-5F69-BE62-0F01C73CBB75}"/>
+              </a:ext>
+            </a:extLst>
+          </p:cNvPr>
+          <p:cNvSpPr txBox="1"/>
+          <p:nvPr/>
+        </p:nvSpPr>
+        <p:spPr>
+          <a:xfrm>
+            <a:off x="9626492" y="6554696"/>
+            <a:ext cx="1768194" cy="461665"/>
+          </a:xfrm>
+          <a:prstGeom prst="rect">
+            <a:avLst/>
+          </a:prstGeom>
+          <a:noFill/>
+        </p:spPr>
+        <p:txBody>
+          <a:bodyPr wrap="square" rtlCol="0" anchor="ctr">
+            <a:spAutoFit/>
+          </a:bodyPr>
+          <a:lstStyle/>
+          <a:p>
+            <a:pPr algn="ctr"/>
+            <a:r>
+              <a:rPr lang="en-US" altLang="zh-CN" sz="1200" b="1" dirty="0">
+                <a:latin typeface="Arial" panose="020B0604020202020204" pitchFamily="34" charset="0"/>
+                <a:cs typeface="Arial" panose="020B0604020202020204" pitchFamily="34" charset="0"/>
+              </a:rPr>
+              <a:t>WTW CO</a:t>
+            </a:r>
+            <a:r>
+              <a:rPr lang="en-US" altLang="zh-CN" sz="1200" b="1" baseline="-25000" dirty="0">
+                <a:latin typeface="Arial" panose="020B0604020202020204" pitchFamily="34" charset="0"/>
+                <a:cs typeface="Arial" panose="020B0604020202020204" pitchFamily="34" charset="0"/>
+              </a:rPr>
+              <a:t>2</a:t>
+            </a:r>
+            <a:r>
+              <a:rPr lang="en-US" altLang="zh-CN" sz="1200" b="1" dirty="0">
+                <a:latin typeface="Arial" panose="020B0604020202020204" pitchFamily="34" charset="0"/>
+                <a:cs typeface="Arial" panose="020B0604020202020204" pitchFamily="34" charset="0"/>
+              </a:rPr>
+              <a:t>-eq emissions (g)</a:t>
+            </a:r>
+            <a:endParaRPr lang="zh-CN" altLang="en-US" sz="1200" b="1" dirty="0">
+              <a:latin typeface="Arial" panose="020B0604020202020204" pitchFamily="34" charset="0"/>
+              <a:cs typeface="Arial" panose="020B0604020202020204" pitchFamily="34" charset="0"/>
+            </a:endParaRPr>
+          </a:p>
+        </p:txBody>
+      </p:sp>
+      <p:pic>
+        <p:nvPicPr>
+          <p:cNvPr id="3" name="Picture 2" descr="A black background with a black and white city&#10;&#10;AI-generated content may be incorrect.">
+            <a:extLst>
+              <a:ext uri="{FF2B5EF4-FFF2-40B4-BE49-F238E27FC236}">
+                <a16:creationId xmlns:a16="http://schemas.microsoft.com/office/drawing/2014/main" id="{1F79DD5A-BDCF-D983-1539-92B8020741BE}"/>
+              </a:ext>
+            </a:extLst>
+          </p:cNvPr>
+          <p:cNvPicPr>
+            <a:picLocks noChangeAspect="1"/>
+          </p:cNvPicPr>
+          <p:nvPr/>
+        </p:nvPicPr>
+        <p:blipFill>
+          <a:blip r:embed="rId2">
+            <a:extLst>
+              <a:ext uri="{28A0092B-C50C-407E-A947-70E740481C1C}">
+                <a14:useLocalDpi xmlns:a14="http://schemas.microsoft.com/office/drawing/2010/main" val="0"/>
+              </a:ext>
+            </a:extLst>
+          </a:blip>
+          <a:stretch>
+            <a:fillRect/>
+          </a:stretch>
+        </p:blipFill>
+        <p:spPr>
+          <a:xfrm>
+            <a:off x="1610321" y="2627459"/>
+            <a:ext cx="1904499" cy="822932"/>
+          </a:xfrm>
+          <a:prstGeom prst="rect">
+            <a:avLst/>
+          </a:prstGeom>
+        </p:spPr>
+      </p:pic>
+      <p:pic>
+        <p:nvPicPr>
+          <p:cNvPr id="5" name="Picture 4" descr="A black and white image of a city&#10;&#10;AI-generated content may be incorrect.">
+            <a:extLst>
+              <a:ext uri="{FF2B5EF4-FFF2-40B4-BE49-F238E27FC236}">
+                <a16:creationId xmlns:a16="http://schemas.microsoft.com/office/drawing/2014/main" id="{DBDB8F9D-859A-1EF2-512B-3C38A5A729F8}"/>
+              </a:ext>
+            </a:extLst>
+          </p:cNvPr>
+          <p:cNvPicPr>
+            <a:picLocks noChangeAspect="1"/>
+          </p:cNvPicPr>
+          <p:nvPr/>
+        </p:nvPicPr>
+        <p:blipFill>
+          <a:blip r:embed="rId3">
+            <a:extLst>
+              <a:ext uri="{28A0092B-C50C-407E-A947-70E740481C1C}">
+                <a14:useLocalDpi xmlns:a14="http://schemas.microsoft.com/office/drawing/2010/main" val="0"/>
+              </a:ext>
+            </a:extLst>
+          </a:blip>
+          <a:stretch>
+            <a:fillRect/>
+          </a:stretch>
+        </p:blipFill>
+        <p:spPr>
+          <a:xfrm>
+            <a:off x="1610318" y="3748194"/>
+            <a:ext cx="1904499" cy="822932"/>
+          </a:xfrm>
+          <a:prstGeom prst="rect">
+            <a:avLst/>
+          </a:prstGeom>
+        </p:spPr>
+      </p:pic>
+      <p:pic>
+        <p:nvPicPr>
+          <p:cNvPr id="7" name="Picture 6" descr="A green and black screen&#10;&#10;AI-generated content may be incorrect.">
+            <a:extLst>
+              <a:ext uri="{FF2B5EF4-FFF2-40B4-BE49-F238E27FC236}">
+                <a16:creationId xmlns:a16="http://schemas.microsoft.com/office/drawing/2014/main" id="{81607864-BBD9-0A84-8EE6-CBD0F5BA38C6}"/>
+              </a:ext>
+            </a:extLst>
+          </p:cNvPr>
+          <p:cNvPicPr>
+            <a:picLocks noChangeAspect="1"/>
+          </p:cNvPicPr>
+          <p:nvPr/>
+        </p:nvPicPr>
+        <p:blipFill>
+          <a:blip r:embed="rId4">
+            <a:extLst>
+              <a:ext uri="{28A0092B-C50C-407E-A947-70E740481C1C}">
+                <a14:useLocalDpi xmlns:a14="http://schemas.microsoft.com/office/drawing/2010/main" val="0"/>
+              </a:ext>
+            </a:extLst>
+          </a:blip>
+          <a:stretch>
+            <a:fillRect/>
+          </a:stretch>
+        </p:blipFill>
+        <p:spPr>
+          <a:xfrm>
+            <a:off x="1610316" y="4682123"/>
+            <a:ext cx="1904499" cy="822932"/>
+          </a:xfrm>
+          <a:prstGeom prst="rect">
+            <a:avLst/>
+          </a:prstGeom>
+        </p:spPr>
+      </p:pic>
+      <p:pic>
+        <p:nvPicPr>
+          <p:cNvPr id="9" name="Picture 8" descr="A screen shot of a graph&#10;&#10;AI-generated content may be incorrect.">
+            <a:extLst>
+              <a:ext uri="{FF2B5EF4-FFF2-40B4-BE49-F238E27FC236}">
+                <a16:creationId xmlns:a16="http://schemas.microsoft.com/office/drawing/2014/main" id="{DF4AFF98-2FB6-2986-8118-683CCC40FFC2}"/>
+              </a:ext>
+            </a:extLst>
+          </p:cNvPr>
+          <p:cNvPicPr>
+            <a:picLocks noChangeAspect="1"/>
+          </p:cNvPicPr>
+          <p:nvPr/>
+        </p:nvPicPr>
+        <p:blipFill>
+          <a:blip r:embed="rId5">
+            <a:extLst>
+              <a:ext uri="{28A0092B-C50C-407E-A947-70E740481C1C}">
+                <a14:useLocalDpi xmlns:a14="http://schemas.microsoft.com/office/drawing/2010/main" val="0"/>
+              </a:ext>
+            </a:extLst>
+          </a:blip>
+          <a:stretch>
+            <a:fillRect/>
+          </a:stretch>
+        </p:blipFill>
+        <p:spPr>
+          <a:xfrm>
+            <a:off x="1610316" y="5616052"/>
+            <a:ext cx="1904499" cy="822932"/>
+          </a:xfrm>
+          <a:prstGeom prst="rect">
+            <a:avLst/>
+          </a:prstGeom>
+        </p:spPr>
+      </p:pic>
+      <p:pic>
+        <p:nvPicPr>
+          <p:cNvPr id="11" name="Picture 10" descr="A black background with blue lines&#10;&#10;AI-generated content may be incorrect.">
+            <a:extLst>
+              <a:ext uri="{FF2B5EF4-FFF2-40B4-BE49-F238E27FC236}">
+                <a16:creationId xmlns:a16="http://schemas.microsoft.com/office/drawing/2014/main" id="{E8B22DD4-7894-34EA-B127-5FB2DADF82C0}"/>
+              </a:ext>
+            </a:extLst>
+          </p:cNvPr>
+          <p:cNvPicPr>
+            <a:picLocks noChangeAspect="1"/>
+          </p:cNvPicPr>
+          <p:nvPr/>
+        </p:nvPicPr>
+        <p:blipFill>
+          <a:blip r:embed="rId6">
+            <a:extLst>
+              <a:ext uri="{28A0092B-C50C-407E-A947-70E740481C1C}">
+                <a14:useLocalDpi xmlns:a14="http://schemas.microsoft.com/office/drawing/2010/main" val="0"/>
+              </a:ext>
+            </a:extLst>
+          </a:blip>
+          <a:stretch>
+            <a:fillRect/>
+          </a:stretch>
+        </p:blipFill>
+        <p:spPr>
+          <a:xfrm>
+            <a:off x="1527409" y="1041803"/>
+            <a:ext cx="2008999" cy="822932"/>
+          </a:xfrm>
+          <a:prstGeom prst="rect">
+            <a:avLst/>
+          </a:prstGeom>
+        </p:spPr>
+      </p:pic>
+      <p:pic>
+        <p:nvPicPr>
+          <p:cNvPr id="14" name="Picture 13" descr="A black background with white lines&#10;&#10;AI-generated content may be incorrect.">
+            <a:extLst>
+              <a:ext uri="{FF2B5EF4-FFF2-40B4-BE49-F238E27FC236}">
+                <a16:creationId xmlns:a16="http://schemas.microsoft.com/office/drawing/2014/main" id="{4A881497-B4D3-E02B-240B-4B660F228C5A}"/>
+              </a:ext>
+            </a:extLst>
+          </p:cNvPr>
+          <p:cNvPicPr>
+            <a:picLocks noChangeAspect="1"/>
+          </p:cNvPicPr>
+          <p:nvPr/>
+        </p:nvPicPr>
+        <p:blipFill>
+          <a:blip r:embed="rId7">
+            <a:extLst>
+              <a:ext uri="{28A0092B-C50C-407E-A947-70E740481C1C}">
+                <a14:useLocalDpi xmlns:a14="http://schemas.microsoft.com/office/drawing/2010/main" val="0"/>
+              </a:ext>
+            </a:extLst>
+          </a:blip>
+          <a:stretch>
+            <a:fillRect/>
+          </a:stretch>
+        </p:blipFill>
+        <p:spPr>
+          <a:xfrm>
+            <a:off x="3671569" y="2657725"/>
+            <a:ext cx="1904499" cy="822932"/>
+          </a:xfrm>
+          <a:prstGeom prst="rect">
+            <a:avLst/>
+          </a:prstGeom>
+        </p:spPr>
+      </p:pic>
+      <p:pic>
+        <p:nvPicPr>
+          <p:cNvPr id="18" name="Picture 17" descr="A black background with a black and white background&#10;&#10;AI-generated content may be incorrect.">
+            <a:extLst>
+              <a:ext uri="{FF2B5EF4-FFF2-40B4-BE49-F238E27FC236}">
+                <a16:creationId xmlns:a16="http://schemas.microsoft.com/office/drawing/2014/main" id="{16DB2A87-F36C-3A59-BF6C-19B74AC3CD79}"/>
+              </a:ext>
+            </a:extLst>
+          </p:cNvPr>
+          <p:cNvPicPr>
+            <a:picLocks noChangeAspect="1"/>
+          </p:cNvPicPr>
+          <p:nvPr/>
+        </p:nvPicPr>
+        <p:blipFill>
+          <a:blip r:embed="rId8">
+            <a:extLst>
+              <a:ext uri="{28A0092B-C50C-407E-A947-70E740481C1C}">
+                <a14:useLocalDpi xmlns:a14="http://schemas.microsoft.com/office/drawing/2010/main" val="0"/>
+              </a:ext>
+            </a:extLst>
+          </a:blip>
+          <a:stretch>
+            <a:fillRect/>
+          </a:stretch>
+        </p:blipFill>
+        <p:spPr>
+          <a:xfrm>
+            <a:off x="3671569" y="3725422"/>
+            <a:ext cx="1904499" cy="822932"/>
+          </a:xfrm>
+          <a:prstGeom prst="rect">
+            <a:avLst/>
+          </a:prstGeom>
+        </p:spPr>
+      </p:pic>
+      <p:pic>
+        <p:nvPicPr>
+          <p:cNvPr id="22" name="Picture 21" descr="A green and black background&#10;&#10;AI-generated content may be incorrect.">
+            <a:extLst>
+              <a:ext uri="{FF2B5EF4-FFF2-40B4-BE49-F238E27FC236}">
+                <a16:creationId xmlns:a16="http://schemas.microsoft.com/office/drawing/2014/main" id="{42FB9D16-9D21-4549-4EA3-6AE8B24E39BE}"/>
+              </a:ext>
+            </a:extLst>
+          </p:cNvPr>
+          <p:cNvPicPr>
+            <a:picLocks noChangeAspect="1"/>
+          </p:cNvPicPr>
+          <p:nvPr/>
+        </p:nvPicPr>
+        <p:blipFill>
+          <a:blip r:embed="rId9">
+            <a:extLst>
+              <a:ext uri="{28A0092B-C50C-407E-A947-70E740481C1C}">
+                <a14:useLocalDpi xmlns:a14="http://schemas.microsoft.com/office/drawing/2010/main" val="0"/>
+              </a:ext>
+            </a:extLst>
+          </a:blip>
+          <a:stretch>
+            <a:fillRect/>
+          </a:stretch>
+        </p:blipFill>
+        <p:spPr>
+          <a:xfrm>
+            <a:off x="3665488" y="4689098"/>
+            <a:ext cx="1904499" cy="822932"/>
+          </a:xfrm>
+          <a:prstGeom prst="rect">
+            <a:avLst/>
+          </a:prstGeom>
+        </p:spPr>
+      </p:pic>
+      <p:pic>
+        <p:nvPicPr>
+          <p:cNvPr id="24" name="Picture 23" descr="A screen shot of a sound wave&#10;&#10;AI-generated content may be incorrect.">
+            <a:extLst>
+              <a:ext uri="{FF2B5EF4-FFF2-40B4-BE49-F238E27FC236}">
+                <a16:creationId xmlns:a16="http://schemas.microsoft.com/office/drawing/2014/main" id="{5751A067-A600-6284-9374-E8CDDE84A750}"/>
+              </a:ext>
+            </a:extLst>
+          </p:cNvPr>
+          <p:cNvPicPr>
+            <a:picLocks noChangeAspect="1"/>
+          </p:cNvPicPr>
+          <p:nvPr/>
+        </p:nvPicPr>
+        <p:blipFill>
+          <a:blip r:embed="rId10">
+            <a:extLst>
+              <a:ext uri="{28A0092B-C50C-407E-A947-70E740481C1C}">
+                <a14:useLocalDpi xmlns:a14="http://schemas.microsoft.com/office/drawing/2010/main" val="0"/>
+              </a:ext>
+            </a:extLst>
+          </a:blip>
+          <a:stretch>
+            <a:fillRect/>
+          </a:stretch>
+        </p:blipFill>
+        <p:spPr>
+          <a:xfrm>
+            <a:off x="3665487" y="5616052"/>
+            <a:ext cx="1904499" cy="822932"/>
+          </a:xfrm>
+          <a:prstGeom prst="rect">
+            <a:avLst/>
+          </a:prstGeom>
+        </p:spPr>
+      </p:pic>
+      <p:pic>
+        <p:nvPicPr>
+          <p:cNvPr id="26" name="Picture 25" descr="A black background with blue lines&#10;&#10;AI-generated content may be incorrect.">
+            <a:extLst>
+              <a:ext uri="{FF2B5EF4-FFF2-40B4-BE49-F238E27FC236}">
+                <a16:creationId xmlns:a16="http://schemas.microsoft.com/office/drawing/2014/main" id="{5E47ADFF-3C73-2496-39DD-BDE1605DF688}"/>
+              </a:ext>
+            </a:extLst>
+          </p:cNvPr>
+          <p:cNvPicPr>
+            <a:picLocks noChangeAspect="1"/>
+          </p:cNvPicPr>
+          <p:nvPr/>
+        </p:nvPicPr>
+        <p:blipFill>
+          <a:blip r:embed="rId11">
+            <a:extLst>
+              <a:ext uri="{28A0092B-C50C-407E-A947-70E740481C1C}">
+                <a14:useLocalDpi xmlns:a14="http://schemas.microsoft.com/office/drawing/2010/main" val="0"/>
+              </a:ext>
+            </a:extLst>
+          </a:blip>
+          <a:stretch>
+            <a:fillRect/>
+          </a:stretch>
+        </p:blipFill>
+        <p:spPr>
+          <a:xfrm>
+            <a:off x="3536408" y="1042500"/>
+            <a:ext cx="2008999" cy="822932"/>
+          </a:xfrm>
+          <a:prstGeom prst="rect">
+            <a:avLst/>
+          </a:prstGeom>
+        </p:spPr>
+      </p:pic>
+      <p:pic>
+        <p:nvPicPr>
+          <p:cNvPr id="28" name="Picture 27" descr="A black background with white lines&#10;&#10;AI-generated content may be incorrect.">
+            <a:extLst>
+              <a:ext uri="{FF2B5EF4-FFF2-40B4-BE49-F238E27FC236}">
+                <a16:creationId xmlns:a16="http://schemas.microsoft.com/office/drawing/2014/main" id="{409DD45C-006B-079D-B1BE-64F5AEE578D9}"/>
+              </a:ext>
+            </a:extLst>
+          </p:cNvPr>
+          <p:cNvPicPr>
+            <a:picLocks noChangeAspect="1"/>
+          </p:cNvPicPr>
+          <p:nvPr/>
+        </p:nvPicPr>
+        <p:blipFill>
+          <a:blip r:embed="rId12">
+            <a:extLst>
+              <a:ext uri="{28A0092B-C50C-407E-A947-70E740481C1C}">
+                <a14:useLocalDpi xmlns:a14="http://schemas.microsoft.com/office/drawing/2010/main" val="0"/>
+              </a:ext>
+            </a:extLst>
+          </a:blip>
+          <a:stretch>
+            <a:fillRect/>
+          </a:stretch>
+        </p:blipFill>
+        <p:spPr>
+          <a:xfrm>
+            <a:off x="5628317" y="2606079"/>
+            <a:ext cx="1904499" cy="822932"/>
+          </a:xfrm>
+          <a:prstGeom prst="rect">
+            <a:avLst/>
+          </a:prstGeom>
+        </p:spPr>
+      </p:pic>
+      <p:pic>
+        <p:nvPicPr>
+          <p:cNvPr id="30" name="Picture 29" descr="A black and white image of a city&#10;&#10;AI-generated content may be incorrect.">
+            <a:extLst>
+              <a:ext uri="{FF2B5EF4-FFF2-40B4-BE49-F238E27FC236}">
+                <a16:creationId xmlns:a16="http://schemas.microsoft.com/office/drawing/2014/main" id="{DA368694-F6A2-B0E2-1E9C-E9082B3499EC}"/>
+              </a:ext>
+            </a:extLst>
+          </p:cNvPr>
+          <p:cNvPicPr>
+            <a:picLocks noChangeAspect="1"/>
+          </p:cNvPicPr>
+          <p:nvPr/>
+        </p:nvPicPr>
+        <p:blipFill>
+          <a:blip r:embed="rId13">
+            <a:extLst>
+              <a:ext uri="{28A0092B-C50C-407E-A947-70E740481C1C}">
+                <a14:useLocalDpi xmlns:a14="http://schemas.microsoft.com/office/drawing/2010/main" val="0"/>
+              </a:ext>
+            </a:extLst>
+          </a:blip>
+          <a:stretch>
+            <a:fillRect/>
+          </a:stretch>
+        </p:blipFill>
+        <p:spPr>
+          <a:xfrm>
+            <a:off x="5569986" y="3681035"/>
+            <a:ext cx="2008999" cy="833382"/>
+          </a:xfrm>
+          <a:prstGeom prst="rect">
+            <a:avLst/>
+          </a:prstGeom>
+        </p:spPr>
+      </p:pic>
+      <p:pic>
+        <p:nvPicPr>
+          <p:cNvPr id="32" name="Picture 31" descr="A green and black graphic&#10;&#10;AI-generated content may be incorrect.">
+            <a:extLst>
+              <a:ext uri="{FF2B5EF4-FFF2-40B4-BE49-F238E27FC236}">
+                <a16:creationId xmlns:a16="http://schemas.microsoft.com/office/drawing/2014/main" id="{1B58A0F6-DF09-BA79-A158-174BFCFD97DE}"/>
+              </a:ext>
+            </a:extLst>
+          </p:cNvPr>
+          <p:cNvPicPr>
+            <a:picLocks noChangeAspect="1"/>
+          </p:cNvPicPr>
+          <p:nvPr/>
+        </p:nvPicPr>
+        <p:blipFill>
+          <a:blip r:embed="rId14">
+            <a:extLst>
+              <a:ext uri="{28A0092B-C50C-407E-A947-70E740481C1C}">
+                <a14:useLocalDpi xmlns:a14="http://schemas.microsoft.com/office/drawing/2010/main" val="0"/>
+              </a:ext>
+            </a:extLst>
+          </a:blip>
+          <a:stretch>
+            <a:fillRect/>
+          </a:stretch>
+        </p:blipFill>
+        <p:spPr>
+          <a:xfrm>
+            <a:off x="5633996" y="4656986"/>
+            <a:ext cx="2008999" cy="838607"/>
+          </a:xfrm>
+          <a:prstGeom prst="rect">
+            <a:avLst/>
+          </a:prstGeom>
+        </p:spPr>
+      </p:pic>
+      <p:pic>
+        <p:nvPicPr>
+          <p:cNvPr id="34" name="Picture 33" descr="A green line with dots&#10;&#10;AI-generated content may be incorrect.">
+            <a:extLst>
+              <a:ext uri="{FF2B5EF4-FFF2-40B4-BE49-F238E27FC236}">
+                <a16:creationId xmlns:a16="http://schemas.microsoft.com/office/drawing/2014/main" id="{4CACB142-E6D9-7AF3-9A67-11471665797B}"/>
+              </a:ext>
+            </a:extLst>
+          </p:cNvPr>
+          <p:cNvPicPr>
+            <a:picLocks noChangeAspect="1"/>
+          </p:cNvPicPr>
+          <p:nvPr/>
+        </p:nvPicPr>
+        <p:blipFill>
+          <a:blip r:embed="rId15">
+            <a:extLst>
+              <a:ext uri="{28A0092B-C50C-407E-A947-70E740481C1C}">
+                <a14:useLocalDpi xmlns:a14="http://schemas.microsoft.com/office/drawing/2010/main" val="0"/>
+              </a:ext>
+            </a:extLst>
+          </a:blip>
+          <a:stretch>
+            <a:fillRect/>
+          </a:stretch>
+        </p:blipFill>
+        <p:spPr>
+          <a:xfrm>
+            <a:off x="5681284" y="5578056"/>
+            <a:ext cx="1904499" cy="822932"/>
+          </a:xfrm>
+          <a:prstGeom prst="rect">
+            <a:avLst/>
+          </a:prstGeom>
+        </p:spPr>
+      </p:pic>
+      <p:pic>
+        <p:nvPicPr>
+          <p:cNvPr id="36" name="Picture 35" descr="A black background with blue lines&#10;&#10;AI-generated content may be incorrect.">
+            <a:extLst>
+              <a:ext uri="{FF2B5EF4-FFF2-40B4-BE49-F238E27FC236}">
+                <a16:creationId xmlns:a16="http://schemas.microsoft.com/office/drawing/2014/main" id="{DC2AF200-F887-6E61-778D-541E3CC85A94}"/>
+              </a:ext>
+            </a:extLst>
+          </p:cNvPr>
+          <p:cNvPicPr>
+            <a:picLocks noChangeAspect="1"/>
+          </p:cNvPicPr>
+          <p:nvPr/>
+        </p:nvPicPr>
+        <p:blipFill>
+          <a:blip r:embed="rId16">
+            <a:extLst>
+              <a:ext uri="{28A0092B-C50C-407E-A947-70E740481C1C}">
+                <a14:useLocalDpi xmlns:a14="http://schemas.microsoft.com/office/drawing/2010/main" val="0"/>
+              </a:ext>
+            </a:extLst>
+          </a:blip>
+          <a:stretch>
+            <a:fillRect/>
+          </a:stretch>
+        </p:blipFill>
+        <p:spPr>
+          <a:xfrm>
+            <a:off x="5545407" y="1041803"/>
+            <a:ext cx="2008999" cy="833382"/>
+          </a:xfrm>
+          <a:prstGeom prst="rect">
+            <a:avLst/>
+          </a:prstGeom>
+        </p:spPr>
+      </p:pic>
+      <p:pic>
+        <p:nvPicPr>
+          <p:cNvPr id="40" name="Picture 39" descr="A black background with white lines&#10;&#10;AI-generated content may be incorrect.">
+            <a:extLst>
+              <a:ext uri="{FF2B5EF4-FFF2-40B4-BE49-F238E27FC236}">
+                <a16:creationId xmlns:a16="http://schemas.microsoft.com/office/drawing/2014/main" id="{3201DF5A-9016-EFCD-0685-937CFD571EC0}"/>
+              </a:ext>
+            </a:extLst>
+          </p:cNvPr>
+          <p:cNvPicPr>
+            <a:picLocks noChangeAspect="1"/>
+          </p:cNvPicPr>
+          <p:nvPr/>
+        </p:nvPicPr>
+        <p:blipFill>
+          <a:blip r:embed="rId17">
+            <a:extLst>
+              <a:ext uri="{28A0092B-C50C-407E-A947-70E740481C1C}">
+                <a14:useLocalDpi xmlns:a14="http://schemas.microsoft.com/office/drawing/2010/main" val="0"/>
+              </a:ext>
+            </a:extLst>
+          </a:blip>
+          <a:stretch>
+            <a:fillRect/>
+          </a:stretch>
+        </p:blipFill>
+        <p:spPr>
+          <a:xfrm>
+            <a:off x="7763176" y="2675310"/>
+            <a:ext cx="2006386" cy="822932"/>
+          </a:xfrm>
+          <a:prstGeom prst="rect">
+            <a:avLst/>
+          </a:prstGeom>
+        </p:spPr>
+      </p:pic>
+      <p:pic>
+        <p:nvPicPr>
+          <p:cNvPr id="44" name="Picture 43" descr="A black background with white lines&#10;&#10;AI-generated content may be incorrect.">
+            <a:extLst>
+              <a:ext uri="{FF2B5EF4-FFF2-40B4-BE49-F238E27FC236}">
+                <a16:creationId xmlns:a16="http://schemas.microsoft.com/office/drawing/2014/main" id="{0B6C76C5-4249-0C18-A74A-5B20886EB26A}"/>
+              </a:ext>
+            </a:extLst>
+          </p:cNvPr>
+          <p:cNvPicPr>
+            <a:picLocks noChangeAspect="1"/>
+          </p:cNvPicPr>
+          <p:nvPr/>
+        </p:nvPicPr>
+        <p:blipFill>
+          <a:blip r:embed="rId18">
+            <a:extLst>
+              <a:ext uri="{28A0092B-C50C-407E-A947-70E740481C1C}">
+                <a14:useLocalDpi xmlns:a14="http://schemas.microsoft.com/office/drawing/2010/main" val="0"/>
+              </a:ext>
+            </a:extLst>
+          </a:blip>
+          <a:stretch>
+            <a:fillRect/>
+          </a:stretch>
+        </p:blipFill>
+        <p:spPr>
+          <a:xfrm>
+            <a:off x="7812813" y="3728766"/>
+            <a:ext cx="1907112" cy="822932"/>
+          </a:xfrm>
+          <a:prstGeom prst="rect">
+            <a:avLst/>
+          </a:prstGeom>
+        </p:spPr>
+      </p:pic>
+      <p:pic>
+        <p:nvPicPr>
+          <p:cNvPr id="48" name="Picture 47" descr="A black background with white lines&#10;&#10;AI-generated content may be incorrect.">
+            <a:extLst>
+              <a:ext uri="{FF2B5EF4-FFF2-40B4-BE49-F238E27FC236}">
+                <a16:creationId xmlns:a16="http://schemas.microsoft.com/office/drawing/2014/main" id="{B2B11986-1916-50BF-0FFC-A0628DA152D4}"/>
+              </a:ext>
+            </a:extLst>
+          </p:cNvPr>
+          <p:cNvPicPr>
+            <a:picLocks noChangeAspect="1"/>
+          </p:cNvPicPr>
+          <p:nvPr/>
+        </p:nvPicPr>
+        <p:blipFill>
+          <a:blip r:embed="rId19">
+            <a:extLst>
+              <a:ext uri="{28A0092B-C50C-407E-A947-70E740481C1C}">
+                <a14:useLocalDpi xmlns:a14="http://schemas.microsoft.com/office/drawing/2010/main" val="0"/>
+              </a:ext>
+            </a:extLst>
+          </a:blip>
+          <a:stretch>
+            <a:fillRect/>
+          </a:stretch>
+        </p:blipFill>
+        <p:spPr>
+          <a:xfrm>
+            <a:off x="7901494" y="4876858"/>
+            <a:ext cx="2006386" cy="822932"/>
+          </a:xfrm>
+          <a:prstGeom prst="rect">
+            <a:avLst/>
+          </a:prstGeom>
+        </p:spPr>
+      </p:pic>
+      <p:pic>
+        <p:nvPicPr>
+          <p:cNvPr id="52" name="Picture 51" descr="A black background with blue lines&#10;&#10;AI-generated content may be incorrect.">
+            <a:extLst>
+              <a:ext uri="{FF2B5EF4-FFF2-40B4-BE49-F238E27FC236}">
+                <a16:creationId xmlns:a16="http://schemas.microsoft.com/office/drawing/2014/main" id="{399E1670-D33A-6DFD-3316-3400FF3EEB1E}"/>
+              </a:ext>
+            </a:extLst>
+          </p:cNvPr>
+          <p:cNvPicPr>
+            <a:picLocks noChangeAspect="1"/>
+          </p:cNvPicPr>
+          <p:nvPr/>
+        </p:nvPicPr>
+        <p:blipFill>
+          <a:blip r:embed="rId20">
+            <a:extLst>
+              <a:ext uri="{28A0092B-C50C-407E-A947-70E740481C1C}">
+                <a14:useLocalDpi xmlns:a14="http://schemas.microsoft.com/office/drawing/2010/main" val="0"/>
+              </a:ext>
+            </a:extLst>
+          </a:blip>
+          <a:stretch>
+            <a:fillRect/>
+          </a:stretch>
+        </p:blipFill>
+        <p:spPr>
+          <a:xfrm>
+            <a:off x="7682878" y="1052253"/>
+            <a:ext cx="2006386" cy="822932"/>
+          </a:xfrm>
+          <a:prstGeom prst="rect">
+            <a:avLst/>
+          </a:prstGeom>
+        </p:spPr>
+      </p:pic>
+      <p:pic>
+        <p:nvPicPr>
+          <p:cNvPr id="56" name="Picture 55" descr="A black background with white lines&#10;&#10;AI-generated content may be incorrect.">
+            <a:extLst>
+              <a:ext uri="{FF2B5EF4-FFF2-40B4-BE49-F238E27FC236}">
+                <a16:creationId xmlns:a16="http://schemas.microsoft.com/office/drawing/2014/main" id="{9C3F900A-3886-4965-23AF-EE8EBC3A21CA}"/>
+              </a:ext>
+            </a:extLst>
+          </p:cNvPr>
+          <p:cNvPicPr>
+            <a:picLocks noChangeAspect="1"/>
+          </p:cNvPicPr>
+          <p:nvPr/>
+        </p:nvPicPr>
+        <p:blipFill>
+          <a:blip r:embed="rId21">
+            <a:extLst>
+              <a:ext uri="{28A0092B-C50C-407E-A947-70E740481C1C}">
+                <a14:useLocalDpi xmlns:a14="http://schemas.microsoft.com/office/drawing/2010/main" val="0"/>
+              </a:ext>
+            </a:extLst>
+          </a:blip>
+          <a:stretch>
+            <a:fillRect/>
+          </a:stretch>
+        </p:blipFill>
+        <p:spPr>
+          <a:xfrm>
+            <a:off x="7845140" y="5588283"/>
+            <a:ext cx="1907112" cy="822932"/>
+          </a:xfrm>
+          <a:prstGeom prst="rect">
+            <a:avLst/>
+          </a:prstGeom>
+        </p:spPr>
+      </p:pic>
+      <p:pic>
+        <p:nvPicPr>
+          <p:cNvPr id="60" name="Picture 59" descr="A graph of a graph&#10;&#10;AI-generated content may be incorrect.">
+            <a:extLst>
+              <a:ext uri="{FF2B5EF4-FFF2-40B4-BE49-F238E27FC236}">
+                <a16:creationId xmlns:a16="http://schemas.microsoft.com/office/drawing/2014/main" id="{AB9AF199-7BE4-7093-522B-10DDCBDC4AD1}"/>
+              </a:ext>
+            </a:extLst>
+          </p:cNvPr>
+          <p:cNvPicPr>
+            <a:picLocks noChangeAspect="1"/>
+          </p:cNvPicPr>
+          <p:nvPr/>
+        </p:nvPicPr>
+        <p:blipFill>
+          <a:blip r:embed="rId22">
+            <a:extLst>
+              <a:ext uri="{28A0092B-C50C-407E-A947-70E740481C1C}">
+                <a14:useLocalDpi xmlns:a14="http://schemas.microsoft.com/office/drawing/2010/main" val="0"/>
+              </a:ext>
+            </a:extLst>
+          </a:blip>
+          <a:stretch>
+            <a:fillRect/>
+          </a:stretch>
+        </p:blipFill>
+        <p:spPr>
+          <a:xfrm>
+            <a:off x="10052171" y="2628110"/>
+            <a:ext cx="1904499" cy="822932"/>
+          </a:xfrm>
+          <a:prstGeom prst="rect">
+            <a:avLst/>
+          </a:prstGeom>
+        </p:spPr>
+      </p:pic>
+      <p:pic>
+        <p:nvPicPr>
+          <p:cNvPr id="64" name="Picture 63" descr="A black and white image of a city&#10;&#10;AI-generated content may be incorrect.">
+            <a:extLst>
+              <a:ext uri="{FF2B5EF4-FFF2-40B4-BE49-F238E27FC236}">
+                <a16:creationId xmlns:a16="http://schemas.microsoft.com/office/drawing/2014/main" id="{98F2F79E-C255-B5AA-CF0B-A9F2055F2BC2}"/>
+              </a:ext>
+            </a:extLst>
+          </p:cNvPr>
+          <p:cNvPicPr>
+            <a:picLocks noChangeAspect="1"/>
+          </p:cNvPicPr>
+          <p:nvPr/>
+        </p:nvPicPr>
+        <p:blipFill>
+          <a:blip r:embed="rId23">
+            <a:extLst>
+              <a:ext uri="{28A0092B-C50C-407E-A947-70E740481C1C}">
+                <a14:useLocalDpi xmlns:a14="http://schemas.microsoft.com/office/drawing/2010/main" val="0"/>
+              </a:ext>
+            </a:extLst>
+          </a:blip>
+          <a:stretch>
+            <a:fillRect/>
+          </a:stretch>
+        </p:blipFill>
+        <p:spPr>
+          <a:xfrm>
+            <a:off x="10127693" y="3599777"/>
+            <a:ext cx="1904499" cy="822932"/>
+          </a:xfrm>
+          <a:prstGeom prst="rect">
+            <a:avLst/>
+          </a:prstGeom>
+        </p:spPr>
+      </p:pic>
+      <p:pic>
+        <p:nvPicPr>
+          <p:cNvPr id="68" name="Picture 67" descr="A green city skyline with a black background&#10;&#10;AI-generated content may be incorrect.">
+            <a:extLst>
+              <a:ext uri="{FF2B5EF4-FFF2-40B4-BE49-F238E27FC236}">
+                <a16:creationId xmlns:a16="http://schemas.microsoft.com/office/drawing/2014/main" id="{2D112147-2635-37D0-8B9F-9A632A20E274}"/>
+              </a:ext>
+            </a:extLst>
+          </p:cNvPr>
+          <p:cNvPicPr>
+            <a:picLocks noChangeAspect="1"/>
+          </p:cNvPicPr>
+          <p:nvPr/>
+        </p:nvPicPr>
+        <p:blipFill>
+          <a:blip r:embed="rId24">
+            <a:extLst>
+              <a:ext uri="{28A0092B-C50C-407E-A947-70E740481C1C}">
+                <a14:useLocalDpi xmlns:a14="http://schemas.microsoft.com/office/drawing/2010/main" val="0"/>
+              </a:ext>
+            </a:extLst>
+          </a:blip>
+          <a:stretch>
+            <a:fillRect/>
+          </a:stretch>
+        </p:blipFill>
+        <p:spPr>
+          <a:xfrm>
+            <a:off x="10183001" y="4596982"/>
+            <a:ext cx="2008999" cy="822932"/>
+          </a:xfrm>
+          <a:prstGeom prst="rect">
+            <a:avLst/>
+          </a:prstGeom>
+        </p:spPr>
+      </p:pic>
+      <p:pic>
+        <p:nvPicPr>
+          <p:cNvPr id="72" name="Picture 71" descr="A green and black screen&#10;&#10;AI-generated content may be incorrect.">
+            <a:extLst>
+              <a:ext uri="{FF2B5EF4-FFF2-40B4-BE49-F238E27FC236}">
+                <a16:creationId xmlns:a16="http://schemas.microsoft.com/office/drawing/2014/main" id="{225A5AFF-70FB-C7A7-8995-E495C1617E14}"/>
+              </a:ext>
+            </a:extLst>
+          </p:cNvPr>
+          <p:cNvPicPr>
+            <a:picLocks noChangeAspect="1"/>
+          </p:cNvPicPr>
+          <p:nvPr/>
+        </p:nvPicPr>
+        <p:blipFill>
+          <a:blip r:embed="rId25">
+            <a:extLst>
+              <a:ext uri="{28A0092B-C50C-407E-A947-70E740481C1C}">
+                <a14:useLocalDpi xmlns:a14="http://schemas.microsoft.com/office/drawing/2010/main" val="0"/>
+              </a:ext>
+            </a:extLst>
+          </a:blip>
+          <a:stretch>
+            <a:fillRect/>
+          </a:stretch>
+        </p:blipFill>
+        <p:spPr>
+          <a:xfrm>
+            <a:off x="10183001" y="5660024"/>
+            <a:ext cx="1904499" cy="822932"/>
+          </a:xfrm>
+          <a:prstGeom prst="rect">
+            <a:avLst/>
+          </a:prstGeom>
+        </p:spPr>
+      </p:pic>
+      <p:pic>
+        <p:nvPicPr>
+          <p:cNvPr id="81" name="Picture 80" descr="A black background with a black background and a black background&#10;&#10;AI-generated content may be incorrect.">
+            <a:extLst>
+              <a:ext uri="{FF2B5EF4-FFF2-40B4-BE49-F238E27FC236}">
+                <a16:creationId xmlns:a16="http://schemas.microsoft.com/office/drawing/2014/main" id="{45094C52-9B48-E4B4-FCE3-C62D7E006413}"/>
+              </a:ext>
+            </a:extLst>
+          </p:cNvPr>
+          <p:cNvPicPr>
+            <a:picLocks noChangeAspect="1"/>
+          </p:cNvPicPr>
+          <p:nvPr/>
+        </p:nvPicPr>
+        <p:blipFill>
+          <a:blip r:embed="rId26">
+            <a:extLst>
+              <a:ext uri="{28A0092B-C50C-407E-A947-70E740481C1C}">
+                <a14:useLocalDpi xmlns:a14="http://schemas.microsoft.com/office/drawing/2010/main" val="0"/>
+              </a:ext>
+            </a:extLst>
+          </a:blip>
+          <a:stretch>
+            <a:fillRect/>
+          </a:stretch>
+        </p:blipFill>
+        <p:spPr>
+          <a:xfrm>
+            <a:off x="9980299" y="1027149"/>
+            <a:ext cx="1904499" cy="822932"/>
+          </a:xfrm>
+          <a:prstGeom prst="rect">
+            <a:avLst/>
+          </a:prstGeom>
+        </p:spPr>
+      </p:pic>
+      <p:sp>
+        <p:nvSpPr>
+          <p:cNvPr id="97" name="TextBox 96">
+            <a:extLst>
+              <a:ext uri="{FF2B5EF4-FFF2-40B4-BE49-F238E27FC236}">
+                <a16:creationId xmlns:a16="http://schemas.microsoft.com/office/drawing/2014/main" id="{5560F636-4A97-2FF0-9807-7B24DD2CB005}"/>
+              </a:ext>
+            </a:extLst>
+          </p:cNvPr>
+          <p:cNvSpPr txBox="1"/>
+          <p:nvPr/>
+        </p:nvSpPr>
+        <p:spPr>
+          <a:xfrm>
+            <a:off x="153567" y="166574"/>
+            <a:ext cx="1032779" cy="276999"/>
+          </a:xfrm>
+          <a:prstGeom prst="rect">
+            <a:avLst/>
+          </a:prstGeom>
+          <a:noFill/>
+        </p:spPr>
+        <p:txBody>
+          <a:bodyPr wrap="square" rtlCol="0" anchor="ctr">
+            <a:spAutoFit/>
+          </a:bodyPr>
+          <a:lstStyle/>
+          <a:p>
+            <a:pPr algn="ctr"/>
+            <a:r>
+              <a:rPr lang="en-US" altLang="zh-CN" sz="1200" b="1" i="1" dirty="0">
+                <a:latin typeface="Arial" panose="020B0604020202020204" pitchFamily="34" charset="0"/>
+                <a:cs typeface="Arial" panose="020B0604020202020204" pitchFamily="34" charset="0"/>
+              </a:rPr>
+              <a:t>Basic-2 ton</a:t>
+            </a:r>
+            <a:endParaRPr lang="zh-CN" altLang="en-US" sz="1200" b="1" i="1" dirty="0">
+              <a:latin typeface="Arial" panose="020B0604020202020204" pitchFamily="34" charset="0"/>
+              <a:cs typeface="Arial" panose="020B0604020202020204" pitchFamily="34" charset="0"/>
+            </a:endParaRPr>
+          </a:p>
+        </p:txBody>
+      </p:sp>
+      <p:sp>
+        <p:nvSpPr>
+          <p:cNvPr id="98" name="TextBox 97">
+            <a:extLst>
+              <a:ext uri="{FF2B5EF4-FFF2-40B4-BE49-F238E27FC236}">
+                <a16:creationId xmlns:a16="http://schemas.microsoft.com/office/drawing/2014/main" id="{F8C6E3E6-C85E-F29A-9A84-53C36417123C}"/>
+              </a:ext>
+            </a:extLst>
+          </p:cNvPr>
+          <p:cNvSpPr txBox="1"/>
+          <p:nvPr/>
+        </p:nvSpPr>
+        <p:spPr>
+          <a:xfrm>
+            <a:off x="138281" y="694973"/>
+            <a:ext cx="1032779" cy="276999"/>
+          </a:xfrm>
+          <a:prstGeom prst="rect">
+            <a:avLst/>
+          </a:prstGeom>
+          <a:noFill/>
+        </p:spPr>
+        <p:txBody>
+          <a:bodyPr wrap="square" rtlCol="0" anchor="ctr">
+            <a:spAutoFit/>
+          </a:bodyPr>
+          <a:lstStyle/>
+          <a:p>
+            <a:pPr algn="ctr"/>
+            <a:r>
+              <a:rPr lang="en-US" altLang="zh-CN" sz="1200" b="1" i="1" dirty="0">
+                <a:latin typeface="Arial" panose="020B0604020202020204" pitchFamily="34" charset="0"/>
+                <a:cs typeface="Arial" panose="020B0604020202020204" pitchFamily="34" charset="0"/>
+              </a:rPr>
+              <a:t>Basic-4 ton</a:t>
+            </a:r>
+            <a:endParaRPr lang="zh-CN" altLang="en-US" sz="1200" b="1" i="1" dirty="0">
+              <a:latin typeface="Arial" panose="020B0604020202020204" pitchFamily="34" charset="0"/>
+              <a:cs typeface="Arial" panose="020B0604020202020204" pitchFamily="34" charset="0"/>
+            </a:endParaRPr>
+          </a:p>
+        </p:txBody>
+      </p:sp>
+      <p:sp>
+        <p:nvSpPr>
+          <p:cNvPr id="99" name="TextBox 98">
+            <a:extLst>
+              <a:ext uri="{FF2B5EF4-FFF2-40B4-BE49-F238E27FC236}">
+                <a16:creationId xmlns:a16="http://schemas.microsoft.com/office/drawing/2014/main" id="{50420105-F840-A46A-60C8-4AEF651DE053}"/>
+              </a:ext>
+            </a:extLst>
+          </p:cNvPr>
+          <p:cNvSpPr txBox="1"/>
+          <p:nvPr/>
+        </p:nvSpPr>
+        <p:spPr>
+          <a:xfrm>
+            <a:off x="153567" y="2021240"/>
+            <a:ext cx="890358" cy="276999"/>
+          </a:xfrm>
+          <a:prstGeom prst="rect">
+            <a:avLst/>
+          </a:prstGeom>
+          <a:noFill/>
+        </p:spPr>
+        <p:txBody>
+          <a:bodyPr wrap="square" rtlCol="0" anchor="ctr">
+            <a:spAutoFit/>
+          </a:bodyPr>
+          <a:lstStyle/>
+          <a:p>
+            <a:pPr algn="ctr"/>
+            <a:r>
+              <a:rPr lang="en-US" altLang="zh-CN" sz="1200" b="1" i="1" dirty="0">
+                <a:latin typeface="Arial" panose="020B0604020202020204" pitchFamily="34" charset="0"/>
+                <a:cs typeface="Arial" panose="020B0604020202020204" pitchFamily="34" charset="0"/>
+              </a:rPr>
+              <a:t>Van-4 ton</a:t>
+            </a:r>
+            <a:endParaRPr lang="zh-CN" altLang="en-US" sz="1200" b="1" i="1" dirty="0">
+              <a:latin typeface="Arial" panose="020B0604020202020204" pitchFamily="34" charset="0"/>
+              <a:cs typeface="Arial" panose="020B0604020202020204" pitchFamily="34" charset="0"/>
+            </a:endParaRPr>
+          </a:p>
+        </p:txBody>
+      </p:sp>
+    </p:spTree>
+    <p:extLst>
+      <p:ext uri="{BB962C8B-B14F-4D97-AF65-F5344CB8AC3E}">
+        <p14:creationId xmlns:p14="http://schemas.microsoft.com/office/powerpoint/2010/main" val="2387148937"/>
+      </p:ext>
+    </p:extLst>
+  </p:cSld>
+  <p:clrMapOvr>
+    <a:masterClrMapping/>
+  </p:clrMapOvr>
+</p:sld>
+</file>
+
 <file path=ppt/theme/theme1.xml><?xml version="1.0" encoding="utf-8"?>
 <a:theme xmlns:a="http://schemas.openxmlformats.org/drawingml/2006/main" name="Office Theme">
   <a:themeElements>

</xml_diff>

<commit_message>
add more SA scenario and corresponding plotting codes
</commit_message>
<xml_diff>
--- a/figures/freightEmissions/figuresSA.pptx
+++ b/figures/freightEmissions/figuresSA.pptx
@@ -4,10 +4,14 @@
   <p:sldMasterIdLst>
     <p:sldMasterId id="2147483648" r:id="rId1"/>
   </p:sldMasterIdLst>
+  <p:notesMasterIdLst>
+    <p:notesMasterId r:id="rId6"/>
+  </p:notesMasterIdLst>
   <p:sldIdLst>
     <p:sldId id="256" r:id="rId2"/>
     <p:sldId id="257" r:id="rId3"/>
     <p:sldId id="258" r:id="rId4"/>
+    <p:sldId id="259" r:id="rId5"/>
   </p:sldIdLst>
   <p:sldSz cx="12192000" cy="6858000"/>
   <p:notesSz cx="6858000" cy="9144000"/>
@@ -112,6 +116,523 @@
     </p:ext>
   </p:extLst>
 </p:presentation>
+</file>
+
+<file path=ppt/notesMasters/notesMaster1.xml><?xml version="1.0" encoding="utf-8"?>
+<p:notesMaster xmlns:a="http://schemas.openxmlformats.org/drawingml/2006/main" xmlns:r="http://schemas.openxmlformats.org/officeDocument/2006/relationships" xmlns:p="http://schemas.openxmlformats.org/presentationml/2006/main">
+  <p:cSld>
+    <p:bg>
+      <p:bgRef idx="1001">
+        <a:schemeClr val="bg1"/>
+      </p:bgRef>
+    </p:bg>
+    <p:spTree>
+      <p:nvGrpSpPr>
+        <p:cNvPr id="1" name=""/>
+        <p:cNvGrpSpPr/>
+        <p:nvPr/>
+      </p:nvGrpSpPr>
+      <p:grpSpPr>
+        <a:xfrm>
+          <a:off x="0" y="0"/>
+          <a:ext cx="0" cy="0"/>
+          <a:chOff x="0" y="0"/>
+          <a:chExt cx="0" cy="0"/>
+        </a:xfrm>
+      </p:grpSpPr>
+      <p:sp>
+        <p:nvSpPr>
+          <p:cNvPr id="2" name="Header Placeholder 1"/>
+          <p:cNvSpPr>
+            <a:spLocks noGrp="1"/>
+          </p:cNvSpPr>
+          <p:nvPr>
+            <p:ph type="hdr" sz="quarter"/>
+          </p:nvPr>
+        </p:nvSpPr>
+        <p:spPr>
+          <a:xfrm>
+            <a:off x="0" y="0"/>
+            <a:ext cx="2971800" cy="458788"/>
+          </a:xfrm>
+          <a:prstGeom prst="rect">
+            <a:avLst/>
+          </a:prstGeom>
+        </p:spPr>
+        <p:txBody>
+          <a:bodyPr vert="horz" lIns="91440" tIns="45720" rIns="91440" bIns="45720" rtlCol="0"/>
+          <a:lstStyle>
+            <a:lvl1pPr algn="l">
+              <a:defRPr sz="1200"/>
+            </a:lvl1pPr>
+          </a:lstStyle>
+          <a:p>
+            <a:endParaRPr lang="en-US"/>
+          </a:p>
+        </p:txBody>
+      </p:sp>
+      <p:sp>
+        <p:nvSpPr>
+          <p:cNvPr id="3" name="Date Placeholder 2"/>
+          <p:cNvSpPr>
+            <a:spLocks noGrp="1"/>
+          </p:cNvSpPr>
+          <p:nvPr>
+            <p:ph type="dt" idx="1"/>
+          </p:nvPr>
+        </p:nvSpPr>
+        <p:spPr>
+          <a:xfrm>
+            <a:off x="3884613" y="0"/>
+            <a:ext cx="2971800" cy="458788"/>
+          </a:xfrm>
+          <a:prstGeom prst="rect">
+            <a:avLst/>
+          </a:prstGeom>
+        </p:spPr>
+        <p:txBody>
+          <a:bodyPr vert="horz" lIns="91440" tIns="45720" rIns="91440" bIns="45720" rtlCol="0"/>
+          <a:lstStyle>
+            <a:lvl1pPr algn="r">
+              <a:defRPr sz="1200"/>
+            </a:lvl1pPr>
+          </a:lstStyle>
+          <a:p>
+            <a:fld id="{80297F9E-BB6D-464C-AE75-F6B82B206DD7}" type="datetimeFigureOut">
+              <a:rPr lang="en-US" smtClean="0"/>
+              <a:t>4/3/25</a:t>
+            </a:fld>
+            <a:endParaRPr lang="en-US"/>
+          </a:p>
+        </p:txBody>
+      </p:sp>
+      <p:sp>
+        <p:nvSpPr>
+          <p:cNvPr id="4" name="Slide Image Placeholder 3"/>
+          <p:cNvSpPr>
+            <a:spLocks noGrp="1" noRot="1" noChangeAspect="1"/>
+          </p:cNvSpPr>
+          <p:nvPr>
+            <p:ph type="sldImg" idx="2"/>
+          </p:nvPr>
+        </p:nvSpPr>
+        <p:spPr>
+          <a:xfrm>
+            <a:off x="685800" y="1143000"/>
+            <a:ext cx="5486400" cy="3086100"/>
+          </a:xfrm>
+          <a:prstGeom prst="rect">
+            <a:avLst/>
+          </a:prstGeom>
+          <a:noFill/>
+          <a:ln w="12700">
+            <a:solidFill>
+              <a:prstClr val="black"/>
+            </a:solidFill>
+          </a:ln>
+        </p:spPr>
+        <p:txBody>
+          <a:bodyPr vert="horz" lIns="91440" tIns="45720" rIns="91440" bIns="45720" rtlCol="0" anchor="ctr"/>
+          <a:lstStyle/>
+          <a:p>
+            <a:endParaRPr lang="en-US"/>
+          </a:p>
+        </p:txBody>
+      </p:sp>
+      <p:sp>
+        <p:nvSpPr>
+          <p:cNvPr id="5" name="Notes Placeholder 4"/>
+          <p:cNvSpPr>
+            <a:spLocks noGrp="1"/>
+          </p:cNvSpPr>
+          <p:nvPr>
+            <p:ph type="body" sz="quarter" idx="3"/>
+          </p:nvPr>
+        </p:nvSpPr>
+        <p:spPr>
+          <a:xfrm>
+            <a:off x="685800" y="4400550"/>
+            <a:ext cx="5486400" cy="3600450"/>
+          </a:xfrm>
+          <a:prstGeom prst="rect">
+            <a:avLst/>
+          </a:prstGeom>
+        </p:spPr>
+        <p:txBody>
+          <a:bodyPr vert="horz" lIns="91440" tIns="45720" rIns="91440" bIns="45720" rtlCol="0"/>
+          <a:lstStyle/>
+          <a:p>
+            <a:pPr lvl="0"/>
+            <a:r>
+              <a:rPr lang="en-US"/>
+              <a:t>Click to edit Master text styles</a:t>
+            </a:r>
+          </a:p>
+          <a:p>
+            <a:pPr lvl="1"/>
+            <a:r>
+              <a:rPr lang="en-US"/>
+              <a:t>Second level</a:t>
+            </a:r>
+          </a:p>
+          <a:p>
+            <a:pPr lvl="2"/>
+            <a:r>
+              <a:rPr lang="en-US"/>
+              <a:t>Third level</a:t>
+            </a:r>
+          </a:p>
+          <a:p>
+            <a:pPr lvl="3"/>
+            <a:r>
+              <a:rPr lang="en-US"/>
+              <a:t>Fourth level</a:t>
+            </a:r>
+          </a:p>
+          <a:p>
+            <a:pPr lvl="4"/>
+            <a:r>
+              <a:rPr lang="en-US"/>
+              <a:t>Fifth level</a:t>
+            </a:r>
+          </a:p>
+        </p:txBody>
+      </p:sp>
+      <p:sp>
+        <p:nvSpPr>
+          <p:cNvPr id="6" name="Footer Placeholder 5"/>
+          <p:cNvSpPr>
+            <a:spLocks noGrp="1"/>
+          </p:cNvSpPr>
+          <p:nvPr>
+            <p:ph type="ftr" sz="quarter" idx="4"/>
+          </p:nvPr>
+        </p:nvSpPr>
+        <p:spPr>
+          <a:xfrm>
+            <a:off x="0" y="8685213"/>
+            <a:ext cx="2971800" cy="458787"/>
+          </a:xfrm>
+          <a:prstGeom prst="rect">
+            <a:avLst/>
+          </a:prstGeom>
+        </p:spPr>
+        <p:txBody>
+          <a:bodyPr vert="horz" lIns="91440" tIns="45720" rIns="91440" bIns="45720" rtlCol="0" anchor="b"/>
+          <a:lstStyle>
+            <a:lvl1pPr algn="l">
+              <a:defRPr sz="1200"/>
+            </a:lvl1pPr>
+          </a:lstStyle>
+          <a:p>
+            <a:endParaRPr lang="en-US"/>
+          </a:p>
+        </p:txBody>
+      </p:sp>
+      <p:sp>
+        <p:nvSpPr>
+          <p:cNvPr id="7" name="Slide Number Placeholder 6"/>
+          <p:cNvSpPr>
+            <a:spLocks noGrp="1"/>
+          </p:cNvSpPr>
+          <p:nvPr>
+            <p:ph type="sldNum" sz="quarter" idx="5"/>
+          </p:nvPr>
+        </p:nvSpPr>
+        <p:spPr>
+          <a:xfrm>
+            <a:off x="3884613" y="8685213"/>
+            <a:ext cx="2971800" cy="458787"/>
+          </a:xfrm>
+          <a:prstGeom prst="rect">
+            <a:avLst/>
+          </a:prstGeom>
+        </p:spPr>
+        <p:txBody>
+          <a:bodyPr vert="horz" lIns="91440" tIns="45720" rIns="91440" bIns="45720" rtlCol="0" anchor="b"/>
+          <a:lstStyle>
+            <a:lvl1pPr algn="r">
+              <a:defRPr sz="1200"/>
+            </a:lvl1pPr>
+          </a:lstStyle>
+          <a:p>
+            <a:fld id="{3DD87292-5D51-F841-AFD9-79B741608C82}" type="slidenum">
+              <a:rPr lang="en-US" smtClean="0"/>
+              <a:t>‹#›</a:t>
+            </a:fld>
+            <a:endParaRPr lang="en-US"/>
+          </a:p>
+        </p:txBody>
+      </p:sp>
+    </p:spTree>
+    <p:extLst>
+      <p:ext uri="{BB962C8B-B14F-4D97-AF65-F5344CB8AC3E}">
+        <p14:creationId xmlns:p14="http://schemas.microsoft.com/office/powerpoint/2010/main" val="2938205666"/>
+      </p:ext>
+    </p:extLst>
+  </p:cSld>
+  <p:clrMap bg1="lt1" tx1="dk1" bg2="lt2" tx2="dk2" accent1="accent1" accent2="accent2" accent3="accent3" accent4="accent4" accent5="accent5" accent6="accent6" hlink="hlink" folHlink="folHlink"/>
+  <p:notesStyle>
+    <a:lvl1pPr marL="0" algn="l" defTabSz="914400" rtl="0" eaLnBrk="1" latinLnBrk="0" hangingPunct="1">
+      <a:defRPr sz="1200" kern="1200">
+        <a:solidFill>
+          <a:schemeClr val="tx1"/>
+        </a:solidFill>
+        <a:latin typeface="+mn-lt"/>
+        <a:ea typeface="+mn-ea"/>
+        <a:cs typeface="+mn-cs"/>
+      </a:defRPr>
+    </a:lvl1pPr>
+    <a:lvl2pPr marL="457200" algn="l" defTabSz="914400" rtl="0" eaLnBrk="1" latinLnBrk="0" hangingPunct="1">
+      <a:defRPr sz="1200" kern="1200">
+        <a:solidFill>
+          <a:schemeClr val="tx1"/>
+        </a:solidFill>
+        <a:latin typeface="+mn-lt"/>
+        <a:ea typeface="+mn-ea"/>
+        <a:cs typeface="+mn-cs"/>
+      </a:defRPr>
+    </a:lvl2pPr>
+    <a:lvl3pPr marL="914400" algn="l" defTabSz="914400" rtl="0" eaLnBrk="1" latinLnBrk="0" hangingPunct="1">
+      <a:defRPr sz="1200" kern="1200">
+        <a:solidFill>
+          <a:schemeClr val="tx1"/>
+        </a:solidFill>
+        <a:latin typeface="+mn-lt"/>
+        <a:ea typeface="+mn-ea"/>
+        <a:cs typeface="+mn-cs"/>
+      </a:defRPr>
+    </a:lvl3pPr>
+    <a:lvl4pPr marL="1371600" algn="l" defTabSz="914400" rtl="0" eaLnBrk="1" latinLnBrk="0" hangingPunct="1">
+      <a:defRPr sz="1200" kern="1200">
+        <a:solidFill>
+          <a:schemeClr val="tx1"/>
+        </a:solidFill>
+        <a:latin typeface="+mn-lt"/>
+        <a:ea typeface="+mn-ea"/>
+        <a:cs typeface="+mn-cs"/>
+      </a:defRPr>
+    </a:lvl4pPr>
+    <a:lvl5pPr marL="1828800" algn="l" defTabSz="914400" rtl="0" eaLnBrk="1" latinLnBrk="0" hangingPunct="1">
+      <a:defRPr sz="1200" kern="1200">
+        <a:solidFill>
+          <a:schemeClr val="tx1"/>
+        </a:solidFill>
+        <a:latin typeface="+mn-lt"/>
+        <a:ea typeface="+mn-ea"/>
+        <a:cs typeface="+mn-cs"/>
+      </a:defRPr>
+    </a:lvl5pPr>
+    <a:lvl6pPr marL="2286000" algn="l" defTabSz="914400" rtl="0" eaLnBrk="1" latinLnBrk="0" hangingPunct="1">
+      <a:defRPr sz="1200" kern="1200">
+        <a:solidFill>
+          <a:schemeClr val="tx1"/>
+        </a:solidFill>
+        <a:latin typeface="+mn-lt"/>
+        <a:ea typeface="+mn-ea"/>
+        <a:cs typeface="+mn-cs"/>
+      </a:defRPr>
+    </a:lvl6pPr>
+    <a:lvl7pPr marL="2743200" algn="l" defTabSz="914400" rtl="0" eaLnBrk="1" latinLnBrk="0" hangingPunct="1">
+      <a:defRPr sz="1200" kern="1200">
+        <a:solidFill>
+          <a:schemeClr val="tx1"/>
+        </a:solidFill>
+        <a:latin typeface="+mn-lt"/>
+        <a:ea typeface="+mn-ea"/>
+        <a:cs typeface="+mn-cs"/>
+      </a:defRPr>
+    </a:lvl7pPr>
+    <a:lvl8pPr marL="3200400" algn="l" defTabSz="914400" rtl="0" eaLnBrk="1" latinLnBrk="0" hangingPunct="1">
+      <a:defRPr sz="1200" kern="1200">
+        <a:solidFill>
+          <a:schemeClr val="tx1"/>
+        </a:solidFill>
+        <a:latin typeface="+mn-lt"/>
+        <a:ea typeface="+mn-ea"/>
+        <a:cs typeface="+mn-cs"/>
+      </a:defRPr>
+    </a:lvl8pPr>
+    <a:lvl9pPr marL="3657600" algn="l" defTabSz="914400" rtl="0" eaLnBrk="1" latinLnBrk="0" hangingPunct="1">
+      <a:defRPr sz="1200" kern="1200">
+        <a:solidFill>
+          <a:schemeClr val="tx1"/>
+        </a:solidFill>
+        <a:latin typeface="+mn-lt"/>
+        <a:ea typeface="+mn-ea"/>
+        <a:cs typeface="+mn-cs"/>
+      </a:defRPr>
+    </a:lvl9pPr>
+  </p:notesStyle>
+</p:notesMaster>
+</file>
+
+<file path=ppt/notesSlides/notesSlide1.xml><?xml version="1.0" encoding="utf-8"?>
+<p:notes xmlns:a="http://schemas.openxmlformats.org/drawingml/2006/main" xmlns:r="http://schemas.openxmlformats.org/officeDocument/2006/relationships" xmlns:p="http://schemas.openxmlformats.org/presentationml/2006/main">
+  <p:cSld>
+    <p:spTree>
+      <p:nvGrpSpPr>
+        <p:cNvPr id="1" name=""/>
+        <p:cNvGrpSpPr/>
+        <p:nvPr/>
+      </p:nvGrpSpPr>
+      <p:grpSpPr>
+        <a:xfrm>
+          <a:off x="0" y="0"/>
+          <a:ext cx="0" cy="0"/>
+          <a:chOff x="0" y="0"/>
+          <a:chExt cx="0" cy="0"/>
+        </a:xfrm>
+      </p:grpSpPr>
+      <p:sp>
+        <p:nvSpPr>
+          <p:cNvPr id="2" name="Slide Image Placeholder 1"/>
+          <p:cNvSpPr>
+            <a:spLocks noGrp="1" noRot="1" noChangeAspect="1"/>
+          </p:cNvSpPr>
+          <p:nvPr>
+            <p:ph type="sldImg"/>
+          </p:nvPr>
+        </p:nvSpPr>
+        <p:spPr/>
+      </p:sp>
+      <p:sp>
+        <p:nvSpPr>
+          <p:cNvPr id="3" name="Notes Placeholder 2"/>
+          <p:cNvSpPr>
+            <a:spLocks noGrp="1"/>
+          </p:cNvSpPr>
+          <p:nvPr>
+            <p:ph type="body" idx="1"/>
+          </p:nvPr>
+        </p:nvSpPr>
+        <p:spPr/>
+        <p:txBody>
+          <a:bodyPr/>
+          <a:lstStyle/>
+          <a:p>
+            <a:endParaRPr lang="en-US" dirty="0"/>
+          </a:p>
+        </p:txBody>
+      </p:sp>
+      <p:sp>
+        <p:nvSpPr>
+          <p:cNvPr id="4" name="Slide Number Placeholder 3"/>
+          <p:cNvSpPr>
+            <a:spLocks noGrp="1"/>
+          </p:cNvSpPr>
+          <p:nvPr>
+            <p:ph type="sldNum" sz="quarter" idx="5"/>
+          </p:nvPr>
+        </p:nvSpPr>
+        <p:spPr/>
+        <p:txBody>
+          <a:bodyPr/>
+          <a:lstStyle/>
+          <a:p>
+            <a:fld id="{3DD87292-5D51-F841-AFD9-79B741608C82}" type="slidenum">
+              <a:rPr lang="en-US" smtClean="0"/>
+              <a:t>3</a:t>
+            </a:fld>
+            <a:endParaRPr lang="en-US"/>
+          </a:p>
+        </p:txBody>
+      </p:sp>
+    </p:spTree>
+    <p:extLst>
+      <p:ext uri="{BB962C8B-B14F-4D97-AF65-F5344CB8AC3E}">
+        <p14:creationId xmlns:p14="http://schemas.microsoft.com/office/powerpoint/2010/main" val="4271528490"/>
+      </p:ext>
+    </p:extLst>
+  </p:cSld>
+  <p:clrMapOvr>
+    <a:masterClrMapping/>
+  </p:clrMapOvr>
+</p:notes>
+</file>
+
+<file path=ppt/notesSlides/notesSlide2.xml><?xml version="1.0" encoding="utf-8"?>
+<p:notes xmlns:a="http://schemas.openxmlformats.org/drawingml/2006/main" xmlns:r="http://schemas.openxmlformats.org/officeDocument/2006/relationships" xmlns:p="http://schemas.openxmlformats.org/presentationml/2006/main">
+  <p:cSld>
+    <p:spTree>
+      <p:nvGrpSpPr>
+        <p:cNvPr id="1" name=""/>
+        <p:cNvGrpSpPr/>
+        <p:nvPr/>
+      </p:nvGrpSpPr>
+      <p:grpSpPr>
+        <a:xfrm>
+          <a:off x="0" y="0"/>
+          <a:ext cx="0" cy="0"/>
+          <a:chOff x="0" y="0"/>
+          <a:chExt cx="0" cy="0"/>
+        </a:xfrm>
+      </p:grpSpPr>
+      <p:sp>
+        <p:nvSpPr>
+          <p:cNvPr id="2" name="Slide Image Placeholder 1"/>
+          <p:cNvSpPr>
+            <a:spLocks noGrp="1" noRot="1" noChangeAspect="1"/>
+          </p:cNvSpPr>
+          <p:nvPr>
+            <p:ph type="sldImg"/>
+          </p:nvPr>
+        </p:nvSpPr>
+        <p:spPr/>
+      </p:sp>
+      <p:sp>
+        <p:nvSpPr>
+          <p:cNvPr id="3" name="Notes Placeholder 2"/>
+          <p:cNvSpPr>
+            <a:spLocks noGrp="1"/>
+          </p:cNvSpPr>
+          <p:nvPr>
+            <p:ph type="body" idx="1"/>
+          </p:nvPr>
+        </p:nvSpPr>
+        <p:spPr/>
+        <p:txBody>
+          <a:bodyPr/>
+          <a:lstStyle/>
+          <a:p>
+            <a:endParaRPr lang="en-US"/>
+          </a:p>
+        </p:txBody>
+      </p:sp>
+      <p:sp>
+        <p:nvSpPr>
+          <p:cNvPr id="4" name="Slide Number Placeholder 3"/>
+          <p:cNvSpPr>
+            <a:spLocks noGrp="1"/>
+          </p:cNvSpPr>
+          <p:nvPr>
+            <p:ph type="sldNum" sz="quarter" idx="5"/>
+          </p:nvPr>
+        </p:nvSpPr>
+        <p:spPr/>
+        <p:txBody>
+          <a:bodyPr/>
+          <a:lstStyle/>
+          <a:p>
+            <a:fld id="{3DD87292-5D51-F841-AFD9-79B741608C82}" type="slidenum">
+              <a:rPr lang="en-US" smtClean="0"/>
+              <a:t>4</a:t>
+            </a:fld>
+            <a:endParaRPr lang="en-US"/>
+          </a:p>
+        </p:txBody>
+      </p:sp>
+    </p:spTree>
+    <p:extLst>
+      <p:ext uri="{BB962C8B-B14F-4D97-AF65-F5344CB8AC3E}">
+        <p14:creationId xmlns:p14="http://schemas.microsoft.com/office/powerpoint/2010/main" val="3906442240"/>
+      </p:ext>
+    </p:extLst>
+  </p:cSld>
+  <p:clrMapOvr>
+    <a:masterClrMapping/>
+  </p:clrMapOvr>
+</p:notes>
 </file>
 
 <file path=ppt/slideLayouts/slideLayout1.xml><?xml version="1.0" encoding="utf-8"?>
@@ -7102,7 +7623,7 @@
           <p:nvPr/>
         </p:nvPicPr>
         <p:blipFill>
-          <a:blip r:embed="rId2">
+          <a:blip r:embed="rId3">
             <a:extLst>
               <a:ext uri="{28A0092B-C50C-407E-A947-70E740481C1C}">
                 <a14:useLocalDpi xmlns:a14="http://schemas.microsoft.com/office/drawing/2010/main" val="0"/>
@@ -7138,7 +7659,7 @@
           <p:nvPr/>
         </p:nvPicPr>
         <p:blipFill>
-          <a:blip r:embed="rId3">
+          <a:blip r:embed="rId4">
             <a:extLst>
               <a:ext uri="{28A0092B-C50C-407E-A947-70E740481C1C}">
                 <a14:useLocalDpi xmlns:a14="http://schemas.microsoft.com/office/drawing/2010/main" val="0"/>
@@ -7174,7 +7695,7 @@
           <p:nvPr/>
         </p:nvPicPr>
         <p:blipFill>
-          <a:blip r:embed="rId4">
+          <a:blip r:embed="rId5">
             <a:extLst>
               <a:ext uri="{28A0092B-C50C-407E-A947-70E740481C1C}">
                 <a14:useLocalDpi xmlns:a14="http://schemas.microsoft.com/office/drawing/2010/main" val="0"/>
@@ -7210,7 +7731,7 @@
           <p:nvPr/>
         </p:nvPicPr>
         <p:blipFill>
-          <a:blip r:embed="rId5">
+          <a:blip r:embed="rId6">
             <a:extLst>
               <a:ext uri="{28A0092B-C50C-407E-A947-70E740481C1C}">
                 <a14:useLocalDpi xmlns:a14="http://schemas.microsoft.com/office/drawing/2010/main" val="0"/>
@@ -7246,7 +7767,7 @@
           <p:nvPr/>
         </p:nvPicPr>
         <p:blipFill>
-          <a:blip r:embed="rId6">
+          <a:blip r:embed="rId7">
             <a:extLst>
               <a:ext uri="{28A0092B-C50C-407E-A947-70E740481C1C}">
                 <a14:useLocalDpi xmlns:a14="http://schemas.microsoft.com/office/drawing/2010/main" val="0"/>
@@ -7259,7 +7780,7 @@
         </p:blipFill>
         <p:spPr>
           <a:xfrm>
-            <a:off x="1527409" y="1041803"/>
+            <a:off x="1603768" y="1041803"/>
             <a:ext cx="2008999" cy="822932"/>
           </a:xfrm>
           <a:prstGeom prst="rect">
@@ -7282,7 +7803,7 @@
           <p:nvPr/>
         </p:nvPicPr>
         <p:blipFill>
-          <a:blip r:embed="rId7">
+          <a:blip r:embed="rId8">
             <a:extLst>
               <a:ext uri="{28A0092B-C50C-407E-A947-70E740481C1C}">
                 <a14:useLocalDpi xmlns:a14="http://schemas.microsoft.com/office/drawing/2010/main" val="0"/>
@@ -7318,7 +7839,7 @@
           <p:nvPr/>
         </p:nvPicPr>
         <p:blipFill>
-          <a:blip r:embed="rId8">
+          <a:blip r:embed="rId9">
             <a:extLst>
               <a:ext uri="{28A0092B-C50C-407E-A947-70E740481C1C}">
                 <a14:useLocalDpi xmlns:a14="http://schemas.microsoft.com/office/drawing/2010/main" val="0"/>
@@ -7354,7 +7875,7 @@
           <p:nvPr/>
         </p:nvPicPr>
         <p:blipFill>
-          <a:blip r:embed="rId9">
+          <a:blip r:embed="rId10">
             <a:extLst>
               <a:ext uri="{28A0092B-C50C-407E-A947-70E740481C1C}">
                 <a14:useLocalDpi xmlns:a14="http://schemas.microsoft.com/office/drawing/2010/main" val="0"/>
@@ -7390,7 +7911,7 @@
           <p:nvPr/>
         </p:nvPicPr>
         <p:blipFill>
-          <a:blip r:embed="rId10">
+          <a:blip r:embed="rId11">
             <a:extLst>
               <a:ext uri="{28A0092B-C50C-407E-A947-70E740481C1C}">
                 <a14:useLocalDpi xmlns:a14="http://schemas.microsoft.com/office/drawing/2010/main" val="0"/>
@@ -7426,7 +7947,7 @@
           <p:nvPr/>
         </p:nvPicPr>
         <p:blipFill>
-          <a:blip r:embed="rId11">
+          <a:blip r:embed="rId12">
             <a:extLst>
               <a:ext uri="{28A0092B-C50C-407E-A947-70E740481C1C}">
                 <a14:useLocalDpi xmlns:a14="http://schemas.microsoft.com/office/drawing/2010/main" val="0"/>
@@ -7462,7 +7983,7 @@
           <p:nvPr/>
         </p:nvPicPr>
         <p:blipFill>
-          <a:blip r:embed="rId12">
+          <a:blip r:embed="rId13">
             <a:extLst>
               <a:ext uri="{28A0092B-C50C-407E-A947-70E740481C1C}">
                 <a14:useLocalDpi xmlns:a14="http://schemas.microsoft.com/office/drawing/2010/main" val="0"/>
@@ -7498,7 +8019,7 @@
           <p:nvPr/>
         </p:nvPicPr>
         <p:blipFill>
-          <a:blip r:embed="rId13">
+          <a:blip r:embed="rId14">
             <a:extLst>
               <a:ext uri="{28A0092B-C50C-407E-A947-70E740481C1C}">
                 <a14:useLocalDpi xmlns:a14="http://schemas.microsoft.com/office/drawing/2010/main" val="0"/>
@@ -7534,7 +8055,7 @@
           <p:nvPr/>
         </p:nvPicPr>
         <p:blipFill>
-          <a:blip r:embed="rId14">
+          <a:blip r:embed="rId15">
             <a:extLst>
               <a:ext uri="{28A0092B-C50C-407E-A947-70E740481C1C}">
                 <a14:useLocalDpi xmlns:a14="http://schemas.microsoft.com/office/drawing/2010/main" val="0"/>
@@ -7570,7 +8091,7 @@
           <p:nvPr/>
         </p:nvPicPr>
         <p:blipFill>
-          <a:blip r:embed="rId15">
+          <a:blip r:embed="rId16">
             <a:extLst>
               <a:ext uri="{28A0092B-C50C-407E-A947-70E740481C1C}">
                 <a14:useLocalDpi xmlns:a14="http://schemas.microsoft.com/office/drawing/2010/main" val="0"/>
@@ -7606,7 +8127,7 @@
           <p:nvPr/>
         </p:nvPicPr>
         <p:blipFill>
-          <a:blip r:embed="rId16">
+          <a:blip r:embed="rId17">
             <a:extLst>
               <a:ext uri="{28A0092B-C50C-407E-A947-70E740481C1C}">
                 <a14:useLocalDpi xmlns:a14="http://schemas.microsoft.com/office/drawing/2010/main" val="0"/>
@@ -7642,7 +8163,7 @@
           <p:nvPr/>
         </p:nvPicPr>
         <p:blipFill>
-          <a:blip r:embed="rId17">
+          <a:blip r:embed="rId18">
             <a:extLst>
               <a:ext uri="{28A0092B-C50C-407E-A947-70E740481C1C}">
                 <a14:useLocalDpi xmlns:a14="http://schemas.microsoft.com/office/drawing/2010/main" val="0"/>
@@ -7678,7 +8199,7 @@
           <p:nvPr/>
         </p:nvPicPr>
         <p:blipFill>
-          <a:blip r:embed="rId18">
+          <a:blip r:embed="rId19">
             <a:extLst>
               <a:ext uri="{28A0092B-C50C-407E-A947-70E740481C1C}">
                 <a14:useLocalDpi xmlns:a14="http://schemas.microsoft.com/office/drawing/2010/main" val="0"/>
@@ -7714,7 +8235,7 @@
           <p:nvPr/>
         </p:nvPicPr>
         <p:blipFill>
-          <a:blip r:embed="rId19">
+          <a:blip r:embed="rId20">
             <a:extLst>
               <a:ext uri="{28A0092B-C50C-407E-A947-70E740481C1C}">
                 <a14:useLocalDpi xmlns:a14="http://schemas.microsoft.com/office/drawing/2010/main" val="0"/>
@@ -7750,7 +8271,7 @@
           <p:nvPr/>
         </p:nvPicPr>
         <p:blipFill>
-          <a:blip r:embed="rId20">
+          <a:blip r:embed="rId21">
             <a:extLst>
               <a:ext uri="{28A0092B-C50C-407E-A947-70E740481C1C}">
                 <a14:useLocalDpi xmlns:a14="http://schemas.microsoft.com/office/drawing/2010/main" val="0"/>
@@ -7786,7 +8307,7 @@
           <p:nvPr/>
         </p:nvPicPr>
         <p:blipFill>
-          <a:blip r:embed="rId21">
+          <a:blip r:embed="rId22">
             <a:extLst>
               <a:ext uri="{28A0092B-C50C-407E-A947-70E740481C1C}">
                 <a14:useLocalDpi xmlns:a14="http://schemas.microsoft.com/office/drawing/2010/main" val="0"/>
@@ -7822,7 +8343,7 @@
           <p:nvPr/>
         </p:nvPicPr>
         <p:blipFill>
-          <a:blip r:embed="rId22">
+          <a:blip r:embed="rId23">
             <a:extLst>
               <a:ext uri="{28A0092B-C50C-407E-A947-70E740481C1C}">
                 <a14:useLocalDpi xmlns:a14="http://schemas.microsoft.com/office/drawing/2010/main" val="0"/>
@@ -7858,7 +8379,7 @@
           <p:nvPr/>
         </p:nvPicPr>
         <p:blipFill>
-          <a:blip r:embed="rId23">
+          <a:blip r:embed="rId24">
             <a:extLst>
               <a:ext uri="{28A0092B-C50C-407E-A947-70E740481C1C}">
                 <a14:useLocalDpi xmlns:a14="http://schemas.microsoft.com/office/drawing/2010/main" val="0"/>
@@ -7894,7 +8415,7 @@
           <p:nvPr/>
         </p:nvPicPr>
         <p:blipFill>
-          <a:blip r:embed="rId24">
+          <a:blip r:embed="rId25">
             <a:extLst>
               <a:ext uri="{28A0092B-C50C-407E-A947-70E740481C1C}">
                 <a14:useLocalDpi xmlns:a14="http://schemas.microsoft.com/office/drawing/2010/main" val="0"/>
@@ -7930,7 +8451,7 @@
           <p:nvPr/>
         </p:nvPicPr>
         <p:blipFill>
-          <a:blip r:embed="rId25">
+          <a:blip r:embed="rId26">
             <a:extLst>
               <a:ext uri="{28A0092B-C50C-407E-A947-70E740481C1C}">
                 <a14:useLocalDpi xmlns:a14="http://schemas.microsoft.com/office/drawing/2010/main" val="0"/>
@@ -7966,7 +8487,7 @@
           <p:nvPr/>
         </p:nvPicPr>
         <p:blipFill>
-          <a:blip r:embed="rId26">
+          <a:blip r:embed="rId27">
             <a:extLst>
               <a:ext uri="{28A0092B-C50C-407E-A947-70E740481C1C}">
                 <a14:useLocalDpi xmlns:a14="http://schemas.microsoft.com/office/drawing/2010/main" val="0"/>
@@ -8116,10 +8637,524 @@
           </a:p>
         </p:txBody>
       </p:sp>
+      <p:sp>
+        <p:nvSpPr>
+          <p:cNvPr id="2" name="Rectangle 1">
+            <a:extLst>
+              <a:ext uri="{FF2B5EF4-FFF2-40B4-BE49-F238E27FC236}">
+                <a16:creationId xmlns:a16="http://schemas.microsoft.com/office/drawing/2014/main" id="{A5C088EC-2B02-F70C-BD4A-4A3359178F52}"/>
+              </a:ext>
+            </a:extLst>
+          </p:cNvPr>
+          <p:cNvSpPr/>
+          <p:nvPr/>
+        </p:nvSpPr>
+        <p:spPr>
+          <a:xfrm>
+            <a:off x="-425992" y="1280390"/>
+            <a:ext cx="368391" cy="314528"/>
+          </a:xfrm>
+          <a:prstGeom prst="rect">
+            <a:avLst/>
+          </a:prstGeom>
+          <a:solidFill>
+            <a:srgbClr val="6184A1"/>
+          </a:solidFill>
+        </p:spPr>
+        <p:style>
+          <a:lnRef idx="2">
+            <a:schemeClr val="accent1">
+              <a:shade val="15000"/>
+            </a:schemeClr>
+          </a:lnRef>
+          <a:fillRef idx="1">
+            <a:schemeClr val="accent1"/>
+          </a:fillRef>
+          <a:effectRef idx="0">
+            <a:schemeClr val="accent1"/>
+          </a:effectRef>
+          <a:fontRef idx="minor">
+            <a:schemeClr val="lt1"/>
+          </a:fontRef>
+        </p:style>
+        <p:txBody>
+          <a:bodyPr rtlCol="0" anchor="ctr"/>
+          <a:lstStyle/>
+          <a:p>
+            <a:pPr algn="ctr"/>
+            <a:endParaRPr lang="zh-CN" altLang="en-US"/>
+          </a:p>
+        </p:txBody>
+      </p:sp>
+      <p:sp>
+        <p:nvSpPr>
+          <p:cNvPr id="4" name="TextBox 3">
+            <a:extLst>
+              <a:ext uri="{FF2B5EF4-FFF2-40B4-BE49-F238E27FC236}">
+                <a16:creationId xmlns:a16="http://schemas.microsoft.com/office/drawing/2014/main" id="{FE6A9B57-2337-FE85-274E-FE118E9621F0}"/>
+              </a:ext>
+            </a:extLst>
+          </p:cNvPr>
+          <p:cNvSpPr txBox="1"/>
+          <p:nvPr/>
+        </p:nvSpPr>
+        <p:spPr>
+          <a:xfrm>
+            <a:off x="-1365273" y="1280389"/>
+            <a:ext cx="728114" cy="261610"/>
+          </a:xfrm>
+          <a:prstGeom prst="rect">
+            <a:avLst/>
+          </a:prstGeom>
+          <a:noFill/>
+        </p:spPr>
+        <p:txBody>
+          <a:bodyPr wrap="square">
+            <a:spAutoFit/>
+          </a:bodyPr>
+          <a:lstStyle/>
+          <a:p>
+            <a:r>
+              <a:rPr lang="en-US" altLang="zh-CN" sz="1100" dirty="0"/>
+              <a:t>#6184a1</a:t>
+            </a:r>
+            <a:endParaRPr lang="zh-CN" altLang="en-US" sz="1100" dirty="0"/>
+          </a:p>
+        </p:txBody>
+      </p:sp>
+      <p:sp>
+        <p:nvSpPr>
+          <p:cNvPr id="6" name="Rectangle 5">
+            <a:extLst>
+              <a:ext uri="{FF2B5EF4-FFF2-40B4-BE49-F238E27FC236}">
+                <a16:creationId xmlns:a16="http://schemas.microsoft.com/office/drawing/2014/main" id="{CF6CAA3A-3B34-C93D-C05D-C98BEE0AB120}"/>
+              </a:ext>
+            </a:extLst>
+          </p:cNvPr>
+          <p:cNvSpPr/>
+          <p:nvPr/>
+        </p:nvSpPr>
+        <p:spPr>
+          <a:xfrm>
+            <a:off x="-425992" y="1983509"/>
+            <a:ext cx="368391" cy="314528"/>
+          </a:xfrm>
+          <a:prstGeom prst="rect">
+            <a:avLst/>
+          </a:prstGeom>
+          <a:solidFill>
+            <a:srgbClr val="6184A1"/>
+          </a:solidFill>
+        </p:spPr>
+        <p:style>
+          <a:lnRef idx="2">
+            <a:schemeClr val="accent1">
+              <a:shade val="15000"/>
+            </a:schemeClr>
+          </a:lnRef>
+          <a:fillRef idx="1">
+            <a:schemeClr val="accent1"/>
+          </a:fillRef>
+          <a:effectRef idx="0">
+            <a:schemeClr val="accent1"/>
+          </a:effectRef>
+          <a:fontRef idx="minor">
+            <a:schemeClr val="lt1"/>
+          </a:fontRef>
+        </p:style>
+        <p:txBody>
+          <a:bodyPr rtlCol="0" anchor="ctr"/>
+          <a:lstStyle/>
+          <a:p>
+            <a:pPr algn="ctr"/>
+            <a:endParaRPr lang="zh-CN" altLang="en-US"/>
+          </a:p>
+        </p:txBody>
+      </p:sp>
+      <p:sp>
+        <p:nvSpPr>
+          <p:cNvPr id="8" name="Rectangle 7">
+            <a:extLst>
+              <a:ext uri="{FF2B5EF4-FFF2-40B4-BE49-F238E27FC236}">
+                <a16:creationId xmlns:a16="http://schemas.microsoft.com/office/drawing/2014/main" id="{721FC0AB-3C9F-6C6D-5536-B3A2C5FEC78F}"/>
+              </a:ext>
+            </a:extLst>
+          </p:cNvPr>
+          <p:cNvSpPr/>
+          <p:nvPr/>
+        </p:nvSpPr>
+        <p:spPr>
+          <a:xfrm>
+            <a:off x="-432793" y="676208"/>
+            <a:ext cx="368391" cy="314528"/>
+          </a:xfrm>
+          <a:prstGeom prst="rect">
+            <a:avLst/>
+          </a:prstGeom>
+          <a:solidFill>
+            <a:srgbClr val="B7B7B7"/>
+          </a:solidFill>
+        </p:spPr>
+        <p:style>
+          <a:lnRef idx="2">
+            <a:schemeClr val="accent1">
+              <a:shade val="15000"/>
+            </a:schemeClr>
+          </a:lnRef>
+          <a:fillRef idx="1">
+            <a:schemeClr val="accent1"/>
+          </a:fillRef>
+          <a:effectRef idx="0">
+            <a:schemeClr val="accent1"/>
+          </a:effectRef>
+          <a:fontRef idx="minor">
+            <a:schemeClr val="lt1"/>
+          </a:fontRef>
+        </p:style>
+        <p:txBody>
+          <a:bodyPr rtlCol="0" anchor="ctr"/>
+          <a:lstStyle/>
+          <a:p>
+            <a:pPr algn="ctr"/>
+            <a:endParaRPr lang="zh-CN" altLang="en-US"/>
+          </a:p>
+        </p:txBody>
+      </p:sp>
+      <p:sp>
+        <p:nvSpPr>
+          <p:cNvPr id="12" name="Rectangle 11">
+            <a:extLst>
+              <a:ext uri="{FF2B5EF4-FFF2-40B4-BE49-F238E27FC236}">
+                <a16:creationId xmlns:a16="http://schemas.microsoft.com/office/drawing/2014/main" id="{A3517C42-E980-38F7-0904-567A9C7BA3AC}"/>
+              </a:ext>
+            </a:extLst>
+          </p:cNvPr>
+          <p:cNvSpPr/>
+          <p:nvPr/>
+        </p:nvSpPr>
+        <p:spPr>
+          <a:xfrm>
+            <a:off x="-432794" y="167385"/>
+            <a:ext cx="368391" cy="314528"/>
+          </a:xfrm>
+          <a:prstGeom prst="rect">
+            <a:avLst/>
+          </a:prstGeom>
+          <a:solidFill>
+            <a:srgbClr val="B7B7B7"/>
+          </a:solidFill>
+        </p:spPr>
+        <p:style>
+          <a:lnRef idx="2">
+            <a:schemeClr val="accent1">
+              <a:shade val="15000"/>
+            </a:schemeClr>
+          </a:lnRef>
+          <a:fillRef idx="1">
+            <a:schemeClr val="accent1"/>
+          </a:fillRef>
+          <a:effectRef idx="0">
+            <a:schemeClr val="accent1"/>
+          </a:effectRef>
+          <a:fontRef idx="minor">
+            <a:schemeClr val="lt1"/>
+          </a:fontRef>
+        </p:style>
+        <p:txBody>
+          <a:bodyPr rtlCol="0" anchor="ctr"/>
+          <a:lstStyle/>
+          <a:p>
+            <a:pPr algn="ctr"/>
+            <a:endParaRPr lang="zh-CN" altLang="en-US"/>
+          </a:p>
+        </p:txBody>
+      </p:sp>
+      <p:sp>
+        <p:nvSpPr>
+          <p:cNvPr id="13" name="TextBox 12">
+            <a:extLst>
+              <a:ext uri="{FF2B5EF4-FFF2-40B4-BE49-F238E27FC236}">
+                <a16:creationId xmlns:a16="http://schemas.microsoft.com/office/drawing/2014/main" id="{8FD00080-2B98-4674-4DE1-EE8CD1C249A5}"/>
+              </a:ext>
+            </a:extLst>
+          </p:cNvPr>
+          <p:cNvSpPr txBox="1"/>
+          <p:nvPr/>
+        </p:nvSpPr>
+        <p:spPr>
+          <a:xfrm>
+            <a:off x="-1352193" y="676208"/>
+            <a:ext cx="728114" cy="261610"/>
+          </a:xfrm>
+          <a:prstGeom prst="rect">
+            <a:avLst/>
+          </a:prstGeom>
+          <a:noFill/>
+        </p:spPr>
+        <p:txBody>
+          <a:bodyPr wrap="square">
+            <a:spAutoFit/>
+          </a:bodyPr>
+          <a:lstStyle/>
+          <a:p>
+            <a:r>
+              <a:rPr lang="en-US" altLang="zh-CN" sz="1100" dirty="0"/>
+              <a:t>#B7B7B7</a:t>
+            </a:r>
+            <a:endParaRPr lang="zh-CN" altLang="en-US" sz="1100" dirty="0"/>
+          </a:p>
+        </p:txBody>
+      </p:sp>
     </p:spTree>
     <p:extLst>
       <p:ext uri="{BB962C8B-B14F-4D97-AF65-F5344CB8AC3E}">
         <p14:creationId xmlns:p14="http://schemas.microsoft.com/office/powerpoint/2010/main" val="2387148937"/>
+      </p:ext>
+    </p:extLst>
+  </p:cSld>
+  <p:clrMapOvr>
+    <a:masterClrMapping/>
+  </p:clrMapOvr>
+</p:sld>
+</file>
+
+<file path=ppt/slides/slide4.xml><?xml version="1.0" encoding="utf-8"?>
+<p:sld xmlns:a="http://schemas.openxmlformats.org/drawingml/2006/main" xmlns:r="http://schemas.openxmlformats.org/officeDocument/2006/relationships" xmlns:p="http://schemas.openxmlformats.org/presentationml/2006/main">
+  <p:cSld>
+    <p:spTree>
+      <p:nvGrpSpPr>
+        <p:cNvPr id="1" name=""/>
+        <p:cNvGrpSpPr/>
+        <p:nvPr/>
+      </p:nvGrpSpPr>
+      <p:grpSpPr>
+        <a:xfrm>
+          <a:off x="0" y="0"/>
+          <a:ext cx="0" cy="0"/>
+          <a:chOff x="0" y="0"/>
+          <a:chExt cx="0" cy="0"/>
+        </a:xfrm>
+      </p:grpSpPr>
+      <p:pic>
+        <p:nvPicPr>
+          <p:cNvPr id="65" name="Picture 64" descr="A graph of colored lines&#10;&#10;AI-generated content may be incorrect.">
+            <a:extLst>
+              <a:ext uri="{FF2B5EF4-FFF2-40B4-BE49-F238E27FC236}">
+                <a16:creationId xmlns:a16="http://schemas.microsoft.com/office/drawing/2014/main" id="{52512F1C-B5B3-4890-2990-4483FD40D162}"/>
+              </a:ext>
+            </a:extLst>
+          </p:cNvPr>
+          <p:cNvPicPr>
+            <a:picLocks noChangeAspect="1"/>
+          </p:cNvPicPr>
+          <p:nvPr/>
+        </p:nvPicPr>
+        <p:blipFill>
+          <a:blip r:embed="rId3">
+            <a:extLst>
+              <a:ext uri="{28A0092B-C50C-407E-A947-70E740481C1C}">
+                <a14:useLocalDpi xmlns:a14="http://schemas.microsoft.com/office/drawing/2010/main" val="0"/>
+              </a:ext>
+            </a:extLst>
+          </a:blip>
+          <a:stretch>
+            <a:fillRect/>
+          </a:stretch>
+        </p:blipFill>
+        <p:spPr>
+          <a:xfrm>
+            <a:off x="5125720" y="3896360"/>
+            <a:ext cx="5384800" cy="1739900"/>
+          </a:xfrm>
+          <a:prstGeom prst="rect">
+            <a:avLst/>
+          </a:prstGeom>
+        </p:spPr>
+      </p:pic>
+      <p:pic>
+        <p:nvPicPr>
+          <p:cNvPr id="67" name="Picture 66" descr="A black background with a black border&#10;&#10;AI-generated content may be incorrect.">
+            <a:extLst>
+              <a:ext uri="{FF2B5EF4-FFF2-40B4-BE49-F238E27FC236}">
+                <a16:creationId xmlns:a16="http://schemas.microsoft.com/office/drawing/2014/main" id="{088686A7-565E-5942-1881-020867CAB1D0}"/>
+              </a:ext>
+            </a:extLst>
+          </p:cNvPr>
+          <p:cNvPicPr>
+            <a:picLocks noChangeAspect="1"/>
+          </p:cNvPicPr>
+          <p:nvPr/>
+        </p:nvPicPr>
+        <p:blipFill>
+          <a:blip r:embed="rId4">
+            <a:extLst>
+              <a:ext uri="{28A0092B-C50C-407E-A947-70E740481C1C}">
+                <a14:useLocalDpi xmlns:a14="http://schemas.microsoft.com/office/drawing/2010/main" val="0"/>
+              </a:ext>
+            </a:extLst>
+          </a:blip>
+          <a:stretch>
+            <a:fillRect/>
+          </a:stretch>
+        </p:blipFill>
+        <p:spPr>
+          <a:xfrm>
+            <a:off x="4947920" y="2070100"/>
+            <a:ext cx="5384800" cy="1739900"/>
+          </a:xfrm>
+          <a:prstGeom prst="rect">
+            <a:avLst/>
+          </a:prstGeom>
+        </p:spPr>
+      </p:pic>
+      <p:pic>
+        <p:nvPicPr>
+          <p:cNvPr id="69" name="Picture 68" descr="A black background with a line of dots&#10;&#10;AI-generated content may be incorrect.">
+            <a:extLst>
+              <a:ext uri="{FF2B5EF4-FFF2-40B4-BE49-F238E27FC236}">
+                <a16:creationId xmlns:a16="http://schemas.microsoft.com/office/drawing/2014/main" id="{8846E6B5-F9C0-E2F4-CD3F-6F73D4F70B35}"/>
+              </a:ext>
+            </a:extLst>
+          </p:cNvPr>
+          <p:cNvPicPr>
+            <a:picLocks noChangeAspect="1"/>
+          </p:cNvPicPr>
+          <p:nvPr/>
+        </p:nvPicPr>
+        <p:blipFill>
+          <a:blip r:embed="rId5">
+            <a:extLst>
+              <a:ext uri="{28A0092B-C50C-407E-A947-70E740481C1C}">
+                <a14:useLocalDpi xmlns:a14="http://schemas.microsoft.com/office/drawing/2010/main" val="0"/>
+              </a:ext>
+            </a:extLst>
+          </a:blip>
+          <a:stretch>
+            <a:fillRect/>
+          </a:stretch>
+        </p:blipFill>
+        <p:spPr>
+          <a:xfrm>
+            <a:off x="-81280" y="3736340"/>
+            <a:ext cx="5384800" cy="1727200"/>
+          </a:xfrm>
+          <a:prstGeom prst="rect">
+            <a:avLst/>
+          </a:prstGeom>
+        </p:spPr>
+      </p:pic>
+      <p:pic>
+        <p:nvPicPr>
+          <p:cNvPr id="71" name="Picture 70" descr="A black background with a black and white image&#10;&#10;AI-generated content may be incorrect.">
+            <a:extLst>
+              <a:ext uri="{FF2B5EF4-FFF2-40B4-BE49-F238E27FC236}">
+                <a16:creationId xmlns:a16="http://schemas.microsoft.com/office/drawing/2014/main" id="{80148EB9-8152-642F-8E05-07CB1E3213CA}"/>
+              </a:ext>
+            </a:extLst>
+          </p:cNvPr>
+          <p:cNvPicPr>
+            <a:picLocks noChangeAspect="1"/>
+          </p:cNvPicPr>
+          <p:nvPr/>
+        </p:nvPicPr>
+        <p:blipFill>
+          <a:blip r:embed="rId6">
+            <a:extLst>
+              <a:ext uri="{28A0092B-C50C-407E-A947-70E740481C1C}">
+                <a14:useLocalDpi xmlns:a14="http://schemas.microsoft.com/office/drawing/2010/main" val="0"/>
+              </a:ext>
+            </a:extLst>
+          </a:blip>
+          <a:stretch>
+            <a:fillRect/>
+          </a:stretch>
+        </p:blipFill>
+        <p:spPr>
+          <a:xfrm>
+            <a:off x="-320040" y="1823720"/>
+            <a:ext cx="5384800" cy="1739900"/>
+          </a:xfrm>
+          <a:prstGeom prst="rect">
+            <a:avLst/>
+          </a:prstGeom>
+        </p:spPr>
+      </p:pic>
+      <p:pic>
+        <p:nvPicPr>
+          <p:cNvPr id="73" name="Picture 72" descr="A black background with a black and white image&#10;&#10;AI-generated content may be incorrect.">
+            <a:extLst>
+              <a:ext uri="{FF2B5EF4-FFF2-40B4-BE49-F238E27FC236}">
+                <a16:creationId xmlns:a16="http://schemas.microsoft.com/office/drawing/2014/main" id="{85DBA045-49B2-7633-9677-9C66542E91F7}"/>
+              </a:ext>
+            </a:extLst>
+          </p:cNvPr>
+          <p:cNvPicPr>
+            <a:picLocks noChangeAspect="1"/>
+          </p:cNvPicPr>
+          <p:nvPr/>
+        </p:nvPicPr>
+        <p:blipFill>
+          <a:blip r:embed="rId7">
+            <a:extLst>
+              <a:ext uri="{28A0092B-C50C-407E-A947-70E740481C1C}">
+                <a14:useLocalDpi xmlns:a14="http://schemas.microsoft.com/office/drawing/2010/main" val="0"/>
+              </a:ext>
+            </a:extLst>
+          </a:blip>
+          <a:stretch>
+            <a:fillRect/>
+          </a:stretch>
+        </p:blipFill>
+        <p:spPr>
+          <a:xfrm>
+            <a:off x="-81280" y="397510"/>
+            <a:ext cx="5384800" cy="1727200"/>
+          </a:xfrm>
+          <a:prstGeom prst="rect">
+            <a:avLst/>
+          </a:prstGeom>
+        </p:spPr>
+      </p:pic>
+      <p:pic>
+        <p:nvPicPr>
+          <p:cNvPr id="75" name="Picture 74" descr="A black background with a black background&#10;&#10;AI-generated content may be incorrect.">
+            <a:extLst>
+              <a:ext uri="{FF2B5EF4-FFF2-40B4-BE49-F238E27FC236}">
+                <a16:creationId xmlns:a16="http://schemas.microsoft.com/office/drawing/2014/main" id="{6445F656-E615-EB62-2897-9CC796BF72F5}"/>
+              </a:ext>
+            </a:extLst>
+          </p:cNvPr>
+          <p:cNvPicPr>
+            <a:picLocks noChangeAspect="1"/>
+          </p:cNvPicPr>
+          <p:nvPr/>
+        </p:nvPicPr>
+        <p:blipFill>
+          <a:blip r:embed="rId8">
+            <a:extLst>
+              <a:ext uri="{28A0092B-C50C-407E-A947-70E740481C1C}">
+                <a14:useLocalDpi xmlns:a14="http://schemas.microsoft.com/office/drawing/2010/main" val="0"/>
+              </a:ext>
+            </a:extLst>
+          </a:blip>
+          <a:stretch>
+            <a:fillRect/>
+          </a:stretch>
+        </p:blipFill>
+        <p:spPr>
+          <a:xfrm>
+            <a:off x="4826000" y="391160"/>
+            <a:ext cx="5384800" cy="1727200"/>
+          </a:xfrm>
+          <a:prstGeom prst="rect">
+            <a:avLst/>
+          </a:prstGeom>
+        </p:spPr>
+      </p:pic>
+    </p:spTree>
+    <p:extLst>
+      <p:ext uri="{BB962C8B-B14F-4D97-AF65-F5344CB8AC3E}">
+        <p14:creationId xmlns:p14="http://schemas.microsoft.com/office/powerpoint/2010/main" val="4156236273"/>
       </p:ext>
     </p:extLst>
   </p:cSld>
@@ -8442,4 +9477,319 @@
     </a:ext>
   </a:extLst>
 </a:theme>
+</file>
+
+<file path=ppt/theme/theme2.xml><?xml version="1.0" encoding="utf-8"?>
+<a:theme xmlns:a="http://schemas.openxmlformats.org/drawingml/2006/main" name="Office Theme">
+  <a:themeElements>
+    <a:clrScheme name="Office">
+      <a:dk1>
+        <a:sysClr val="windowText" lastClr="000000"/>
+      </a:dk1>
+      <a:lt1>
+        <a:sysClr val="window" lastClr="FFFFFF"/>
+      </a:lt1>
+      <a:dk2>
+        <a:srgbClr val="0E2841"/>
+      </a:dk2>
+      <a:lt2>
+        <a:srgbClr val="E8E8E8"/>
+      </a:lt2>
+      <a:accent1>
+        <a:srgbClr val="156082"/>
+      </a:accent1>
+      <a:accent2>
+        <a:srgbClr val="E97132"/>
+      </a:accent2>
+      <a:accent3>
+        <a:srgbClr val="196B24"/>
+      </a:accent3>
+      <a:accent4>
+        <a:srgbClr val="0F9ED5"/>
+      </a:accent4>
+      <a:accent5>
+        <a:srgbClr val="A02B93"/>
+      </a:accent5>
+      <a:accent6>
+        <a:srgbClr val="4EA72E"/>
+      </a:accent6>
+      <a:hlink>
+        <a:srgbClr val="467886"/>
+      </a:hlink>
+      <a:folHlink>
+        <a:srgbClr val="96607D"/>
+      </a:folHlink>
+    </a:clrScheme>
+    <a:fontScheme name="Office">
+      <a:majorFont>
+        <a:latin typeface="Aptos Display" panose="02110004020202020204"/>
+        <a:ea typeface=""/>
+        <a:cs typeface=""/>
+        <a:font script="Jpan" typeface="游ゴシック Light"/>
+        <a:font script="Hang" typeface="맑은 고딕"/>
+        <a:font script="Hans" typeface="等线 Light"/>
+        <a:font script="Hant" typeface="新細明體"/>
+        <a:font script="Arab" typeface="Times New Roman"/>
+        <a:font script="Hebr" typeface="Times New Roman"/>
+        <a:font script="Thai" typeface="Angsana New"/>
+        <a:font script="Ethi" typeface="Nyala"/>
+        <a:font script="Beng" typeface="Vrinda"/>
+        <a:font script="Gujr" typeface="Shruti"/>
+        <a:font script="Khmr" typeface="MoolBoran"/>
+        <a:font script="Knda" typeface="Tunga"/>
+        <a:font script="Guru" typeface="Raavi"/>
+        <a:font script="Cans" typeface="Euphemia"/>
+        <a:font script="Cher" typeface="Plantagenet Cherokee"/>
+        <a:font script="Yiii" typeface="Microsoft Yi Baiti"/>
+        <a:font script="Tibt" typeface="Microsoft Himalaya"/>
+        <a:font script="Thaa" typeface="MV Boli"/>
+        <a:font script="Deva" typeface="Mangal"/>
+        <a:font script="Telu" typeface="Gautami"/>
+        <a:font script="Taml" typeface="Latha"/>
+        <a:font script="Syrc" typeface="Estrangelo Edessa"/>
+        <a:font script="Orya" typeface="Kalinga"/>
+        <a:font script="Mlym" typeface="Kartika"/>
+        <a:font script="Laoo" typeface="DokChampa"/>
+        <a:font script="Sinh" typeface="Iskoola Pota"/>
+        <a:font script="Mong" typeface="Mongolian Baiti"/>
+        <a:font script="Viet" typeface="Times New Roman"/>
+        <a:font script="Uigh" typeface="Microsoft Uighur"/>
+        <a:font script="Geor" typeface="Sylfaen"/>
+        <a:font script="Armn" typeface="Arial"/>
+        <a:font script="Bugi" typeface="Leelawadee UI"/>
+        <a:font script="Bopo" typeface="Microsoft JhengHei"/>
+        <a:font script="Java" typeface="Javanese Text"/>
+        <a:font script="Lisu" typeface="Segoe UI"/>
+        <a:font script="Mymr" typeface="Myanmar Text"/>
+        <a:font script="Nkoo" typeface="Ebrima"/>
+        <a:font script="Olck" typeface="Nirmala UI"/>
+        <a:font script="Osma" typeface="Ebrima"/>
+        <a:font script="Phag" typeface="Phagspa"/>
+        <a:font script="Syrn" typeface="Estrangelo Edessa"/>
+        <a:font script="Syrj" typeface="Estrangelo Edessa"/>
+        <a:font script="Syre" typeface="Estrangelo Edessa"/>
+        <a:font script="Sora" typeface="Nirmala UI"/>
+        <a:font script="Tale" typeface="Microsoft Tai Le"/>
+        <a:font script="Talu" typeface="Microsoft New Tai Lue"/>
+        <a:font script="Tfng" typeface="Ebrima"/>
+      </a:majorFont>
+      <a:minorFont>
+        <a:latin typeface="Aptos" panose="02110004020202020204"/>
+        <a:ea typeface=""/>
+        <a:cs typeface=""/>
+        <a:font script="Jpan" typeface="游ゴシック"/>
+        <a:font script="Hang" typeface="맑은 고딕"/>
+        <a:font script="Hans" typeface="等线"/>
+        <a:font script="Hant" typeface="新細明體"/>
+        <a:font script="Arab" typeface="Arial"/>
+        <a:font script="Hebr" typeface="Arial"/>
+        <a:font script="Thai" typeface="Cordia New"/>
+        <a:font script="Ethi" typeface="Nyala"/>
+        <a:font script="Beng" typeface="Vrinda"/>
+        <a:font script="Gujr" typeface="Shruti"/>
+        <a:font script="Khmr" typeface="DaunPenh"/>
+        <a:font script="Knda" typeface="Tunga"/>
+        <a:font script="Guru" typeface="Raavi"/>
+        <a:font script="Cans" typeface="Euphemia"/>
+        <a:font script="Cher" typeface="Plantagenet Cherokee"/>
+        <a:font script="Yiii" typeface="Microsoft Yi Baiti"/>
+        <a:font script="Tibt" typeface="Microsoft Himalaya"/>
+        <a:font script="Thaa" typeface="MV Boli"/>
+        <a:font script="Deva" typeface="Mangal"/>
+        <a:font script="Telu" typeface="Gautami"/>
+        <a:font script="Taml" typeface="Latha"/>
+        <a:font script="Syrc" typeface="Estrangelo Edessa"/>
+        <a:font script="Orya" typeface="Kalinga"/>
+        <a:font script="Mlym" typeface="Kartika"/>
+        <a:font script="Laoo" typeface="DokChampa"/>
+        <a:font script="Sinh" typeface="Iskoola Pota"/>
+        <a:font script="Mong" typeface="Mongolian Baiti"/>
+        <a:font script="Viet" typeface="Arial"/>
+        <a:font script="Uigh" typeface="Microsoft Uighur"/>
+        <a:font script="Geor" typeface="Sylfaen"/>
+        <a:font script="Armn" typeface="Arial"/>
+        <a:font script="Bugi" typeface="Leelawadee UI"/>
+        <a:font script="Bopo" typeface="Microsoft JhengHei"/>
+        <a:font script="Java" typeface="Javanese Text"/>
+        <a:font script="Lisu" typeface="Segoe UI"/>
+        <a:font script="Mymr" typeface="Myanmar Text"/>
+        <a:font script="Nkoo" typeface="Ebrima"/>
+        <a:font script="Olck" typeface="Nirmala UI"/>
+        <a:font script="Osma" typeface="Ebrima"/>
+        <a:font script="Phag" typeface="Phagspa"/>
+        <a:font script="Syrn" typeface="Estrangelo Edessa"/>
+        <a:font script="Syrj" typeface="Estrangelo Edessa"/>
+        <a:font script="Syre" typeface="Estrangelo Edessa"/>
+        <a:font script="Sora" typeface="Nirmala UI"/>
+        <a:font script="Tale" typeface="Microsoft Tai Le"/>
+        <a:font script="Talu" typeface="Microsoft New Tai Lue"/>
+        <a:font script="Tfng" typeface="Ebrima"/>
+      </a:minorFont>
+    </a:fontScheme>
+    <a:fmtScheme name="Office">
+      <a:fillStyleLst>
+        <a:solidFill>
+          <a:schemeClr val="phClr"/>
+        </a:solidFill>
+        <a:gradFill rotWithShape="1">
+          <a:gsLst>
+            <a:gs pos="0">
+              <a:schemeClr val="phClr">
+                <a:lumMod val="110000"/>
+                <a:satMod val="105000"/>
+                <a:tint val="67000"/>
+              </a:schemeClr>
+            </a:gs>
+            <a:gs pos="50000">
+              <a:schemeClr val="phClr">
+                <a:lumMod val="105000"/>
+                <a:satMod val="103000"/>
+                <a:tint val="73000"/>
+              </a:schemeClr>
+            </a:gs>
+            <a:gs pos="100000">
+              <a:schemeClr val="phClr">
+                <a:lumMod val="105000"/>
+                <a:satMod val="109000"/>
+                <a:tint val="81000"/>
+              </a:schemeClr>
+            </a:gs>
+          </a:gsLst>
+          <a:lin ang="5400000" scaled="0"/>
+        </a:gradFill>
+        <a:gradFill rotWithShape="1">
+          <a:gsLst>
+            <a:gs pos="0">
+              <a:schemeClr val="phClr">
+                <a:satMod val="103000"/>
+                <a:lumMod val="102000"/>
+                <a:tint val="94000"/>
+              </a:schemeClr>
+            </a:gs>
+            <a:gs pos="50000">
+              <a:schemeClr val="phClr">
+                <a:satMod val="110000"/>
+                <a:lumMod val="100000"/>
+                <a:shade val="100000"/>
+              </a:schemeClr>
+            </a:gs>
+            <a:gs pos="100000">
+              <a:schemeClr val="phClr">
+                <a:lumMod val="99000"/>
+                <a:satMod val="120000"/>
+                <a:shade val="78000"/>
+              </a:schemeClr>
+            </a:gs>
+          </a:gsLst>
+          <a:lin ang="5400000" scaled="0"/>
+        </a:gradFill>
+      </a:fillStyleLst>
+      <a:lnStyleLst>
+        <a:ln w="12700" cap="flat" cmpd="sng" algn="ctr">
+          <a:solidFill>
+            <a:schemeClr val="phClr"/>
+          </a:solidFill>
+          <a:prstDash val="solid"/>
+          <a:miter lim="800000"/>
+        </a:ln>
+        <a:ln w="19050" cap="flat" cmpd="sng" algn="ctr">
+          <a:solidFill>
+            <a:schemeClr val="phClr"/>
+          </a:solidFill>
+          <a:prstDash val="solid"/>
+          <a:miter lim="800000"/>
+        </a:ln>
+        <a:ln w="25400" cap="flat" cmpd="sng" algn="ctr">
+          <a:solidFill>
+            <a:schemeClr val="phClr"/>
+          </a:solidFill>
+          <a:prstDash val="solid"/>
+          <a:miter lim="800000"/>
+        </a:ln>
+      </a:lnStyleLst>
+      <a:effectStyleLst>
+        <a:effectStyle>
+          <a:effectLst/>
+        </a:effectStyle>
+        <a:effectStyle>
+          <a:effectLst/>
+        </a:effectStyle>
+        <a:effectStyle>
+          <a:effectLst>
+            <a:outerShdw blurRad="57150" dist="19050" dir="5400000" algn="ctr" rotWithShape="0">
+              <a:srgbClr val="000000">
+                <a:alpha val="63000"/>
+              </a:srgbClr>
+            </a:outerShdw>
+          </a:effectLst>
+        </a:effectStyle>
+      </a:effectStyleLst>
+      <a:bgFillStyleLst>
+        <a:solidFill>
+          <a:schemeClr val="phClr"/>
+        </a:solidFill>
+        <a:solidFill>
+          <a:schemeClr val="phClr">
+            <a:tint val="95000"/>
+            <a:satMod val="170000"/>
+          </a:schemeClr>
+        </a:solidFill>
+        <a:gradFill rotWithShape="1">
+          <a:gsLst>
+            <a:gs pos="0">
+              <a:schemeClr val="phClr">
+                <a:tint val="93000"/>
+                <a:satMod val="150000"/>
+                <a:shade val="98000"/>
+                <a:lumMod val="102000"/>
+              </a:schemeClr>
+            </a:gs>
+            <a:gs pos="50000">
+              <a:schemeClr val="phClr">
+                <a:tint val="98000"/>
+                <a:satMod val="130000"/>
+                <a:shade val="90000"/>
+                <a:lumMod val="103000"/>
+              </a:schemeClr>
+            </a:gs>
+            <a:gs pos="100000">
+              <a:schemeClr val="phClr">
+                <a:shade val="63000"/>
+                <a:satMod val="120000"/>
+              </a:schemeClr>
+            </a:gs>
+          </a:gsLst>
+          <a:lin ang="5400000" scaled="0"/>
+        </a:gradFill>
+      </a:bgFillStyleLst>
+    </a:fmtScheme>
+  </a:themeElements>
+  <a:objectDefaults>
+    <a:lnDef>
+      <a:spPr/>
+      <a:bodyPr/>
+      <a:lstStyle/>
+      <a:style>
+        <a:lnRef idx="2">
+          <a:schemeClr val="accent1"/>
+        </a:lnRef>
+        <a:fillRef idx="0">
+          <a:schemeClr val="accent1"/>
+        </a:fillRef>
+        <a:effectRef idx="1">
+          <a:schemeClr val="accent1"/>
+        </a:effectRef>
+        <a:fontRef idx="minor">
+          <a:schemeClr val="tx1"/>
+        </a:fontRef>
+      </a:style>
+    </a:lnDef>
+  </a:objectDefaults>
+  <a:extraClrSchemeLst/>
+  <a:extLst>
+    <a:ext uri="{05A4C25C-085E-4340-85A3-A5531E510DB2}">
+      <thm15:themeFamily xmlns:thm15="http://schemas.microsoft.com/office/thememl/2012/main" name="Office Theme" id="{2E142A2C-CD16-42D6-873A-C26D2A0506FA}" vid="{1BDDFF52-6CD6-40A5-AB3C-68EB2F1E4D0A}"/>
+    </a:ext>
+  </a:extLst>
+</a:theme>
 </file>
</xml_diff>